<commit_message>
Fixed bug with menu. Added new icons. Also added text to presentation and update presentation. Added ShimmerEffect for ChatController
</commit_message>
<xml_diff>
--- a/NeoBrain.pptx
+++ b/NeoBrain.pptx
@@ -127,7 +127,7 @@
   <p:extLst>
     <p:ext uri="{EFAFB233-063F-42B5-8137-9DF3F51BA10A}">
       <p15:sldGuideLst xmlns:p15="http://schemas.microsoft.com/office/powerpoint/2012/main">
-        <p15:guide id="1" orient="horz" pos="2069" userDrawn="1">
+        <p15:guide id="1" orient="horz" pos="2047" userDrawn="1">
           <p15:clr>
             <a:srgbClr val="A4A3A4"/>
           </p15:clr>
@@ -252,7 +252,7 @@
             <a:pPr rtl="0"/>
             <a:fld id="{84D28F2D-D4F3-4E2B-A0F3-7AAFDE0BC58B}" type="datetime1">
               <a:rPr lang="ru-RU" smtClean="0"/>
-              <a:t>14.03.2020</a:t>
+              <a:t>05.04.2020</a:t>
             </a:fld>
             <a:endParaRPr lang="ru-RU" dirty="0"/>
           </a:p>
@@ -433,7 +433,7 @@
             <a:fld id="{CA49951C-CA37-4221-943D-71E64EEEA549}" type="datetime1">
               <a:rPr lang="ru-RU" smtClean="0"/>
               <a:pPr/>
-              <a:t>14.03.2020</a:t>
+              <a:t>05.04.2020</a:t>
             </a:fld>
             <a:endParaRPr lang="ru-RU" dirty="0"/>
           </a:p>
@@ -2148,7 +2148,7 @@
             <a:pPr rtl="0"/>
             <a:fld id="{1BCB67F5-0266-4F57-BCC8-CAA9673E5902}" type="datetime1">
               <a:rPr lang="ru-RU" noProof="0" smtClean="0"/>
-              <a:t>14.03.2020</a:t>
+              <a:t>05.04.2020</a:t>
             </a:fld>
             <a:endParaRPr lang="ru-RU" noProof="0" dirty="0"/>
           </a:p>
@@ -2352,7 +2352,7 @@
             <a:pPr rtl="0"/>
             <a:fld id="{1B5ADB00-8AAA-4C20-B03B-A012746A2014}" type="datetime1">
               <a:rPr lang="ru-RU" noProof="0" smtClean="0"/>
-              <a:t>14.03.2020</a:t>
+              <a:t>05.04.2020</a:t>
             </a:fld>
             <a:endParaRPr lang="ru-RU" noProof="0" dirty="0"/>
           </a:p>
@@ -2566,7 +2566,7 @@
             <a:pPr rtl="0"/>
             <a:fld id="{7C0EA85A-0755-4D64-85AE-4D684CB44117}" type="datetime1">
               <a:rPr lang="ru-RU" noProof="0" smtClean="0"/>
-              <a:t>14.03.2020</a:t>
+              <a:t>05.04.2020</a:t>
             </a:fld>
             <a:endParaRPr lang="ru-RU" noProof="0" dirty="0"/>
           </a:p>
@@ -2770,7 +2770,7 @@
             <a:pPr rtl="0"/>
             <a:fld id="{82200F68-8153-43BD-9048-5E0203738055}" type="datetime1">
               <a:rPr lang="ru-RU" noProof="0" smtClean="0"/>
-              <a:t>14.03.2020</a:t>
+              <a:t>05.04.2020</a:t>
             </a:fld>
             <a:endParaRPr lang="ru-RU" noProof="0" dirty="0"/>
           </a:p>
@@ -3050,7 +3050,7 @@
             <a:pPr rtl="0"/>
             <a:fld id="{DEE6A3E5-DF0B-4BB4-83EC-7350AED6B333}" type="datetime1">
               <a:rPr lang="ru-RU" noProof="0" smtClean="0"/>
-              <a:t>14.03.2020</a:t>
+              <a:t>05.04.2020</a:t>
             </a:fld>
             <a:endParaRPr lang="ru-RU" noProof="0" dirty="0"/>
           </a:p>
@@ -3322,7 +3322,7 @@
             <a:pPr rtl="0"/>
             <a:fld id="{658B5BE7-11FF-4B74-A258-0B0852B1C612}" type="datetime1">
               <a:rPr lang="ru-RU" noProof="0" smtClean="0"/>
-              <a:t>14.03.2020</a:t>
+              <a:t>05.04.2020</a:t>
             </a:fld>
             <a:endParaRPr lang="ru-RU" noProof="0" dirty="0"/>
           </a:p>
@@ -3741,7 +3741,7 @@
             <a:pPr rtl="0"/>
             <a:fld id="{5153AEB0-DEE4-469A-ACA7-FCE298962CB8}" type="datetime1">
               <a:rPr lang="ru-RU" noProof="0" smtClean="0"/>
-              <a:t>14.03.2020</a:t>
+              <a:t>05.04.2020</a:t>
             </a:fld>
             <a:endParaRPr lang="ru-RU" noProof="0" dirty="0"/>
           </a:p>
@@ -3887,7 +3887,7 @@
             <a:pPr rtl="0"/>
             <a:fld id="{A7D850CA-FEA9-4ECA-92F5-9F1778664B8F}" type="datetime1">
               <a:rPr lang="ru-RU" noProof="0" smtClean="0"/>
-              <a:t>14.03.2020</a:t>
+              <a:t>05.04.2020</a:t>
             </a:fld>
             <a:endParaRPr lang="ru-RU" noProof="0" dirty="0"/>
           </a:p>
@@ -4003,7 +4003,7 @@
             <a:pPr rtl="0"/>
             <a:fld id="{BDD77D1A-AB3F-4195-91BD-ED29ADAC1B44}" type="datetime1">
               <a:rPr lang="ru-RU" noProof="0" smtClean="0"/>
-              <a:t>14.03.2020</a:t>
+              <a:t>05.04.2020</a:t>
             </a:fld>
             <a:endParaRPr lang="ru-RU" noProof="0" dirty="0"/>
           </a:p>
@@ -4320,7 +4320,7 @@
             <a:pPr rtl="0"/>
             <a:fld id="{376F1AFD-3CC9-4493-BC63-1C141B05CE5B}" type="datetime1">
               <a:rPr lang="ru-RU" noProof="0" smtClean="0"/>
-              <a:t>14.03.2020</a:t>
+              <a:t>05.04.2020</a:t>
             </a:fld>
             <a:endParaRPr lang="ru-RU" noProof="0" dirty="0"/>
           </a:p>
@@ -4618,7 +4618,7 @@
             <a:pPr rtl="0"/>
             <a:fld id="{6F578092-39FE-416A-9517-019E99EC9D0E}" type="datetime1">
               <a:rPr lang="ru-RU" noProof="0" smtClean="0"/>
-              <a:t>14.03.2020</a:t>
+              <a:t>05.04.2020</a:t>
             </a:fld>
             <a:endParaRPr lang="ru-RU" noProof="0" dirty="0"/>
           </a:p>
@@ -4863,7 +4863,7 @@
             <a:pPr rtl="0"/>
             <a:fld id="{368E1444-B5BA-4767-8208-964378902D11}" type="datetime1">
               <a:rPr lang="ru-RU" noProof="0" smtClean="0"/>
-              <a:t>14.03.2020</a:t>
+              <a:t>05.04.2020</a:t>
             </a:fld>
             <a:endParaRPr lang="ru-RU" noProof="0" dirty="0"/>
           </a:p>
@@ -5887,8 +5887,25 @@
                 <a:latin typeface="+mj-lt"/>
                 <a:cs typeface="Segoe UI" panose="020B0502040204020203" pitchFamily="34" charset="0"/>
               </a:rPr>
-              <a:t>Социальная сеть для саморазвития</a:t>
+              <a:t>Социальная сеть для </a:t>
             </a:r>
+            <a:r>
+              <a:rPr lang="ru-RU" sz="2400" i="1" dirty="0" smtClean="0">
+                <a:solidFill>
+                  <a:srgbClr val="002060"/>
+                </a:solidFill>
+                <a:latin typeface="+mj-lt"/>
+                <a:cs typeface="Segoe UI" panose="020B0502040204020203" pitchFamily="34" charset="0"/>
+              </a:rPr>
+              <a:t>развития</a:t>
+            </a:r>
+            <a:endParaRPr lang="ru-RU" sz="2400" i="1" dirty="0">
+              <a:solidFill>
+                <a:srgbClr val="002060"/>
+              </a:solidFill>
+              <a:latin typeface="+mj-lt"/>
+              <a:cs typeface="Segoe UI" panose="020B0502040204020203" pitchFamily="34" charset="0"/>
+            </a:endParaRPr>
           </a:p>
         </p:txBody>
       </p:sp>
@@ -8661,7 +8678,7 @@
                 <a16:creationId xmlns:a16="http://schemas.microsoft.com/office/drawing/2014/main" id="{C8431200-8E45-4A0C-B12B-CFA1B2C53C47}"/>
               </a:ext>
               <a:ext uri="{C183D7F6-B498-43B3-948B-1728B52AA6E4}">
-                <adec:decorative xmlns:adec="http://schemas.microsoft.com/office/drawing/2017/decorative" xmlns="" val="1"/>
+                <adec:decorative xmlns="" xmlns:adec="http://schemas.microsoft.com/office/drawing/2017/decorative" val="1"/>
               </a:ext>
             </a:extLst>
           </p:cNvPr>
@@ -8721,7 +8738,7 @@
                 <a16:creationId xmlns:a16="http://schemas.microsoft.com/office/drawing/2014/main" id="{241C7FC4-FEFA-4A96-9749-9068C68611EF}"/>
               </a:ext>
               <a:ext uri="{C183D7F6-B498-43B3-948B-1728B52AA6E4}">
-                <adec:decorative xmlns:adec="http://schemas.microsoft.com/office/drawing/2017/decorative" xmlns="" val="1"/>
+                <adec:decorative xmlns="" xmlns:adec="http://schemas.microsoft.com/office/drawing/2017/decorative" val="1"/>
               </a:ext>
             </a:extLst>
           </p:cNvPr>
@@ -8827,7 +8844,7 @@
                 <a16:creationId xmlns:a16="http://schemas.microsoft.com/office/drawing/2014/main" id="{294AEDC0-6B1D-4A3D-860D-83756CC387D3}"/>
               </a:ext>
               <a:ext uri="{C183D7F6-B498-43B3-948B-1728B52AA6E4}">
-                <adec:decorative xmlns:adec="http://schemas.microsoft.com/office/drawing/2017/decorative" xmlns="" val="1"/>
+                <adec:decorative xmlns="" xmlns:adec="http://schemas.microsoft.com/office/drawing/2017/decorative" val="1"/>
               </a:ext>
             </a:extLst>
           </p:cNvPr>
@@ -9569,7 +9586,7 @@
                 <a16:creationId xmlns:a16="http://schemas.microsoft.com/office/drawing/2014/main" id="{C8431200-8E45-4A0C-B12B-CFA1B2C53C47}"/>
               </a:ext>
               <a:ext uri="{C183D7F6-B498-43B3-948B-1728B52AA6E4}">
-                <adec:decorative xmlns:adec="http://schemas.microsoft.com/office/drawing/2017/decorative" xmlns="" val="1"/>
+                <adec:decorative xmlns="" xmlns:adec="http://schemas.microsoft.com/office/drawing/2017/decorative" val="1"/>
               </a:ext>
             </a:extLst>
           </p:cNvPr>
@@ -9629,7 +9646,7 @@
                 <a16:creationId xmlns:a16="http://schemas.microsoft.com/office/drawing/2014/main" id="{241C7FC4-FEFA-4A96-9749-9068C68611EF}"/>
               </a:ext>
               <a:ext uri="{C183D7F6-B498-43B3-948B-1728B52AA6E4}">
-                <adec:decorative xmlns:adec="http://schemas.microsoft.com/office/drawing/2017/decorative" xmlns="" val="1"/>
+                <adec:decorative xmlns="" xmlns:adec="http://schemas.microsoft.com/office/drawing/2017/decorative" val="1"/>
               </a:ext>
             </a:extLst>
           </p:cNvPr>
@@ -9745,7 +9762,7 @@
                 <a16:creationId xmlns:a16="http://schemas.microsoft.com/office/drawing/2014/main" id="{294AEDC0-6B1D-4A3D-860D-83756CC387D3}"/>
               </a:ext>
               <a:ext uri="{C183D7F6-B498-43B3-948B-1728B52AA6E4}">
-                <adec:decorative xmlns:adec="http://schemas.microsoft.com/office/drawing/2017/decorative" xmlns="" val="1"/>
+                <adec:decorative xmlns="" xmlns:adec="http://schemas.microsoft.com/office/drawing/2017/decorative" val="1"/>
               </a:ext>
             </a:extLst>
           </p:cNvPr>
@@ -10344,7 +10361,7 @@
                 <a16:creationId xmlns:a16="http://schemas.microsoft.com/office/drawing/2014/main" id="{D14F9816-D761-44CD-80AC-A13A6A2BF4F4}"/>
               </a:ext>
               <a:ext uri="{C183D7F6-B498-43B3-948B-1728B52AA6E4}">
-                <adec:decorative xmlns:adec="http://schemas.microsoft.com/office/drawing/2017/decorative" xmlns="" val="1"/>
+                <adec:decorative xmlns="" xmlns:adec="http://schemas.microsoft.com/office/drawing/2017/decorative" val="1"/>
               </a:ext>
             </a:extLst>
           </p:cNvPr>
@@ -11228,7 +11245,7 @@
                 <a16:creationId xmlns:a16="http://schemas.microsoft.com/office/drawing/2014/main" id="{E6D6E19C-DE46-4402-8CBF-17BB95458532}"/>
               </a:ext>
               <a:ext uri="{C183D7F6-B498-43B3-948B-1728B52AA6E4}">
-                <adec:decorative xmlns:adec="http://schemas.microsoft.com/office/drawing/2017/decorative" xmlns="" val="1"/>
+                <adec:decorative xmlns="" xmlns:adec="http://schemas.microsoft.com/office/drawing/2017/decorative" val="1"/>
               </a:ext>
             </a:extLst>
           </p:cNvPr>
@@ -11914,7 +11931,7 @@
                 <a16:creationId xmlns:a16="http://schemas.microsoft.com/office/drawing/2014/main" id="{3638C06D-F644-4B33-8858-D880F038FAC3}"/>
               </a:ext>
               <a:ext uri="{C183D7F6-B498-43B3-948B-1728B52AA6E4}">
-                <adec:decorative xmlns:adec="http://schemas.microsoft.com/office/drawing/2017/decorative" xmlns="" val="1"/>
+                <adec:decorative xmlns="" xmlns:adec="http://schemas.microsoft.com/office/drawing/2017/decorative" val="1"/>
               </a:ext>
             </a:extLst>
           </p:cNvPr>
@@ -13097,13 +13114,18 @@
             <a:p>
               <a:pPr algn="ctr" rtl="0"/>
               <a:r>
-                <a:rPr lang="ru-RU" sz="1200" dirty="0">
+                <a:rPr lang="ru-RU" sz="1200" dirty="0" smtClean="0">
                   <a:solidFill>
                     <a:schemeClr val="bg1"/>
                   </a:solidFill>
                 </a:rPr>
-                <a:t>МАРИНА</a:t>
+                <a:t>АННА</a:t>
               </a:r>
+              <a:endParaRPr lang="ru-RU" sz="1200" dirty="0">
+                <a:solidFill>
+                  <a:schemeClr val="bg1"/>
+                </a:solidFill>
+              </a:endParaRPr>
             </a:p>
           </p:txBody>
         </p:sp>
@@ -16186,6 +16208,16 @@
             <a:p>
               <a:pPr algn="ctr" rtl="0"/>
               <a:r>
+                <a:rPr lang="ru-RU" sz="1600" i="1" dirty="0" smtClean="0">
+                  <a:solidFill>
+                    <a:schemeClr val="bg1"/>
+                  </a:solidFill>
+                  <a:latin typeface="+mj-lt"/>
+                  <a:cs typeface="Segoe UI" panose="020B0502040204020203" pitchFamily="34" charset="0"/>
+                </a:rPr>
+                <a:t>Анна, </a:t>
+              </a:r>
+              <a:r>
                 <a:rPr lang="ru-RU" sz="1600" i="1" dirty="0">
                   <a:solidFill>
                     <a:schemeClr val="bg1"/>
@@ -16193,7 +16225,7 @@
                   <a:latin typeface="+mj-lt"/>
                   <a:cs typeface="Segoe UI" panose="020B0502040204020203" pitchFamily="34" charset="0"/>
                 </a:rPr>
-                <a:t>Марина, что там по уведомлениям?</a:t>
+                <a:t>что там по уведомлениям?</a:t>
               </a:r>
             </a:p>
           </p:txBody>
@@ -17006,6 +17038,16 @@
             <a:p>
               <a:pPr algn="ctr" rtl="0"/>
               <a:r>
+                <a:rPr lang="ru-RU" sz="1600" i="1" dirty="0" smtClean="0">
+                  <a:solidFill>
+                    <a:schemeClr val="bg1"/>
+                  </a:solidFill>
+                  <a:latin typeface="+mj-lt"/>
+                  <a:cs typeface="Segoe UI" panose="020B0502040204020203" pitchFamily="34" charset="0"/>
+                </a:rPr>
+                <a:t>Анют, </a:t>
+              </a:r>
+              <a:r>
                 <a:rPr lang="ru-RU" sz="1600" i="1" dirty="0">
                   <a:solidFill>
                     <a:schemeClr val="bg1"/>
@@ -17013,7 +17055,7 @@
                   <a:latin typeface="+mj-lt"/>
                   <a:cs typeface="Segoe UI" panose="020B0502040204020203" pitchFamily="34" charset="0"/>
                 </a:rPr>
-                <a:t>Марина, сколько моих подруг уже вышло замуж?</a:t>
+                <a:t>сколько моих подруг уже вышло замуж?</a:t>
               </a:r>
             </a:p>
           </p:txBody>
@@ -17047,6 +17089,16 @@
             <a:p>
               <a:pPr algn="ctr" rtl="0"/>
               <a:r>
+                <a:rPr lang="ru-RU" sz="1600" i="1" dirty="0" smtClean="0">
+                  <a:solidFill>
+                    <a:schemeClr val="bg1"/>
+                  </a:solidFill>
+                  <a:latin typeface="+mj-lt"/>
+                  <a:cs typeface="Segoe UI" panose="020B0502040204020203" pitchFamily="34" charset="0"/>
+                </a:rPr>
+                <a:t>Ань, </a:t>
+              </a:r>
+              <a:r>
                 <a:rPr lang="ru-RU" sz="1600" i="1" dirty="0">
                   <a:solidFill>
                     <a:schemeClr val="bg1"/>
@@ -17054,7 +17106,7 @@
                   <a:latin typeface="+mj-lt"/>
                   <a:cs typeface="Segoe UI" panose="020B0502040204020203" pitchFamily="34" charset="0"/>
                 </a:rPr>
-                <a:t>Марина, прочитай новые сообщения</a:t>
+                <a:t>прочитай новые сообщения</a:t>
               </a:r>
             </a:p>
           </p:txBody>
@@ -17114,7 +17166,7 @@
                 <a16:creationId xmlns:a16="http://schemas.microsoft.com/office/drawing/2014/main" id="{6D08E99A-0644-4757-9F3A-BBA1A4F39081}"/>
               </a:ext>
               <a:ext uri="{C183D7F6-B498-43B3-948B-1728B52AA6E4}">
-                <adec:decorative xmlns:adec="http://schemas.microsoft.com/office/drawing/2017/decorative" xmlns="" val="1"/>
+                <adec:decorative xmlns="" xmlns:adec="http://schemas.microsoft.com/office/drawing/2017/decorative" val="1"/>
               </a:ext>
             </a:extLst>
           </p:cNvPr>
@@ -17160,7 +17212,7 @@
                 <a16:creationId xmlns:a16="http://schemas.microsoft.com/office/drawing/2014/main" id="{A21B85DB-181D-46E7-A9DF-F92B1DF032FD}"/>
               </a:ext>
               <a:ext uri="{C183D7F6-B498-43B3-948B-1728B52AA6E4}">
-                <adec:decorative xmlns:adec="http://schemas.microsoft.com/office/drawing/2017/decorative" xmlns="" val="1"/>
+                <adec:decorative xmlns="" xmlns:adec="http://schemas.microsoft.com/office/drawing/2017/decorative" val="1"/>
               </a:ext>
             </a:extLst>
           </p:cNvPr>
@@ -17241,6 +17293,16 @@
           <a:p>
             <a:pPr rtl="0"/>
             <a:r>
+              <a:rPr lang="ru-RU" sz="1600" i="1" dirty="0" smtClean="0">
+                <a:solidFill>
+                  <a:srgbClr val="002060"/>
+                </a:solidFill>
+                <a:latin typeface="+mj-lt"/>
+                <a:cs typeface="Segoe UI" panose="020B0502040204020203" pitchFamily="34" charset="0"/>
+              </a:rPr>
+              <a:t>Анька, </a:t>
+            </a:r>
+            <a:r>
               <a:rPr lang="ru-RU" sz="1600" i="1" dirty="0">
                 <a:solidFill>
                   <a:srgbClr val="002060"/>
@@ -17248,7 +17310,7 @@
                 <a:latin typeface="+mj-lt"/>
                 <a:cs typeface="Segoe UI" panose="020B0502040204020203" pitchFamily="34" charset="0"/>
               </a:rPr>
-              <a:t>Марина, пора развиваться!</a:t>
+              <a:t>пора развиваться!</a:t>
             </a:r>
           </a:p>
         </p:txBody>
@@ -17261,7 +17323,7 @@
                 <a16:creationId xmlns:a16="http://schemas.microsoft.com/office/drawing/2014/main" id="{0B8C9A86-3574-4A2E-BC62-481A2BE7FBED}"/>
               </a:ext>
               <a:ext uri="{C183D7F6-B498-43B3-948B-1728B52AA6E4}">
-                <adec:decorative xmlns:adec="http://schemas.microsoft.com/office/drawing/2017/decorative" xmlns="" val="1"/>
+                <adec:decorative xmlns="" xmlns:adec="http://schemas.microsoft.com/office/drawing/2017/decorative" val="1"/>
               </a:ext>
             </a:extLst>
           </p:cNvPr>
@@ -17326,9 +17388,9 @@
         <p:grpSpPr>
           <a:xfrm>
             <a:off x="7319810" y="3566010"/>
-            <a:ext cx="3067397" cy="738664"/>
+            <a:ext cx="3067397" cy="492443"/>
             <a:chOff x="7999616" y="3566010"/>
-            <a:chExt cx="3067397" cy="738664"/>
+            <a:chExt cx="3067397" cy="492443"/>
           </a:xfrm>
         </p:grpSpPr>
         <p:sp>
@@ -17346,7 +17408,7 @@
           <p:spPr>
             <a:xfrm>
               <a:off x="8578718" y="3566010"/>
-              <a:ext cx="2488295" cy="738664"/>
+              <a:ext cx="2488295" cy="492443"/>
             </a:xfrm>
             <a:prstGeom prst="rect">
               <a:avLst/>
@@ -17360,6 +17422,16 @@
             <a:p>
               <a:pPr rtl="0"/>
               <a:r>
+                <a:rPr lang="ru-RU" sz="1600" i="1" dirty="0" smtClean="0">
+                  <a:solidFill>
+                    <a:srgbClr val="002060"/>
+                  </a:solidFill>
+                  <a:latin typeface="+mj-lt"/>
+                  <a:cs typeface="Segoe UI" panose="020B0502040204020203" pitchFamily="34" charset="0"/>
+                </a:rPr>
+                <a:t>Аня </a:t>
+              </a:r>
+              <a:r>
                 <a:rPr lang="ru-RU" sz="1600" i="1" dirty="0">
                   <a:solidFill>
                     <a:srgbClr val="002060"/>
@@ -17367,7 +17439,7 @@
                   <a:latin typeface="+mj-lt"/>
                   <a:cs typeface="Segoe UI" panose="020B0502040204020203" pitchFamily="34" charset="0"/>
                 </a:rPr>
-                <a:t>Марина поможет вам узнать, что там нового у людей</a:t>
+                <a:t>поможет вам узнать, что там нового у людей</a:t>
               </a:r>
             </a:p>
           </p:txBody>
@@ -19801,6 +19873,16 @@
             <a:p>
               <a:pPr rtl="0"/>
               <a:r>
+                <a:rPr lang="ru-RU" sz="1600" i="1" dirty="0" smtClean="0">
+                  <a:solidFill>
+                    <a:srgbClr val="002060"/>
+                  </a:solidFill>
+                  <a:latin typeface="+mj-lt"/>
+                  <a:cs typeface="Segoe UI" panose="020B0502040204020203" pitchFamily="34" charset="0"/>
+                </a:rPr>
+                <a:t>Аня </a:t>
+              </a:r>
+              <a:r>
                 <a:rPr lang="ru-RU" sz="1600" i="1" dirty="0">
                   <a:solidFill>
                     <a:srgbClr val="002060"/>
@@ -19808,7 +19890,7 @@
                   <a:latin typeface="+mj-lt"/>
                   <a:cs typeface="Segoe UI" panose="020B0502040204020203" pitchFamily="34" charset="0"/>
                 </a:rPr>
-                <a:t>Марина может прочитать и отправить сообщения</a:t>
+                <a:t>может прочитать и отправить сообщения</a:t>
               </a:r>
             </a:p>
           </p:txBody>
@@ -20674,6 +20756,16 @@
             <a:p>
               <a:pPr rtl="0"/>
               <a:r>
+                <a:rPr lang="ru-RU" sz="1600" i="1" dirty="0" smtClean="0">
+                  <a:solidFill>
+                    <a:srgbClr val="002060"/>
+                  </a:solidFill>
+                  <a:latin typeface="+mj-lt"/>
+                  <a:cs typeface="Segoe UI" panose="020B0502040204020203" pitchFamily="34" charset="0"/>
+                </a:rPr>
+                <a:t>Аня </a:t>
+              </a:r>
+              <a:r>
                 <a:rPr lang="ru-RU" sz="1600" i="1" dirty="0">
                   <a:solidFill>
                     <a:srgbClr val="002060"/>
@@ -20681,7 +20773,7 @@
                   <a:latin typeface="+mj-lt"/>
                   <a:cs typeface="Segoe UI" panose="020B0502040204020203" pitchFamily="34" charset="0"/>
                 </a:rPr>
-                <a:t>Марина анализирует ваши данные и выдаёт нужный ответ</a:t>
+                <a:t>анализирует ваши данные и выдаёт нужный ответ</a:t>
               </a:r>
             </a:p>
           </p:txBody>
@@ -20940,7 +21032,7 @@
                 <a16:creationId xmlns:a16="http://schemas.microsoft.com/office/drawing/2014/main" id="{2D732C95-5F88-4013-B13B-3A9F05760413}"/>
               </a:ext>
               <a:ext uri="{C183D7F6-B498-43B3-948B-1728B52AA6E4}">
-                <adec:decorative xmlns:adec="http://schemas.microsoft.com/office/drawing/2017/decorative" xmlns="" val="1"/>
+                <adec:decorative xmlns="" xmlns:adec="http://schemas.microsoft.com/office/drawing/2017/decorative" val="1"/>
               </a:ext>
             </a:extLst>
           </p:cNvPr>
@@ -21043,7 +21135,7 @@
                     <a16:creationId xmlns:a16="http://schemas.microsoft.com/office/drawing/2014/main" id="{F7F9128D-E30C-4733-AE4B-3863B632AE0A}"/>
                   </a:ext>
                   <a:ext uri="{C183D7F6-B498-43B3-948B-1728B52AA6E4}">
-                    <adec:decorative xmlns:adec="http://schemas.microsoft.com/office/drawing/2017/decorative" xmlns="" val="1"/>
+                    <adec:decorative xmlns="" xmlns:adec="http://schemas.microsoft.com/office/drawing/2017/decorative" val="1"/>
                   </a:ext>
                 </a:extLst>
               </p:cNvPr>
@@ -21195,7 +21287,7 @@
                     <a16:creationId xmlns:a16="http://schemas.microsoft.com/office/drawing/2014/main" id="{AD9B3B86-FE3B-4F92-A920-9858B368D411}"/>
                   </a:ext>
                   <a:ext uri="{C183D7F6-B498-43B3-948B-1728B52AA6E4}">
-                    <adec:decorative xmlns:adec="http://schemas.microsoft.com/office/drawing/2017/decorative" xmlns="" val="1"/>
+                    <adec:decorative xmlns="" xmlns:adec="http://schemas.microsoft.com/office/drawing/2017/decorative" val="1"/>
                   </a:ext>
                 </a:extLst>
               </p:cNvPr>
@@ -21347,7 +21439,7 @@
                     <a16:creationId xmlns:a16="http://schemas.microsoft.com/office/drawing/2014/main" id="{0DDE19D2-9433-4660-BEFC-0A90ABFBACB5}"/>
                   </a:ext>
                   <a:ext uri="{C183D7F6-B498-43B3-948B-1728B52AA6E4}">
-                    <adec:decorative xmlns:adec="http://schemas.microsoft.com/office/drawing/2017/decorative" xmlns="" val="1"/>
+                    <adec:decorative xmlns="" xmlns:adec="http://schemas.microsoft.com/office/drawing/2017/decorative" val="1"/>
                   </a:ext>
                 </a:extLst>
               </p:cNvPr>
@@ -28124,7 +28216,7 @@
                 <a16:creationId xmlns:a16="http://schemas.microsoft.com/office/drawing/2014/main" id="{D14F9816-D761-44CD-80AC-A13A6A2BF4F4}"/>
               </a:ext>
               <a:ext uri="{C183D7F6-B498-43B3-948B-1728B52AA6E4}">
-                <adec:decorative xmlns:adec="http://schemas.microsoft.com/office/drawing/2017/decorative" xmlns="" val="1"/>
+                <adec:decorative xmlns="" xmlns:adec="http://schemas.microsoft.com/office/drawing/2017/decorative" val="1"/>
               </a:ext>
             </a:extLst>
           </p:cNvPr>
@@ -29005,7 +29097,7 @@
         <p:spPr>
           <a:xfrm>
             <a:off x="6111140" y="3947621"/>
-            <a:ext cx="5318859" cy="1107996"/>
+            <a:ext cx="5318859" cy="1846659"/>
           </a:xfrm>
           <a:prstGeom prst="rect">
             <a:avLst/>
@@ -29025,11 +29117,76 @@
                 <a:latin typeface="+mj-lt"/>
                 <a:cs typeface="Segoe UI" panose="020B0502040204020203" pitchFamily="34" charset="0"/>
               </a:rPr>
-              <a:t>«Знаний недостаточно, ты должен применять их. Желаний недостаточно, ты должен делать» Брюс Ли</a:t>
+              <a:t>«</a:t>
             </a:r>
-            <a:endParaRPr lang="ru-RU" sz="2400" i="1" dirty="0">
+            <a:r>
+              <a:rPr lang="ru-RU" sz="2400" i="1" dirty="0" smtClean="0">
+                <a:solidFill>
+                  <a:srgbClr val="030553"/>
+                </a:solidFill>
+                <a:latin typeface="+mj-lt"/>
+              </a:rPr>
+              <a:t>Не</a:t>
+            </a:r>
+            <a:r>
+              <a:rPr lang="ru-RU" dirty="0" smtClean="0">
+                <a:solidFill>
+                  <a:srgbClr val="030553"/>
+                </a:solidFill>
+              </a:rPr>
+              <a:t> </a:t>
+            </a:r>
+            <a:r>
+              <a:rPr lang="ru-RU" sz="2400" i="1" dirty="0">
+                <a:solidFill>
+                  <a:srgbClr val="030553"/>
+                </a:solidFill>
+                <a:latin typeface="+mj-lt"/>
+              </a:rPr>
+              <a:t>нужно доказывать, что образование – самое великое благо для человека. Без образования люди и грубы, и бедны, и </a:t>
+            </a:r>
+            <a:r>
+              <a:rPr lang="ru-RU" sz="2400" i="1" dirty="0" smtClean="0">
+                <a:solidFill>
+                  <a:srgbClr val="030553"/>
+                </a:solidFill>
+                <a:latin typeface="+mj-lt"/>
+              </a:rPr>
+              <a:t>несчастны</a:t>
+            </a:r>
+            <a:r>
+              <a:rPr lang="ru-RU" sz="2400" i="1" dirty="0" smtClean="0">
+                <a:solidFill>
+                  <a:srgbClr val="002060"/>
+                </a:solidFill>
+                <a:latin typeface="+mj-lt"/>
+                <a:cs typeface="Segoe UI" panose="020B0502040204020203" pitchFamily="34" charset="0"/>
+              </a:rPr>
+              <a:t>»</a:t>
+            </a:r>
+          </a:p>
+          <a:p>
+            <a:r>
+              <a:rPr lang="ru-RU" sz="2400" i="1" u="sng" dirty="0" smtClean="0">
+                <a:solidFill>
+                  <a:srgbClr val="030553"/>
+                </a:solidFill>
+                <a:latin typeface="+mj-lt"/>
+              </a:rPr>
+              <a:t>Николай </a:t>
+            </a:r>
+            <a:r>
+              <a:rPr lang="ru-RU" sz="2400" i="1" u="sng" dirty="0">
+                <a:solidFill>
+                  <a:srgbClr val="030553"/>
+                </a:solidFill>
+                <a:latin typeface="+mj-lt"/>
+              </a:rPr>
+              <a:t>Чернышевский</a:t>
+            </a:r>
+            <a:endParaRPr lang="ru-RU" sz="3200" i="1" u="sng" dirty="0">
               <a:solidFill>
-                <a:srgbClr val="002060"/>
+                <a:srgbClr val="030553"/>
               </a:solidFill>
               <a:latin typeface="+mj-lt"/>
               <a:cs typeface="Segoe UI" panose="020B0502040204020203" pitchFamily="34" charset="0"/>
@@ -29082,7 +29239,7 @@
                 <a16:creationId xmlns:a16="http://schemas.microsoft.com/office/drawing/2014/main" id="{B38D4B56-7D6C-4345-912F-B3BA9A014E8B}"/>
               </a:ext>
               <a:ext uri="{C183D7F6-B498-43B3-948B-1728B52AA6E4}">
-                <adec:decorative xmlns:adec="http://schemas.microsoft.com/office/drawing/2017/decorative" xmlns="" val="1"/>
+                <adec:decorative xmlns="" xmlns:adec="http://schemas.microsoft.com/office/drawing/2017/decorative" val="1"/>
               </a:ext>
             </a:extLst>
           </p:cNvPr>
@@ -29128,7 +29285,7 @@
                 <a16:creationId xmlns:a16="http://schemas.microsoft.com/office/drawing/2014/main" id="{B457331C-2A24-4352-9B4C-1C1B326F404F}"/>
               </a:ext>
               <a:ext uri="{C183D7F6-B498-43B3-948B-1728B52AA6E4}">
-                <adec:decorative xmlns:adec="http://schemas.microsoft.com/office/drawing/2017/decorative" xmlns="" val="1"/>
+                <adec:decorative xmlns="" xmlns:adec="http://schemas.microsoft.com/office/drawing/2017/decorative" val="1"/>
               </a:ext>
             </a:extLst>
           </p:cNvPr>
@@ -29137,10 +29294,10 @@
         </p:nvGrpSpPr>
         <p:grpSpPr>
           <a:xfrm>
-            <a:off x="802096" y="1163885"/>
-            <a:ext cx="4251078" cy="3858691"/>
+            <a:off x="802096" y="1653543"/>
+            <a:ext cx="4251078" cy="3550915"/>
             <a:chOff x="518433" y="1757501"/>
-            <a:chExt cx="4251078" cy="3858691"/>
+            <a:chExt cx="4251078" cy="3550915"/>
           </a:xfrm>
         </p:grpSpPr>
         <p:grpSp>
@@ -29536,9 +29693,9 @@
           <p:grpSpPr>
             <a:xfrm>
               <a:off x="518433" y="5000639"/>
-              <a:ext cx="4251078" cy="615553"/>
+              <a:ext cx="4251078" cy="307777"/>
               <a:chOff x="518433" y="4536750"/>
-              <a:chExt cx="4251078" cy="615553"/>
+              <a:chExt cx="4251078" cy="307777"/>
             </a:xfrm>
           </p:grpSpPr>
           <p:sp>
@@ -29613,7 +29770,7 @@
             <p:spPr>
               <a:xfrm>
                 <a:off x="1233316" y="4536750"/>
-                <a:ext cx="3536195" cy="615553"/>
+                <a:ext cx="3536195" cy="307777"/>
               </a:xfrm>
               <a:prstGeom prst="rect">
                 <a:avLst/>
@@ -29625,24 +29782,15 @@
               </a:bodyPr>
               <a:lstStyle/>
               <a:p>
-                <a:pPr rtl="0"/>
                 <a:r>
-                  <a:rPr lang="ru-RU" sz="2000" i="1" dirty="0" smtClean="0">
+                  <a:rPr lang="ru-RU" sz="2000" i="1" dirty="0">
                     <a:solidFill>
                       <a:srgbClr val="002060"/>
                     </a:solidFill>
-                    <a:latin typeface="+mj-lt"/>
                     <a:cs typeface="Segoe UI" panose="020B0502040204020203" pitchFamily="34" charset="0"/>
                   </a:rPr>
-                  <a:t>Продукт с финансовой точки зрения</a:t>
+                  <a:t>В перспективное будущее</a:t>
                 </a:r>
-                <a:endParaRPr lang="ru-RU" sz="2000" i="1" dirty="0">
-                  <a:solidFill>
-                    <a:srgbClr val="002060"/>
-                  </a:solidFill>
-                  <a:latin typeface="+mj-lt"/>
-                  <a:cs typeface="Segoe UI" panose="020B0502040204020203" pitchFamily="34" charset="0"/>
-                </a:endParaRPr>
               </a:p>
             </p:txBody>
           </p:sp>
@@ -29656,7 +29804,7 @@
                 <a16:creationId xmlns:a16="http://schemas.microsoft.com/office/drawing/2014/main" id="{E7D1D117-BC5C-430A-9FEB-B231E691511F}"/>
               </a:ext>
               <a:ext uri="{C183D7F6-B498-43B3-948B-1728B52AA6E4}">
-                <adec:decorative xmlns:adec="http://schemas.microsoft.com/office/drawing/2017/decorative" xmlns="" val="1"/>
+                <adec:decorative xmlns="" xmlns:adec="http://schemas.microsoft.com/office/drawing/2017/decorative" val="1"/>
               </a:ext>
             </a:extLst>
           </p:cNvPr>
@@ -29714,7 +29862,7 @@
                 <a16:creationId xmlns:a16="http://schemas.microsoft.com/office/drawing/2014/main" id="{2577E8EA-5E95-41C5-8BE8-EE647DE2613A}"/>
               </a:ext>
               <a:ext uri="{C183D7F6-B498-43B3-948B-1728B52AA6E4}">
-                <adec:decorative xmlns:adec="http://schemas.microsoft.com/office/drawing/2017/decorative" xmlns="" val="1"/>
+                <adec:decorative xmlns="" xmlns:adec="http://schemas.microsoft.com/office/drawing/2017/decorative" val="1"/>
               </a:ext>
             </a:extLst>
           </p:cNvPr>
@@ -33597,111 +33745,6 @@
           </a:p>
         </p:txBody>
       </p:sp>
-      <p:sp>
-        <p:nvSpPr>
-          <p:cNvPr id="36" name="Прямоугольник: Скругленные углы 12">
-            <a:extLst>
-              <a:ext uri="{FF2B5EF4-FFF2-40B4-BE49-F238E27FC236}">
-                <a16:creationId xmlns:a16="http://schemas.microsoft.com/office/drawing/2014/main" id="{64E3D015-D1E6-40C0-B820-5D2B0144652D}"/>
-              </a:ext>
-            </a:extLst>
-          </p:cNvPr>
-          <p:cNvSpPr/>
-          <p:nvPr/>
-        </p:nvSpPr>
-        <p:spPr>
-          <a:xfrm>
-            <a:off x="766606" y="5555009"/>
-            <a:ext cx="443592" cy="232296"/>
-          </a:xfrm>
-          <a:prstGeom prst="roundRect">
-            <a:avLst>
-              <a:gd name="adj" fmla="val 50000"/>
-            </a:avLst>
-          </a:prstGeom>
-          <a:noFill/>
-          <a:ln>
-            <a:solidFill>
-              <a:schemeClr val="tx1">
-                <a:lumMod val="75000"/>
-                <a:lumOff val="25000"/>
-              </a:schemeClr>
-            </a:solidFill>
-          </a:ln>
-        </p:spPr>
-        <p:style>
-          <a:lnRef idx="2">
-            <a:schemeClr val="accent1">
-              <a:shade val="50000"/>
-            </a:schemeClr>
-          </a:lnRef>
-          <a:fillRef idx="1">
-            <a:schemeClr val="accent1"/>
-          </a:fillRef>
-          <a:effectRef idx="0">
-            <a:schemeClr val="accent1"/>
-          </a:effectRef>
-          <a:fontRef idx="minor">
-            <a:schemeClr val="lt1"/>
-          </a:fontRef>
-        </p:style>
-        <p:txBody>
-          <a:bodyPr rtlCol="0" anchor="ctr"/>
-          <a:lstStyle/>
-          <a:p>
-            <a:pPr algn="ctr" rtl="0"/>
-            <a:endParaRPr lang="ru-RU" dirty="0"/>
-          </a:p>
-        </p:txBody>
-      </p:sp>
-      <p:sp>
-        <p:nvSpPr>
-          <p:cNvPr id="37" name="Прямоугольник 36">
-            <a:extLst>
-              <a:ext uri="{FF2B5EF4-FFF2-40B4-BE49-F238E27FC236}">
-                <a16:creationId xmlns:a16="http://schemas.microsoft.com/office/drawing/2014/main" id="{9187696D-0387-46E9-A420-AD2392161D95}"/>
-              </a:ext>
-            </a:extLst>
-          </p:cNvPr>
-          <p:cNvSpPr/>
-          <p:nvPr/>
-        </p:nvSpPr>
-        <p:spPr>
-          <a:xfrm>
-            <a:off x="1481489" y="5483426"/>
-            <a:ext cx="3536195" cy="307777"/>
-          </a:xfrm>
-          <a:prstGeom prst="rect">
-            <a:avLst/>
-          </a:prstGeom>
-        </p:spPr>
-        <p:txBody>
-          <a:bodyPr wrap="square" lIns="0" tIns="0" rIns="0" bIns="0" rtlCol="0">
-            <a:spAutoFit/>
-          </a:bodyPr>
-          <a:lstStyle/>
-          <a:p>
-            <a:pPr rtl="0"/>
-            <a:r>
-              <a:rPr lang="ru-RU" sz="2000" i="1" dirty="0" smtClean="0">
-                <a:solidFill>
-                  <a:srgbClr val="002060"/>
-                </a:solidFill>
-                <a:latin typeface="+mj-lt"/>
-                <a:cs typeface="Segoe UI" panose="020B0502040204020203" pitchFamily="34" charset="0"/>
-              </a:rPr>
-              <a:t>В перспективное будущее</a:t>
-            </a:r>
-            <a:endParaRPr lang="ru-RU" sz="2000" i="1" dirty="0">
-              <a:solidFill>
-                <a:srgbClr val="002060"/>
-              </a:solidFill>
-              <a:latin typeface="+mj-lt"/>
-              <a:cs typeface="Segoe UI" panose="020B0502040204020203" pitchFamily="34" charset="0"/>
-            </a:endParaRPr>
-          </a:p>
-        </p:txBody>
-      </p:sp>
     </p:spTree>
     <p:extLst>
       <p:ext uri="{BB962C8B-B14F-4D97-AF65-F5344CB8AC3E}">
@@ -33741,13 +33784,13 @@
       </p:grpSpPr>
       <p:sp>
         <p:nvSpPr>
-          <p:cNvPr id="61" name="Полилиния 6">
+          <p:cNvPr id="43" name="Полилиния 6">
             <a:extLst>
               <a:ext uri="{FF2B5EF4-FFF2-40B4-BE49-F238E27FC236}">
-                <a16:creationId xmlns:a16="http://schemas.microsoft.com/office/drawing/2014/main" id="{D83BBA1A-1810-4171-BD9C-B27B7C26AF70}"/>
+                <a16:creationId xmlns:a16="http://schemas.microsoft.com/office/drawing/2014/main" id="{7F192ACD-9C75-481C-8934-C15F525ED96C}"/>
               </a:ext>
               <a:ext uri="{C183D7F6-B498-43B3-948B-1728B52AA6E4}">
-                <adec:decorative xmlns:adec="http://schemas.microsoft.com/office/drawing/2017/decorative" xmlns="" val="1"/>
+                <adec:decorative xmlns="" xmlns:adec="http://schemas.microsoft.com/office/drawing/2017/decorative" val="1"/>
               </a:ext>
             </a:extLst>
           </p:cNvPr>
@@ -33757,7 +33800,157 @@
           <p:nvPr/>
         </p:nvSpPr>
         <p:spPr bwMode="auto">
-          <a:xfrm>
+          <a:xfrm flipH="1">
+            <a:off x="935760" y="3327325"/>
+            <a:ext cx="1583456" cy="1740563"/>
+          </a:xfrm>
+          <a:custGeom>
+            <a:avLst/>
+            <a:gdLst>
+              <a:gd name="T0" fmla="*/ 223 w 322"/>
+              <a:gd name="T1" fmla="*/ 21 h 353"/>
+              <a:gd name="T2" fmla="*/ 113 w 322"/>
+              <a:gd name="T3" fmla="*/ 52 h 353"/>
+              <a:gd name="T4" fmla="*/ 14 w 322"/>
+              <a:gd name="T5" fmla="*/ 172 h 353"/>
+              <a:gd name="T6" fmla="*/ 119 w 322"/>
+              <a:gd name="T7" fmla="*/ 327 h 353"/>
+              <a:gd name="T8" fmla="*/ 320 w 322"/>
+              <a:gd name="T9" fmla="*/ 183 h 353"/>
+              <a:gd name="T10" fmla="*/ 287 w 322"/>
+              <a:gd name="T11" fmla="*/ 56 h 353"/>
+              <a:gd name="T12" fmla="*/ 223 w 322"/>
+              <a:gd name="T13" fmla="*/ 21 h 353"/>
+            </a:gdLst>
+            <a:ahLst/>
+            <a:cxnLst>
+              <a:cxn ang="0">
+                <a:pos x="T0" y="T1"/>
+              </a:cxn>
+              <a:cxn ang="0">
+                <a:pos x="T2" y="T3"/>
+              </a:cxn>
+              <a:cxn ang="0">
+                <a:pos x="T4" y="T5"/>
+              </a:cxn>
+              <a:cxn ang="0">
+                <a:pos x="T6" y="T7"/>
+              </a:cxn>
+              <a:cxn ang="0">
+                <a:pos x="T8" y="T9"/>
+              </a:cxn>
+              <a:cxn ang="0">
+                <a:pos x="T10" y="T11"/>
+              </a:cxn>
+              <a:cxn ang="0">
+                <a:pos x="T12" y="T13"/>
+              </a:cxn>
+            </a:cxnLst>
+            <a:rect l="0" t="0" r="r" b="b"/>
+            <a:pathLst>
+              <a:path w="322" h="353">
+                <a:moveTo>
+                  <a:pt x="223" y="21"/>
+                </a:moveTo>
+                <a:cubicBezTo>
+                  <a:pt x="198" y="35"/>
+                  <a:pt x="187" y="48"/>
+                  <a:pt x="113" y="52"/>
+                </a:cubicBezTo>
+                <a:cubicBezTo>
+                  <a:pt x="39" y="57"/>
+                  <a:pt x="0" y="118"/>
+                  <a:pt x="14" y="172"/>
+                </a:cubicBezTo>
+                <a:cubicBezTo>
+                  <a:pt x="28" y="226"/>
+                  <a:pt x="32" y="301"/>
+                  <a:pt x="119" y="327"/>
+                </a:cubicBezTo>
+                <a:cubicBezTo>
+                  <a:pt x="206" y="353"/>
+                  <a:pt x="316" y="282"/>
+                  <a:pt x="320" y="183"/>
+                </a:cubicBezTo>
+                <a:cubicBezTo>
+                  <a:pt x="322" y="124"/>
+                  <a:pt x="306" y="88"/>
+                  <a:pt x="287" y="56"/>
+                </a:cubicBezTo>
+                <a:cubicBezTo>
+                  <a:pt x="274" y="35"/>
+                  <a:pt x="259" y="0"/>
+                  <a:pt x="223" y="21"/>
+                </a:cubicBezTo>
+                <a:close/>
+              </a:path>
+            </a:pathLst>
+          </a:custGeom>
+          <a:gradFill>
+            <a:gsLst>
+              <a:gs pos="1000">
+                <a:srgbClr val="7CEFD8">
+                  <a:alpha val="79000"/>
+                </a:srgbClr>
+              </a:gs>
+              <a:gs pos="61000">
+                <a:srgbClr val="6672E4">
+                  <a:alpha val="84000"/>
+                </a:srgbClr>
+              </a:gs>
+              <a:gs pos="98000">
+                <a:srgbClr val="882BE5">
+                  <a:alpha val="66000"/>
+                </a:srgbClr>
+              </a:gs>
+            </a:gsLst>
+            <a:lin ang="5400000" scaled="1"/>
+          </a:gradFill>
+          <a:ln w="12700" cap="flat">
+            <a:noFill/>
+            <a:prstDash val="solid"/>
+            <a:miter lim="800000"/>
+            <a:headEnd/>
+            <a:tailEnd/>
+          </a:ln>
+        </p:spPr>
+        <p:txBody>
+          <a:bodyPr rot="0" spcFirstLastPara="0" vertOverflow="overflow" horzOverflow="overflow" vert="horz" wrap="square" lIns="91440" tIns="45720" rIns="91440" bIns="45720" numCol="1" spcCol="0" rtlCol="0" fromWordArt="0" anchor="t" anchorCtr="0" forceAA="0" compatLnSpc="1">
+            <a:prstTxWarp prst="textNoShape">
+              <a:avLst/>
+            </a:prstTxWarp>
+            <a:noAutofit/>
+          </a:bodyPr>
+          <a:lstStyle/>
+          <a:p>
+            <a:pPr rtl="0"/>
+            <a:endParaRPr lang="ru-RU" dirty="0">
+              <a:solidFill>
+                <a:schemeClr val="tx1"/>
+              </a:solidFill>
+            </a:endParaRPr>
+          </a:p>
+        </p:txBody>
+      </p:sp>
+      <p:sp>
+        <p:nvSpPr>
+          <p:cNvPr id="61" name="Полилиния 6">
+            <a:extLst>
+              <a:ext uri="{FF2B5EF4-FFF2-40B4-BE49-F238E27FC236}">
+                <a16:creationId xmlns:a16="http://schemas.microsoft.com/office/drawing/2014/main" id="{D83BBA1A-1810-4171-BD9C-B27B7C26AF70}"/>
+              </a:ext>
+              <a:ext uri="{C183D7F6-B498-43B3-948B-1728B52AA6E4}">
+                <adec:decorative xmlns="" xmlns:adec="http://schemas.microsoft.com/office/drawing/2017/decorative" val="1"/>
+              </a:ext>
+            </a:extLst>
+          </p:cNvPr>
+          <p:cNvSpPr>
+            <a:spLocks/>
+          </p:cNvSpPr>
+          <p:nvPr/>
+        </p:nvSpPr>
+        <p:spPr bwMode="auto">
+          <a:xfrm rot="5400000">
             <a:off x="7081393" y="3443407"/>
             <a:ext cx="1371600" cy="1508400"/>
           </a:xfrm>
@@ -33897,7 +34090,7 @@
                 <a16:creationId xmlns:a16="http://schemas.microsoft.com/office/drawing/2014/main" id="{2D409DD0-6B30-47E3-9886-F8F16D42AB79}"/>
               </a:ext>
               <a:ext uri="{C183D7F6-B498-43B3-948B-1728B52AA6E4}">
-                <adec:decorative xmlns:adec="http://schemas.microsoft.com/office/drawing/2017/decorative" xmlns="" val="1"/>
+                <adec:decorative xmlns="" xmlns:adec="http://schemas.microsoft.com/office/drawing/2017/decorative" val="1"/>
               </a:ext>
             </a:extLst>
           </p:cNvPr>
@@ -33907,7 +34100,7 @@
           <p:nvPr/>
         </p:nvSpPr>
         <p:spPr bwMode="auto">
-          <a:xfrm>
+          <a:xfrm rot="16200000">
             <a:off x="8937925" y="3447842"/>
             <a:ext cx="1371600" cy="1508400"/>
           </a:xfrm>
@@ -34047,7 +34240,7 @@
                 <a16:creationId xmlns:a16="http://schemas.microsoft.com/office/drawing/2014/main" id="{8B1A45F7-385D-4B67-98E4-489AB4E31714}"/>
               </a:ext>
               <a:ext uri="{C183D7F6-B498-43B3-948B-1728B52AA6E4}">
-                <adec:decorative xmlns:adec="http://schemas.microsoft.com/office/drawing/2017/decorative" xmlns="" val="1"/>
+                <adec:decorative xmlns="" xmlns:adec="http://schemas.microsoft.com/office/drawing/2017/decorative" val="1"/>
               </a:ext>
             </a:extLst>
           </p:cNvPr>
@@ -34197,7 +34390,7 @@
                 <a16:creationId xmlns:a16="http://schemas.microsoft.com/office/drawing/2014/main" id="{7F192ACD-9C75-481C-8934-C15F525ED96C}"/>
               </a:ext>
               <a:ext uri="{C183D7F6-B498-43B3-948B-1728B52AA6E4}">
-                <adec:decorative xmlns:adec="http://schemas.microsoft.com/office/drawing/2017/decorative" xmlns="" val="1"/>
+                <adec:decorative xmlns="" xmlns:adec="http://schemas.microsoft.com/office/drawing/2017/decorative" val="1"/>
               </a:ext>
             </a:extLst>
           </p:cNvPr>
@@ -34347,7 +34540,7 @@
                 <a16:creationId xmlns:a16="http://schemas.microsoft.com/office/drawing/2014/main" id="{5B7ACCD3-FC43-4E32-B7AA-E6D86BED1A32}"/>
               </a:ext>
               <a:ext uri="{C183D7F6-B498-43B3-948B-1728B52AA6E4}">
-                <adec:decorative xmlns:adec="http://schemas.microsoft.com/office/drawing/2017/decorative" xmlns="" val="1"/>
+                <adec:decorative xmlns="" xmlns:adec="http://schemas.microsoft.com/office/drawing/2017/decorative" val="1"/>
               </a:ext>
             </a:extLst>
           </p:cNvPr>
@@ -34467,12 +34660,25 @@
         </p:blipFill>
         <p:spPr>
           <a:xfrm>
-            <a:off x="1023680" y="3503969"/>
-            <a:ext cx="1392506" cy="1392506"/>
+            <a:off x="1155842" y="3661870"/>
+            <a:ext cx="1138457" cy="1138457"/>
           </a:xfrm>
-          <a:prstGeom prst="ellipse">
-            <a:avLst/>
+          <a:prstGeom prst="roundRect">
+            <a:avLst>
+              <a:gd name="adj" fmla="val 8594"/>
+            </a:avLst>
           </a:prstGeom>
+          <a:solidFill>
+            <a:srgbClr val="FFFFFF">
+              <a:shade val="85000"/>
+            </a:srgbClr>
+          </a:solidFill>
+          <a:ln>
+            <a:noFill/>
+          </a:ln>
+          <a:effectLst>
+            <a:reflection blurRad="12700" stA="38000" endPos="28000" dist="5000" dir="5400000" sy="-100000" algn="bl" rotWithShape="0"/>
+          </a:effectLst>
         </p:spPr>
       </p:pic>
       <p:sp>
@@ -34676,7 +34882,7 @@
                 <a16:creationId xmlns:a16="http://schemas.microsoft.com/office/drawing/2014/main" id="{E4AFE17F-D5F3-4088-A119-1B09AC60EA16}"/>
               </a:ext>
               <a:ext uri="{C183D7F6-B498-43B3-948B-1728B52AA6E4}">
-                <adec:decorative xmlns:adec="http://schemas.microsoft.com/office/drawing/2017/decorative" xmlns="" val="1"/>
+                <adec:decorative xmlns="" xmlns:adec="http://schemas.microsoft.com/office/drawing/2017/decorative" val="1"/>
               </a:ext>
             </a:extLst>
           </p:cNvPr>
@@ -34724,7 +34930,7 @@
                 <a16:creationId xmlns:a16="http://schemas.microsoft.com/office/drawing/2014/main" id="{B73380DA-31E8-4A4F-8316-F527A262BAB7}"/>
               </a:ext>
               <a:ext uri="{C183D7F6-B498-43B3-948B-1728B52AA6E4}">
-                <adec:decorative xmlns:adec="http://schemas.microsoft.com/office/drawing/2017/decorative" xmlns="" val="1"/>
+                <adec:decorative xmlns="" xmlns:adec="http://schemas.microsoft.com/office/drawing/2017/decorative" val="1"/>
               </a:ext>
             </a:extLst>
           </p:cNvPr>
@@ -34826,8 +35032,8 @@
         </p:blipFill>
         <p:spPr>
           <a:xfrm>
-            <a:off x="7402441" y="3752386"/>
-            <a:ext cx="720999" cy="1080000"/>
+            <a:off x="7379396" y="3680565"/>
+            <a:ext cx="761914" cy="1141287"/>
           </a:xfrm>
           <a:custGeom>
             <a:avLst/>
@@ -34901,7 +35107,7 @@
                 <a16:creationId xmlns:a16="http://schemas.microsoft.com/office/drawing/2014/main" id="{BB4E19F0-9268-49F1-864A-6AF530251A78}"/>
               </a:ext>
               <a:ext uri="{C183D7F6-B498-43B3-948B-1728B52AA6E4}">
-                <adec:decorative xmlns:adec="http://schemas.microsoft.com/office/drawing/2017/decorative" xmlns="" val="1"/>
+                <adec:decorative xmlns="" xmlns:adec="http://schemas.microsoft.com/office/drawing/2017/decorative" val="1"/>
               </a:ext>
             </a:extLst>
           </p:cNvPr>
@@ -34968,8 +35174,8 @@
         </p:blipFill>
         <p:spPr>
           <a:xfrm>
-            <a:off x="9212352" y="3752525"/>
-            <a:ext cx="822745" cy="1080000"/>
+            <a:off x="9188954" y="3658901"/>
+            <a:ext cx="869540" cy="1141426"/>
           </a:xfrm>
           <a:custGeom>
             <a:avLst/>
@@ -36006,7 +36212,7 @@
                 <a16:creationId xmlns:a16="http://schemas.microsoft.com/office/drawing/2014/main" id="{8B1A45F7-385D-4B67-98E4-489AB4E31714}"/>
               </a:ext>
               <a:ext uri="{C183D7F6-B498-43B3-948B-1728B52AA6E4}">
-                <adec:decorative xmlns:adec="http://schemas.microsoft.com/office/drawing/2017/decorative" xmlns="" val="1"/>
+                <adec:decorative xmlns="" xmlns:adec="http://schemas.microsoft.com/office/drawing/2017/decorative" val="1"/>
               </a:ext>
             </a:extLst>
           </p:cNvPr>
@@ -36016,7 +36222,7 @@
           <p:nvPr/>
         </p:nvSpPr>
         <p:spPr bwMode="auto">
-          <a:xfrm>
+          <a:xfrm flipH="1">
             <a:off x="3615167" y="3446172"/>
             <a:ext cx="1370997" cy="1508097"/>
           </a:xfrm>
@@ -36205,7 +36411,7 @@
                 <a16:creationId xmlns:a16="http://schemas.microsoft.com/office/drawing/2014/main" id="{E4AFE17F-D5F3-4088-A119-1B09AC60EA16}"/>
               </a:ext>
               <a:ext uri="{C183D7F6-B498-43B3-948B-1728B52AA6E4}">
-                <adec:decorative xmlns:adec="http://schemas.microsoft.com/office/drawing/2017/decorative" xmlns="" val="1"/>
+                <adec:decorative xmlns="" xmlns:adec="http://schemas.microsoft.com/office/drawing/2017/decorative" val="1"/>
               </a:ext>
             </a:extLst>
           </p:cNvPr>
@@ -36437,8 +36643,8 @@
         </p:nvGrpSpPr>
         <p:grpSpPr>
           <a:xfrm>
-            <a:off x="577510" y="1318790"/>
-            <a:ext cx="4430272" cy="6043606"/>
+            <a:off x="320836" y="2326105"/>
+            <a:ext cx="3644819" cy="4972122"/>
             <a:chOff x="117404" y="1951388"/>
             <a:chExt cx="3810340" cy="5197917"/>
           </a:xfrm>
@@ -39197,9 +39403,10 @@
           <a:p>
             <a:pPr rtl="0"/>
             <a:r>
-              <a:rPr lang="ru-RU" dirty="0"/>
-              <a:t>В современном мире люди всё больше и больше глупеют</a:t>
+              <a:rPr lang="ru-RU" dirty="0" smtClean="0"/>
+              <a:t>Пора бы это исправлять!</a:t>
             </a:r>
+            <a:endParaRPr lang="ru-RU" dirty="0"/>
           </a:p>
         </p:txBody>
       </p:sp>
@@ -39490,7 +39697,7 @@
                 <a16:creationId xmlns:a16="http://schemas.microsoft.com/office/drawing/2014/main" id="{C8431200-8E45-4A0C-B12B-CFA1B2C53C47}"/>
               </a:ext>
               <a:ext uri="{C183D7F6-B498-43B3-948B-1728B52AA6E4}">
-                <adec:decorative xmlns:adec="http://schemas.microsoft.com/office/drawing/2017/decorative" xmlns="" val="1"/>
+                <adec:decorative xmlns="" xmlns:adec="http://schemas.microsoft.com/office/drawing/2017/decorative" val="1"/>
               </a:ext>
             </a:extLst>
           </p:cNvPr>
@@ -39550,7 +39757,7 @@
                 <a16:creationId xmlns:a16="http://schemas.microsoft.com/office/drawing/2014/main" id="{241C7FC4-FEFA-4A96-9749-9068C68611EF}"/>
               </a:ext>
               <a:ext uri="{C183D7F6-B498-43B3-948B-1728B52AA6E4}">
-                <adec:decorative xmlns:adec="http://schemas.microsoft.com/office/drawing/2017/decorative" xmlns="" val="1"/>
+                <adec:decorative xmlns="" xmlns:adec="http://schemas.microsoft.com/office/drawing/2017/decorative" val="1"/>
               </a:ext>
             </a:extLst>
           </p:cNvPr>
@@ -39656,7 +39863,7 @@
                 <a16:creationId xmlns:a16="http://schemas.microsoft.com/office/drawing/2014/main" id="{294AEDC0-6B1D-4A3D-860D-83756CC387D3}"/>
               </a:ext>
               <a:ext uri="{C183D7F6-B498-43B3-948B-1728B52AA6E4}">
-                <adec:decorative xmlns:adec="http://schemas.microsoft.com/office/drawing/2017/decorative" xmlns="" val="1"/>
+                <adec:decorative xmlns="" xmlns:adec="http://schemas.microsoft.com/office/drawing/2017/decorative" val="1"/>
               </a:ext>
             </a:extLst>
           </p:cNvPr>
@@ -40415,7 +40622,7 @@
                 <a16:creationId xmlns:a16="http://schemas.microsoft.com/office/drawing/2014/main" id="{C8431200-8E45-4A0C-B12B-CFA1B2C53C47}"/>
               </a:ext>
               <a:ext uri="{C183D7F6-B498-43B3-948B-1728B52AA6E4}">
-                <adec:decorative xmlns:adec="http://schemas.microsoft.com/office/drawing/2017/decorative" xmlns="" val="1"/>
+                <adec:decorative xmlns="" xmlns:adec="http://schemas.microsoft.com/office/drawing/2017/decorative" val="1"/>
               </a:ext>
             </a:extLst>
           </p:cNvPr>
@@ -40475,7 +40682,7 @@
                 <a16:creationId xmlns:a16="http://schemas.microsoft.com/office/drawing/2014/main" id="{241C7FC4-FEFA-4A96-9749-9068C68611EF}"/>
               </a:ext>
               <a:ext uri="{C183D7F6-B498-43B3-948B-1728B52AA6E4}">
-                <adec:decorative xmlns:adec="http://schemas.microsoft.com/office/drawing/2017/decorative" xmlns="" val="1"/>
+                <adec:decorative xmlns="" xmlns:adec="http://schemas.microsoft.com/office/drawing/2017/decorative" val="1"/>
               </a:ext>
             </a:extLst>
           </p:cNvPr>
@@ -40591,7 +40798,7 @@
                 <a16:creationId xmlns:a16="http://schemas.microsoft.com/office/drawing/2014/main" id="{294AEDC0-6B1D-4A3D-860D-83756CC387D3}"/>
               </a:ext>
               <a:ext uri="{C183D7F6-B498-43B3-948B-1728B52AA6E4}">
-                <adec:decorative xmlns:adec="http://schemas.microsoft.com/office/drawing/2017/decorative" xmlns="" val="1"/>
+                <adec:decorative xmlns="" xmlns:adec="http://schemas.microsoft.com/office/drawing/2017/decorative" val="1"/>
               </a:ext>
             </a:extLst>
           </p:cNvPr>
@@ -41190,7 +41397,7 @@
                 <a16:creationId xmlns:a16="http://schemas.microsoft.com/office/drawing/2014/main" id="{D14F9816-D761-44CD-80AC-A13A6A2BF4F4}"/>
               </a:ext>
               <a:ext uri="{C183D7F6-B498-43B3-948B-1728B52AA6E4}">
-                <adec:decorative xmlns:adec="http://schemas.microsoft.com/office/drawing/2017/decorative" xmlns="" val="1"/>
+                <adec:decorative xmlns="" xmlns:adec="http://schemas.microsoft.com/office/drawing/2017/decorative" val="1"/>
               </a:ext>
             </a:extLst>
           </p:cNvPr>
@@ -42074,7 +42281,7 @@
                 <a16:creationId xmlns:a16="http://schemas.microsoft.com/office/drawing/2014/main" id="{E6D6E19C-DE46-4402-8CBF-17BB95458532}"/>
               </a:ext>
               <a:ext uri="{C183D7F6-B498-43B3-948B-1728B52AA6E4}">
-                <adec:decorative xmlns:adec="http://schemas.microsoft.com/office/drawing/2017/decorative" xmlns="" val="1"/>
+                <adec:decorative xmlns="" xmlns:adec="http://schemas.microsoft.com/office/drawing/2017/decorative" val="1"/>
               </a:ext>
             </a:extLst>
           </p:cNvPr>
@@ -42817,7 +43024,7 @@
                 <a16:creationId xmlns:a16="http://schemas.microsoft.com/office/drawing/2014/main" id="{C8431200-8E45-4A0C-B12B-CFA1B2C53C47}"/>
               </a:ext>
               <a:ext uri="{C183D7F6-B498-43B3-948B-1728B52AA6E4}">
-                <adec:decorative xmlns:adec="http://schemas.microsoft.com/office/drawing/2017/decorative" xmlns="" val="1"/>
+                <adec:decorative xmlns="" xmlns:adec="http://schemas.microsoft.com/office/drawing/2017/decorative" val="1"/>
               </a:ext>
             </a:extLst>
           </p:cNvPr>
@@ -42877,7 +43084,7 @@
                 <a16:creationId xmlns:a16="http://schemas.microsoft.com/office/drawing/2014/main" id="{241C7FC4-FEFA-4A96-9749-9068C68611EF}"/>
               </a:ext>
               <a:ext uri="{C183D7F6-B498-43B3-948B-1728B52AA6E4}">
-                <adec:decorative xmlns:adec="http://schemas.microsoft.com/office/drawing/2017/decorative" xmlns="" val="1"/>
+                <adec:decorative xmlns="" xmlns:adec="http://schemas.microsoft.com/office/drawing/2017/decorative" val="1"/>
               </a:ext>
             </a:extLst>
           </p:cNvPr>
@@ -42993,7 +43200,7 @@
                 <a16:creationId xmlns:a16="http://schemas.microsoft.com/office/drawing/2014/main" id="{294AEDC0-6B1D-4A3D-860D-83756CC387D3}"/>
               </a:ext>
               <a:ext uri="{C183D7F6-B498-43B3-948B-1728B52AA6E4}">
-                <adec:decorative xmlns:adec="http://schemas.microsoft.com/office/drawing/2017/decorative" xmlns="" val="1"/>
+                <adec:decorative xmlns="" xmlns:adec="http://schemas.microsoft.com/office/drawing/2017/decorative" val="1"/>
               </a:ext>
             </a:extLst>
           </p:cNvPr>

</xml_diff>

<commit_message>
Updated Client and Server. Client: Added new Models, new emoji, recycler_view_empty_items. Updated controllers, DataManager, MainActivity, APIService, strings. Server: Updated Resources, DB, and updated presentation
</commit_message>
<xml_diff>
--- a/NeoBrain.pptx
+++ b/NeoBrain.pptx
@@ -200,6 +200,7 @@
           </a:p>
         </c:rich>
       </c:tx>
+      <c:layout/>
       <c:overlay val="0"/>
       <c:spPr>
         <a:noFill/>
@@ -667,6 +668,7 @@
     </c:plotArea>
     <c:legend>
       <c:legendPos val="b"/>
+      <c:layout/>
       <c:overlay val="0"/>
       <c:spPr>
         <a:noFill/>
@@ -1359,7 +1361,7 @@
             <a:pPr rtl="0"/>
             <a:fld id="{84D28F2D-D4F3-4E2B-A0F3-7AAFDE0BC58B}" type="datetime1">
               <a:rPr lang="ru-RU" smtClean="0"/>
-              <a:t>12.04.2020</a:t>
+              <a:t>13.04.2020</a:t>
             </a:fld>
             <a:endParaRPr lang="ru-RU" dirty="0"/>
           </a:p>
@@ -1540,7 +1542,7 @@
             <a:fld id="{CA49951C-CA37-4221-943D-71E64EEEA549}" type="datetime1">
               <a:rPr lang="ru-RU" smtClean="0"/>
               <a:pPr/>
-              <a:t>12.04.2020</a:t>
+              <a:t>13.04.2020</a:t>
             </a:fld>
             <a:endParaRPr lang="ru-RU" dirty="0"/>
           </a:p>
@@ -3255,7 +3257,7 @@
             <a:pPr rtl="0"/>
             <a:fld id="{1BCB67F5-0266-4F57-BCC8-CAA9673E5902}" type="datetime1">
               <a:rPr lang="ru-RU" noProof="0" smtClean="0"/>
-              <a:t>12.04.2020</a:t>
+              <a:t>13.04.2020</a:t>
             </a:fld>
             <a:endParaRPr lang="ru-RU" noProof="0" dirty="0"/>
           </a:p>
@@ -3459,7 +3461,7 @@
             <a:pPr rtl="0"/>
             <a:fld id="{1B5ADB00-8AAA-4C20-B03B-A012746A2014}" type="datetime1">
               <a:rPr lang="ru-RU" noProof="0" smtClean="0"/>
-              <a:t>12.04.2020</a:t>
+              <a:t>13.04.2020</a:t>
             </a:fld>
             <a:endParaRPr lang="ru-RU" noProof="0" dirty="0"/>
           </a:p>
@@ -3673,7 +3675,7 @@
             <a:pPr rtl="0"/>
             <a:fld id="{7C0EA85A-0755-4D64-85AE-4D684CB44117}" type="datetime1">
               <a:rPr lang="ru-RU" noProof="0" smtClean="0"/>
-              <a:t>12.04.2020</a:t>
+              <a:t>13.04.2020</a:t>
             </a:fld>
             <a:endParaRPr lang="ru-RU" noProof="0" dirty="0"/>
           </a:p>
@@ -3877,7 +3879,7 @@
             <a:pPr rtl="0"/>
             <a:fld id="{82200F68-8153-43BD-9048-5E0203738055}" type="datetime1">
               <a:rPr lang="ru-RU" noProof="0" smtClean="0"/>
-              <a:t>12.04.2020</a:t>
+              <a:t>13.04.2020</a:t>
             </a:fld>
             <a:endParaRPr lang="ru-RU" noProof="0" dirty="0"/>
           </a:p>
@@ -4157,7 +4159,7 @@
             <a:pPr rtl="0"/>
             <a:fld id="{DEE6A3E5-DF0B-4BB4-83EC-7350AED6B333}" type="datetime1">
               <a:rPr lang="ru-RU" noProof="0" smtClean="0"/>
-              <a:t>12.04.2020</a:t>
+              <a:t>13.04.2020</a:t>
             </a:fld>
             <a:endParaRPr lang="ru-RU" noProof="0" dirty="0"/>
           </a:p>
@@ -4429,7 +4431,7 @@
             <a:pPr rtl="0"/>
             <a:fld id="{658B5BE7-11FF-4B74-A258-0B0852B1C612}" type="datetime1">
               <a:rPr lang="ru-RU" noProof="0" smtClean="0"/>
-              <a:t>12.04.2020</a:t>
+              <a:t>13.04.2020</a:t>
             </a:fld>
             <a:endParaRPr lang="ru-RU" noProof="0" dirty="0"/>
           </a:p>
@@ -4848,7 +4850,7 @@
             <a:pPr rtl="0"/>
             <a:fld id="{5153AEB0-DEE4-469A-ACA7-FCE298962CB8}" type="datetime1">
               <a:rPr lang="ru-RU" noProof="0" smtClean="0"/>
-              <a:t>12.04.2020</a:t>
+              <a:t>13.04.2020</a:t>
             </a:fld>
             <a:endParaRPr lang="ru-RU" noProof="0" dirty="0"/>
           </a:p>
@@ -4994,7 +4996,7 @@
             <a:pPr rtl="0"/>
             <a:fld id="{A7D850CA-FEA9-4ECA-92F5-9F1778664B8F}" type="datetime1">
               <a:rPr lang="ru-RU" noProof="0" smtClean="0"/>
-              <a:t>12.04.2020</a:t>
+              <a:t>13.04.2020</a:t>
             </a:fld>
             <a:endParaRPr lang="ru-RU" noProof="0" dirty="0"/>
           </a:p>
@@ -5110,7 +5112,7 @@
             <a:pPr rtl="0"/>
             <a:fld id="{BDD77D1A-AB3F-4195-91BD-ED29ADAC1B44}" type="datetime1">
               <a:rPr lang="ru-RU" noProof="0" smtClean="0"/>
-              <a:t>12.04.2020</a:t>
+              <a:t>13.04.2020</a:t>
             </a:fld>
             <a:endParaRPr lang="ru-RU" noProof="0" dirty="0"/>
           </a:p>
@@ -5427,7 +5429,7 @@
             <a:pPr rtl="0"/>
             <a:fld id="{376F1AFD-3CC9-4493-BC63-1C141B05CE5B}" type="datetime1">
               <a:rPr lang="ru-RU" noProof="0" smtClean="0"/>
-              <a:t>12.04.2020</a:t>
+              <a:t>13.04.2020</a:t>
             </a:fld>
             <a:endParaRPr lang="ru-RU" noProof="0" dirty="0"/>
           </a:p>
@@ -5725,7 +5727,7 @@
             <a:pPr rtl="0"/>
             <a:fld id="{6F578092-39FE-416A-9517-019E99EC9D0E}" type="datetime1">
               <a:rPr lang="ru-RU" noProof="0" smtClean="0"/>
-              <a:t>12.04.2020</a:t>
+              <a:t>13.04.2020</a:t>
             </a:fld>
             <a:endParaRPr lang="ru-RU" noProof="0" dirty="0"/>
           </a:p>
@@ -5970,7 +5972,7 @@
             <a:pPr rtl="0"/>
             <a:fld id="{368E1444-B5BA-4767-8208-964378902D11}" type="datetime1">
               <a:rPr lang="ru-RU" noProof="0" smtClean="0"/>
-              <a:t>12.04.2020</a:t>
+              <a:t>13.04.2020</a:t>
             </a:fld>
             <a:endParaRPr lang="ru-RU" noProof="0" dirty="0"/>
           </a:p>
@@ -9785,7 +9787,7 @@
                 <a16:creationId xmlns:a16="http://schemas.microsoft.com/office/drawing/2014/main" id="{C8431200-8E45-4A0C-B12B-CFA1B2C53C47}"/>
               </a:ext>
               <a:ext uri="{C183D7F6-B498-43B3-948B-1728B52AA6E4}">
-                <adec:decorative xmlns="" xmlns:adec="http://schemas.microsoft.com/office/drawing/2017/decorative" val="1"/>
+                <adec:decorative xmlns:adec="http://schemas.microsoft.com/office/drawing/2017/decorative" xmlns="" val="1"/>
               </a:ext>
             </a:extLst>
           </p:cNvPr>
@@ -9845,7 +9847,7 @@
                 <a16:creationId xmlns:a16="http://schemas.microsoft.com/office/drawing/2014/main" id="{241C7FC4-FEFA-4A96-9749-9068C68611EF}"/>
               </a:ext>
               <a:ext uri="{C183D7F6-B498-43B3-948B-1728B52AA6E4}">
-                <adec:decorative xmlns="" xmlns:adec="http://schemas.microsoft.com/office/drawing/2017/decorative" val="1"/>
+                <adec:decorative xmlns:adec="http://schemas.microsoft.com/office/drawing/2017/decorative" xmlns="" val="1"/>
               </a:ext>
             </a:extLst>
           </p:cNvPr>
@@ -9961,7 +9963,7 @@
                 <a16:creationId xmlns:a16="http://schemas.microsoft.com/office/drawing/2014/main" id="{294AEDC0-6B1D-4A3D-860D-83756CC387D3}"/>
               </a:ext>
               <a:ext uri="{C183D7F6-B498-43B3-948B-1728B52AA6E4}">
-                <adec:decorative xmlns="" xmlns:adec="http://schemas.microsoft.com/office/drawing/2017/decorative" val="1"/>
+                <adec:decorative xmlns:adec="http://schemas.microsoft.com/office/drawing/2017/decorative" xmlns="" val="1"/>
               </a:ext>
             </a:extLst>
           </p:cNvPr>
@@ -10560,7 +10562,7 @@
                 <a16:creationId xmlns:a16="http://schemas.microsoft.com/office/drawing/2014/main" id="{D14F9816-D761-44CD-80AC-A13A6A2BF4F4}"/>
               </a:ext>
               <a:ext uri="{C183D7F6-B498-43B3-948B-1728B52AA6E4}">
-                <adec:decorative xmlns="" xmlns:adec="http://schemas.microsoft.com/office/drawing/2017/decorative" val="1"/>
+                <adec:decorative xmlns:adec="http://schemas.microsoft.com/office/drawing/2017/decorative" xmlns="" val="1"/>
               </a:ext>
             </a:extLst>
           </p:cNvPr>
@@ -11444,7 +11446,7 @@
                 <a16:creationId xmlns:a16="http://schemas.microsoft.com/office/drawing/2014/main" id="{E6D6E19C-DE46-4402-8CBF-17BB95458532}"/>
               </a:ext>
               <a:ext uri="{C183D7F6-B498-43B3-948B-1728B52AA6E4}">
-                <adec:decorative xmlns="" xmlns:adec="http://schemas.microsoft.com/office/drawing/2017/decorative" val="1"/>
+                <adec:decorative xmlns:adec="http://schemas.microsoft.com/office/drawing/2017/decorative" xmlns="" val="1"/>
               </a:ext>
             </a:extLst>
           </p:cNvPr>
@@ -12123,7 +12125,7 @@
                 <a16:creationId xmlns:a16="http://schemas.microsoft.com/office/drawing/2014/main" id="{3638C06D-F644-4B33-8858-D880F038FAC3}"/>
               </a:ext>
               <a:ext uri="{C183D7F6-B498-43B3-948B-1728B52AA6E4}">
-                <adec:decorative xmlns="" xmlns:adec="http://schemas.microsoft.com/office/drawing/2017/decorative" val="1"/>
+                <adec:decorative xmlns:adec="http://schemas.microsoft.com/office/drawing/2017/decorative" xmlns="" val="1"/>
               </a:ext>
             </a:extLst>
           </p:cNvPr>
@@ -17358,7 +17360,7 @@
                 <a16:creationId xmlns:a16="http://schemas.microsoft.com/office/drawing/2014/main" id="{6D08E99A-0644-4757-9F3A-BBA1A4F39081}"/>
               </a:ext>
               <a:ext uri="{C183D7F6-B498-43B3-948B-1728B52AA6E4}">
-                <adec:decorative xmlns="" xmlns:adec="http://schemas.microsoft.com/office/drawing/2017/decorative" val="1"/>
+                <adec:decorative xmlns:adec="http://schemas.microsoft.com/office/drawing/2017/decorative" xmlns="" val="1"/>
               </a:ext>
             </a:extLst>
           </p:cNvPr>
@@ -17404,7 +17406,7 @@
                 <a16:creationId xmlns:a16="http://schemas.microsoft.com/office/drawing/2014/main" id="{A21B85DB-181D-46E7-A9DF-F92B1DF032FD}"/>
               </a:ext>
               <a:ext uri="{C183D7F6-B498-43B3-948B-1728B52AA6E4}">
-                <adec:decorative xmlns="" xmlns:adec="http://schemas.microsoft.com/office/drawing/2017/decorative" val="1"/>
+                <adec:decorative xmlns:adec="http://schemas.microsoft.com/office/drawing/2017/decorative" xmlns="" val="1"/>
               </a:ext>
             </a:extLst>
           </p:cNvPr>
@@ -17515,7 +17517,7 @@
                 <a16:creationId xmlns:a16="http://schemas.microsoft.com/office/drawing/2014/main" id="{0B8C9A86-3574-4A2E-BC62-481A2BE7FBED}"/>
               </a:ext>
               <a:ext uri="{C183D7F6-B498-43B3-948B-1728B52AA6E4}">
-                <adec:decorative xmlns="" xmlns:adec="http://schemas.microsoft.com/office/drawing/2017/decorative" val="1"/>
+                <adec:decorative xmlns:adec="http://schemas.microsoft.com/office/drawing/2017/decorative" xmlns="" val="1"/>
               </a:ext>
             </a:extLst>
           </p:cNvPr>
@@ -22664,7 +22666,7 @@
                 <a16:creationId xmlns:a16="http://schemas.microsoft.com/office/drawing/2014/main" id="{7F192ACD-9C75-481C-8934-C15F525ED96C}"/>
               </a:ext>
               <a:ext uri="{C183D7F6-B498-43B3-948B-1728B52AA6E4}">
-                <adec:decorative xmlns="" xmlns:adec="http://schemas.microsoft.com/office/drawing/2017/decorative" val="1"/>
+                <adec:decorative xmlns:adec="http://schemas.microsoft.com/office/drawing/2017/decorative" xmlns="" val="1"/>
               </a:ext>
             </a:extLst>
           </p:cNvPr>
@@ -22814,7 +22816,7 @@
                 <a16:creationId xmlns:a16="http://schemas.microsoft.com/office/drawing/2014/main" id="{5B7ACCD3-FC43-4E32-B7AA-E6D86BED1A32}"/>
               </a:ext>
               <a:ext uri="{C183D7F6-B498-43B3-948B-1728B52AA6E4}">
-                <adec:decorative xmlns="" xmlns:adec="http://schemas.microsoft.com/office/drawing/2017/decorative" val="1"/>
+                <adec:decorative xmlns:adec="http://schemas.microsoft.com/office/drawing/2017/decorative" xmlns="" val="1"/>
               </a:ext>
             </a:extLst>
           </p:cNvPr>
@@ -22876,13 +22878,14 @@
               </a:ext>
             </a:extLst>
           </a:blip>
-          <a:srcRect/>
-          <a:stretch/>
+          <a:stretch>
+            <a:fillRect/>
+          </a:stretch>
         </p:blipFill>
         <p:spPr>
           <a:xfrm>
-            <a:off x="1031249" y="3152178"/>
-            <a:ext cx="1018089" cy="1018089"/>
+            <a:off x="1065079" y="3042349"/>
+            <a:ext cx="952652" cy="1206271"/>
           </a:xfrm>
           <a:prstGeom prst="roundRect">
             <a:avLst>
@@ -23008,7 +23011,7 @@
                 <a16:creationId xmlns:a16="http://schemas.microsoft.com/office/drawing/2014/main" id="{7F192ACD-9C75-481C-8934-C15F525ED96C}"/>
               </a:ext>
               <a:ext uri="{C183D7F6-B498-43B3-948B-1728B52AA6E4}">
-                <adec:decorative xmlns="" xmlns:adec="http://schemas.microsoft.com/office/drawing/2017/decorative" val="1"/>
+                <adec:decorative xmlns:adec="http://schemas.microsoft.com/office/drawing/2017/decorative" xmlns="" val="1"/>
               </a:ext>
             </a:extLst>
           </p:cNvPr>
@@ -23158,7 +23161,7 @@
                 <a16:creationId xmlns:a16="http://schemas.microsoft.com/office/drawing/2014/main" id="{5B7ACCD3-FC43-4E32-B7AA-E6D86BED1A32}"/>
               </a:ext>
               <a:ext uri="{C183D7F6-B498-43B3-948B-1728B52AA6E4}">
-                <adec:decorative xmlns="" xmlns:adec="http://schemas.microsoft.com/office/drawing/2017/decorative" val="1"/>
+                <adec:decorative xmlns:adec="http://schemas.microsoft.com/office/drawing/2017/decorative" xmlns="" val="1"/>
               </a:ext>
             </a:extLst>
           </p:cNvPr>
@@ -23355,7 +23358,7 @@
                 <a16:creationId xmlns:a16="http://schemas.microsoft.com/office/drawing/2014/main" id="{7F192ACD-9C75-481C-8934-C15F525ED96C}"/>
               </a:ext>
               <a:ext uri="{C183D7F6-B498-43B3-948B-1728B52AA6E4}">
-                <adec:decorative xmlns="" xmlns:adec="http://schemas.microsoft.com/office/drawing/2017/decorative" val="1"/>
+                <adec:decorative xmlns:adec="http://schemas.microsoft.com/office/drawing/2017/decorative" xmlns="" val="1"/>
               </a:ext>
             </a:extLst>
           </p:cNvPr>
@@ -23505,7 +23508,7 @@
                 <a16:creationId xmlns:a16="http://schemas.microsoft.com/office/drawing/2014/main" id="{7F192ACD-9C75-481C-8934-C15F525ED96C}"/>
               </a:ext>
               <a:ext uri="{C183D7F6-B498-43B3-948B-1728B52AA6E4}">
-                <adec:decorative xmlns="" xmlns:adec="http://schemas.microsoft.com/office/drawing/2017/decorative" val="1"/>
+                <adec:decorative xmlns:adec="http://schemas.microsoft.com/office/drawing/2017/decorative" xmlns="" val="1"/>
               </a:ext>
             </a:extLst>
           </p:cNvPr>
@@ -23655,7 +23658,7 @@
                 <a16:creationId xmlns:a16="http://schemas.microsoft.com/office/drawing/2014/main" id="{5B7ACCD3-FC43-4E32-B7AA-E6D86BED1A32}"/>
               </a:ext>
               <a:ext uri="{C183D7F6-B498-43B3-948B-1728B52AA6E4}">
-                <adec:decorative xmlns="" xmlns:adec="http://schemas.microsoft.com/office/drawing/2017/decorative" val="1"/>
+                <adec:decorative xmlns:adec="http://schemas.microsoft.com/office/drawing/2017/decorative" xmlns="" val="1"/>
               </a:ext>
             </a:extLst>
           </p:cNvPr>
@@ -30397,7 +30400,7 @@
                 <a16:creationId xmlns:a16="http://schemas.microsoft.com/office/drawing/2014/main" id="{D14F9816-D761-44CD-80AC-A13A6A2BF4F4}"/>
               </a:ext>
               <a:ext uri="{C183D7F6-B498-43B3-948B-1728B52AA6E4}">
-                <adec:decorative xmlns="" xmlns:adec="http://schemas.microsoft.com/office/drawing/2017/decorative" val="1"/>
+                <adec:decorative xmlns:adec="http://schemas.microsoft.com/office/drawing/2017/decorative" xmlns="" val="1"/>
               </a:ext>
             </a:extLst>
           </p:cNvPr>
@@ -31420,7 +31423,7 @@
                 <a16:creationId xmlns:a16="http://schemas.microsoft.com/office/drawing/2014/main" id="{B38D4B56-7D6C-4345-912F-B3BA9A014E8B}"/>
               </a:ext>
               <a:ext uri="{C183D7F6-B498-43B3-948B-1728B52AA6E4}">
-                <adec:decorative xmlns="" xmlns:adec="http://schemas.microsoft.com/office/drawing/2017/decorative" val="1"/>
+                <adec:decorative xmlns:adec="http://schemas.microsoft.com/office/drawing/2017/decorative" xmlns="" val="1"/>
               </a:ext>
             </a:extLst>
           </p:cNvPr>
@@ -31466,7 +31469,7 @@
                 <a16:creationId xmlns:a16="http://schemas.microsoft.com/office/drawing/2014/main" id="{B457331C-2A24-4352-9B4C-1C1B326F404F}"/>
               </a:ext>
               <a:ext uri="{C183D7F6-B498-43B3-948B-1728B52AA6E4}">
-                <adec:decorative xmlns="" xmlns:adec="http://schemas.microsoft.com/office/drawing/2017/decorative" val="1"/>
+                <adec:decorative xmlns:adec="http://schemas.microsoft.com/office/drawing/2017/decorative" xmlns="" val="1"/>
               </a:ext>
             </a:extLst>
           </p:cNvPr>
@@ -31985,7 +31988,7 @@
                 <a16:creationId xmlns:a16="http://schemas.microsoft.com/office/drawing/2014/main" id="{E7D1D117-BC5C-430A-9FEB-B231E691511F}"/>
               </a:ext>
               <a:ext uri="{C183D7F6-B498-43B3-948B-1728B52AA6E4}">
-                <adec:decorative xmlns="" xmlns:adec="http://schemas.microsoft.com/office/drawing/2017/decorative" val="1"/>
+                <adec:decorative xmlns:adec="http://schemas.microsoft.com/office/drawing/2017/decorative" xmlns="" val="1"/>
               </a:ext>
             </a:extLst>
           </p:cNvPr>
@@ -32043,7 +32046,7 @@
                 <a16:creationId xmlns:a16="http://schemas.microsoft.com/office/drawing/2014/main" id="{2577E8EA-5E95-41C5-8BE8-EE647DE2613A}"/>
               </a:ext>
               <a:ext uri="{C183D7F6-B498-43B3-948B-1728B52AA6E4}">
-                <adec:decorative xmlns="" xmlns:adec="http://schemas.microsoft.com/office/drawing/2017/decorative" val="1"/>
+                <adec:decorative xmlns:adec="http://schemas.microsoft.com/office/drawing/2017/decorative" xmlns="" val="1"/>
               </a:ext>
             </a:extLst>
           </p:cNvPr>
@@ -35971,7 +35974,7 @@
                 <a16:creationId xmlns:a16="http://schemas.microsoft.com/office/drawing/2014/main" id="{7F192ACD-9C75-481C-8934-C15F525ED96C}"/>
               </a:ext>
               <a:ext uri="{C183D7F6-B498-43B3-948B-1728B52AA6E4}">
-                <adec:decorative xmlns="" xmlns:adec="http://schemas.microsoft.com/office/drawing/2017/decorative" val="1"/>
+                <adec:decorative xmlns:adec="http://schemas.microsoft.com/office/drawing/2017/decorative" xmlns="" val="1"/>
               </a:ext>
             </a:extLst>
           </p:cNvPr>
@@ -36121,7 +36124,7 @@
                 <a16:creationId xmlns:a16="http://schemas.microsoft.com/office/drawing/2014/main" id="{D83BBA1A-1810-4171-BD9C-B27B7C26AF70}"/>
               </a:ext>
               <a:ext uri="{C183D7F6-B498-43B3-948B-1728B52AA6E4}">
-                <adec:decorative xmlns="" xmlns:adec="http://schemas.microsoft.com/office/drawing/2017/decorative" val="1"/>
+                <adec:decorative xmlns:adec="http://schemas.microsoft.com/office/drawing/2017/decorative" xmlns="" val="1"/>
               </a:ext>
             </a:extLst>
           </p:cNvPr>
@@ -36271,7 +36274,7 @@
                 <a16:creationId xmlns:a16="http://schemas.microsoft.com/office/drawing/2014/main" id="{2D409DD0-6B30-47E3-9886-F8F16D42AB79}"/>
               </a:ext>
               <a:ext uri="{C183D7F6-B498-43B3-948B-1728B52AA6E4}">
-                <adec:decorative xmlns="" xmlns:adec="http://schemas.microsoft.com/office/drawing/2017/decorative" val="1"/>
+                <adec:decorative xmlns:adec="http://schemas.microsoft.com/office/drawing/2017/decorative" xmlns="" val="1"/>
               </a:ext>
             </a:extLst>
           </p:cNvPr>
@@ -36421,7 +36424,7 @@
                 <a16:creationId xmlns:a16="http://schemas.microsoft.com/office/drawing/2014/main" id="{8B1A45F7-385D-4B67-98E4-489AB4E31714}"/>
               </a:ext>
               <a:ext uri="{C183D7F6-B498-43B3-948B-1728B52AA6E4}">
-                <adec:decorative xmlns="" xmlns:adec="http://schemas.microsoft.com/office/drawing/2017/decorative" val="1"/>
+                <adec:decorative xmlns:adec="http://schemas.microsoft.com/office/drawing/2017/decorative" xmlns="" val="1"/>
               </a:ext>
             </a:extLst>
           </p:cNvPr>
@@ -36571,7 +36574,7 @@
                 <a16:creationId xmlns:a16="http://schemas.microsoft.com/office/drawing/2014/main" id="{7F192ACD-9C75-481C-8934-C15F525ED96C}"/>
               </a:ext>
               <a:ext uri="{C183D7F6-B498-43B3-948B-1728B52AA6E4}">
-                <adec:decorative xmlns="" xmlns:adec="http://schemas.microsoft.com/office/drawing/2017/decorative" val="1"/>
+                <adec:decorative xmlns:adec="http://schemas.microsoft.com/office/drawing/2017/decorative" xmlns="" val="1"/>
               </a:ext>
             </a:extLst>
           </p:cNvPr>
@@ -36721,7 +36724,7 @@
                 <a16:creationId xmlns:a16="http://schemas.microsoft.com/office/drawing/2014/main" id="{5B7ACCD3-FC43-4E32-B7AA-E6D86BED1A32}"/>
               </a:ext>
               <a:ext uri="{C183D7F6-B498-43B3-948B-1728B52AA6E4}">
-                <adec:decorative xmlns="" xmlns:adec="http://schemas.microsoft.com/office/drawing/2017/decorative" val="1"/>
+                <adec:decorative xmlns:adec="http://schemas.microsoft.com/office/drawing/2017/decorative" xmlns="" val="1"/>
               </a:ext>
             </a:extLst>
           </p:cNvPr>
@@ -37063,7 +37066,7 @@
                 <a16:creationId xmlns:a16="http://schemas.microsoft.com/office/drawing/2014/main" id="{E4AFE17F-D5F3-4088-A119-1B09AC60EA16}"/>
               </a:ext>
               <a:ext uri="{C183D7F6-B498-43B3-948B-1728B52AA6E4}">
-                <adec:decorative xmlns="" xmlns:adec="http://schemas.microsoft.com/office/drawing/2017/decorative" val="1"/>
+                <adec:decorative xmlns:adec="http://schemas.microsoft.com/office/drawing/2017/decorative" xmlns="" val="1"/>
               </a:ext>
             </a:extLst>
           </p:cNvPr>
@@ -37111,7 +37114,7 @@
                 <a16:creationId xmlns:a16="http://schemas.microsoft.com/office/drawing/2014/main" id="{B73380DA-31E8-4A4F-8316-F527A262BAB7}"/>
               </a:ext>
               <a:ext uri="{C183D7F6-B498-43B3-948B-1728B52AA6E4}">
-                <adec:decorative xmlns="" xmlns:adec="http://schemas.microsoft.com/office/drawing/2017/decorative" val="1"/>
+                <adec:decorative xmlns:adec="http://schemas.microsoft.com/office/drawing/2017/decorative" xmlns="" val="1"/>
               </a:ext>
             </a:extLst>
           </p:cNvPr>
@@ -37288,7 +37291,7 @@
                 <a16:creationId xmlns:a16="http://schemas.microsoft.com/office/drawing/2014/main" id="{BB4E19F0-9268-49F1-864A-6AF530251A78}"/>
               </a:ext>
               <a:ext uri="{C183D7F6-B498-43B3-948B-1728B52AA6E4}">
-                <adec:decorative xmlns="" xmlns:adec="http://schemas.microsoft.com/office/drawing/2017/decorative" val="1"/>
+                <adec:decorative xmlns:adec="http://schemas.microsoft.com/office/drawing/2017/decorative" xmlns="" val="1"/>
               </a:ext>
             </a:extLst>
           </p:cNvPr>
@@ -38393,7 +38396,7 @@
                 <a16:creationId xmlns:a16="http://schemas.microsoft.com/office/drawing/2014/main" id="{8B1A45F7-385D-4B67-98E4-489AB4E31714}"/>
               </a:ext>
               <a:ext uri="{C183D7F6-B498-43B3-948B-1728B52AA6E4}">
-                <adec:decorative xmlns="" xmlns:adec="http://schemas.microsoft.com/office/drawing/2017/decorative" val="1"/>
+                <adec:decorative xmlns:adec="http://schemas.microsoft.com/office/drawing/2017/decorative" xmlns="" val="1"/>
               </a:ext>
             </a:extLst>
           </p:cNvPr>
@@ -38592,7 +38595,7 @@
                 <a16:creationId xmlns:a16="http://schemas.microsoft.com/office/drawing/2014/main" id="{E4AFE17F-D5F3-4088-A119-1B09AC60EA16}"/>
               </a:ext>
               <a:ext uri="{C183D7F6-B498-43B3-948B-1728B52AA6E4}">
-                <adec:decorative xmlns="" xmlns:adec="http://schemas.microsoft.com/office/drawing/2017/decorative" val="1"/>
+                <adec:decorative xmlns:adec="http://schemas.microsoft.com/office/drawing/2017/decorative" xmlns="" val="1"/>
               </a:ext>
             </a:extLst>
           </p:cNvPr>
@@ -41855,7 +41858,7 @@
                 <a16:creationId xmlns:a16="http://schemas.microsoft.com/office/drawing/2014/main" id="{C8431200-8E45-4A0C-B12B-CFA1B2C53C47}"/>
               </a:ext>
               <a:ext uri="{C183D7F6-B498-43B3-948B-1728B52AA6E4}">
-                <adec:decorative xmlns="" xmlns:adec="http://schemas.microsoft.com/office/drawing/2017/decorative" val="1"/>
+                <adec:decorative xmlns:adec="http://schemas.microsoft.com/office/drawing/2017/decorative" xmlns="" val="1"/>
               </a:ext>
             </a:extLst>
           </p:cNvPr>
@@ -41915,7 +41918,7 @@
                 <a16:creationId xmlns:a16="http://schemas.microsoft.com/office/drawing/2014/main" id="{241C7FC4-FEFA-4A96-9749-9068C68611EF}"/>
               </a:ext>
               <a:ext uri="{C183D7F6-B498-43B3-948B-1728B52AA6E4}">
-                <adec:decorative xmlns="" xmlns:adec="http://schemas.microsoft.com/office/drawing/2017/decorative" val="1"/>
+                <adec:decorative xmlns:adec="http://schemas.microsoft.com/office/drawing/2017/decorative" xmlns="" val="1"/>
               </a:ext>
             </a:extLst>
           </p:cNvPr>
@@ -42021,7 +42024,7 @@
                 <a16:creationId xmlns:a16="http://schemas.microsoft.com/office/drawing/2014/main" id="{294AEDC0-6B1D-4A3D-860D-83756CC387D3}"/>
               </a:ext>
               <a:ext uri="{C183D7F6-B498-43B3-948B-1728B52AA6E4}">
-                <adec:decorative xmlns="" xmlns:adec="http://schemas.microsoft.com/office/drawing/2017/decorative" val="1"/>
+                <adec:decorative xmlns:adec="http://schemas.microsoft.com/office/drawing/2017/decorative" xmlns="" val="1"/>
               </a:ext>
             </a:extLst>
           </p:cNvPr>
@@ -42780,7 +42783,7 @@
                 <a16:creationId xmlns:a16="http://schemas.microsoft.com/office/drawing/2014/main" id="{C8431200-8E45-4A0C-B12B-CFA1B2C53C47}"/>
               </a:ext>
               <a:ext uri="{C183D7F6-B498-43B3-948B-1728B52AA6E4}">
-                <adec:decorative xmlns="" xmlns:adec="http://schemas.microsoft.com/office/drawing/2017/decorative" val="1"/>
+                <adec:decorative xmlns:adec="http://schemas.microsoft.com/office/drawing/2017/decorative" xmlns="" val="1"/>
               </a:ext>
             </a:extLst>
           </p:cNvPr>
@@ -42840,7 +42843,7 @@
                 <a16:creationId xmlns:a16="http://schemas.microsoft.com/office/drawing/2014/main" id="{241C7FC4-FEFA-4A96-9749-9068C68611EF}"/>
               </a:ext>
               <a:ext uri="{C183D7F6-B498-43B3-948B-1728B52AA6E4}">
-                <adec:decorative xmlns="" xmlns:adec="http://schemas.microsoft.com/office/drawing/2017/decorative" val="1"/>
+                <adec:decorative xmlns:adec="http://schemas.microsoft.com/office/drawing/2017/decorative" xmlns="" val="1"/>
               </a:ext>
             </a:extLst>
           </p:cNvPr>
@@ -42956,7 +42959,7 @@
                 <a16:creationId xmlns:a16="http://schemas.microsoft.com/office/drawing/2014/main" id="{294AEDC0-6B1D-4A3D-860D-83756CC387D3}"/>
               </a:ext>
               <a:ext uri="{C183D7F6-B498-43B3-948B-1728B52AA6E4}">
-                <adec:decorative xmlns="" xmlns:adec="http://schemas.microsoft.com/office/drawing/2017/decorative" val="1"/>
+                <adec:decorative xmlns:adec="http://schemas.microsoft.com/office/drawing/2017/decorative" xmlns="" val="1"/>
               </a:ext>
             </a:extLst>
           </p:cNvPr>
@@ -43555,7 +43558,7 @@
                 <a16:creationId xmlns:a16="http://schemas.microsoft.com/office/drawing/2014/main" id="{D14F9816-D761-44CD-80AC-A13A6A2BF4F4}"/>
               </a:ext>
               <a:ext uri="{C183D7F6-B498-43B3-948B-1728B52AA6E4}">
-                <adec:decorative xmlns="" xmlns:adec="http://schemas.microsoft.com/office/drawing/2017/decorative" val="1"/>
+                <adec:decorative xmlns:adec="http://schemas.microsoft.com/office/drawing/2017/decorative" xmlns="" val="1"/>
               </a:ext>
             </a:extLst>
           </p:cNvPr>
@@ -44439,7 +44442,7 @@
                 <a16:creationId xmlns:a16="http://schemas.microsoft.com/office/drawing/2014/main" id="{E6D6E19C-DE46-4402-8CBF-17BB95458532}"/>
               </a:ext>
               <a:ext uri="{C183D7F6-B498-43B3-948B-1728B52AA6E4}">
-                <adec:decorative xmlns="" xmlns:adec="http://schemas.microsoft.com/office/drawing/2017/decorative" val="1"/>
+                <adec:decorative xmlns:adec="http://schemas.microsoft.com/office/drawing/2017/decorative" xmlns="" val="1"/>
               </a:ext>
             </a:extLst>
           </p:cNvPr>
@@ -45182,7 +45185,7 @@
                 <a16:creationId xmlns:a16="http://schemas.microsoft.com/office/drawing/2014/main" id="{C8431200-8E45-4A0C-B12B-CFA1B2C53C47}"/>
               </a:ext>
               <a:ext uri="{C183D7F6-B498-43B3-948B-1728B52AA6E4}">
-                <adec:decorative xmlns="" xmlns:adec="http://schemas.microsoft.com/office/drawing/2017/decorative" val="1"/>
+                <adec:decorative xmlns:adec="http://schemas.microsoft.com/office/drawing/2017/decorative" xmlns="" val="1"/>
               </a:ext>
             </a:extLst>
           </p:cNvPr>
@@ -45242,7 +45245,7 @@
                 <a16:creationId xmlns:a16="http://schemas.microsoft.com/office/drawing/2014/main" id="{241C7FC4-FEFA-4A96-9749-9068C68611EF}"/>
               </a:ext>
               <a:ext uri="{C183D7F6-B498-43B3-948B-1728B52AA6E4}">
-                <adec:decorative xmlns="" xmlns:adec="http://schemas.microsoft.com/office/drawing/2017/decorative" val="1"/>
+                <adec:decorative xmlns:adec="http://schemas.microsoft.com/office/drawing/2017/decorative" xmlns="" val="1"/>
               </a:ext>
             </a:extLst>
           </p:cNvPr>
@@ -45358,7 +45361,7 @@
                 <a16:creationId xmlns:a16="http://schemas.microsoft.com/office/drawing/2014/main" id="{294AEDC0-6B1D-4A3D-860D-83756CC387D3}"/>
               </a:ext>
               <a:ext uri="{C183D7F6-B498-43B3-948B-1728B52AA6E4}">
-                <adec:decorative xmlns="" xmlns:adec="http://schemas.microsoft.com/office/drawing/2017/decorative" val="1"/>
+                <adec:decorative xmlns:adec="http://schemas.microsoft.com/office/drawing/2017/decorative" xmlns="" val="1"/>
               </a:ext>
             </a:extLst>
           </p:cNvPr>

</xml_diff>

<commit_message>
Fixed some bugs. Updated presentation and text for presentation. Also added video
</commit_message>
<xml_diff>
--- a/NeoBrain.pptx
+++ b/NeoBrain.pptx
@@ -1361,7 +1361,7 @@
             <a:pPr rtl="0"/>
             <a:fld id="{84D28F2D-D4F3-4E2B-A0F3-7AAFDE0BC58B}" type="datetime1">
               <a:rPr lang="ru-RU" smtClean="0"/>
-              <a:t>13.04.2020</a:t>
+              <a:t>14.05.2020</a:t>
             </a:fld>
             <a:endParaRPr lang="ru-RU" dirty="0"/>
           </a:p>
@@ -1542,7 +1542,7 @@
             <a:fld id="{CA49951C-CA37-4221-943D-71E64EEEA549}" type="datetime1">
               <a:rPr lang="ru-RU" smtClean="0"/>
               <a:pPr/>
-              <a:t>13.04.2020</a:t>
+              <a:t>14.05.2020</a:t>
             </a:fld>
             <a:endParaRPr lang="ru-RU" dirty="0"/>
           </a:p>
@@ -3257,7 +3257,7 @@
             <a:pPr rtl="0"/>
             <a:fld id="{1BCB67F5-0266-4F57-BCC8-CAA9673E5902}" type="datetime1">
               <a:rPr lang="ru-RU" noProof="0" smtClean="0"/>
-              <a:t>13.04.2020</a:t>
+              <a:t>14.05.2020</a:t>
             </a:fld>
             <a:endParaRPr lang="ru-RU" noProof="0" dirty="0"/>
           </a:p>
@@ -3461,7 +3461,7 @@
             <a:pPr rtl="0"/>
             <a:fld id="{1B5ADB00-8AAA-4C20-B03B-A012746A2014}" type="datetime1">
               <a:rPr lang="ru-RU" noProof="0" smtClean="0"/>
-              <a:t>13.04.2020</a:t>
+              <a:t>14.05.2020</a:t>
             </a:fld>
             <a:endParaRPr lang="ru-RU" noProof="0" dirty="0"/>
           </a:p>
@@ -3675,7 +3675,7 @@
             <a:pPr rtl="0"/>
             <a:fld id="{7C0EA85A-0755-4D64-85AE-4D684CB44117}" type="datetime1">
               <a:rPr lang="ru-RU" noProof="0" smtClean="0"/>
-              <a:t>13.04.2020</a:t>
+              <a:t>14.05.2020</a:t>
             </a:fld>
             <a:endParaRPr lang="ru-RU" noProof="0" dirty="0"/>
           </a:p>
@@ -3879,7 +3879,7 @@
             <a:pPr rtl="0"/>
             <a:fld id="{82200F68-8153-43BD-9048-5E0203738055}" type="datetime1">
               <a:rPr lang="ru-RU" noProof="0" smtClean="0"/>
-              <a:t>13.04.2020</a:t>
+              <a:t>14.05.2020</a:t>
             </a:fld>
             <a:endParaRPr lang="ru-RU" noProof="0" dirty="0"/>
           </a:p>
@@ -4159,7 +4159,7 @@
             <a:pPr rtl="0"/>
             <a:fld id="{DEE6A3E5-DF0B-4BB4-83EC-7350AED6B333}" type="datetime1">
               <a:rPr lang="ru-RU" noProof="0" smtClean="0"/>
-              <a:t>13.04.2020</a:t>
+              <a:t>14.05.2020</a:t>
             </a:fld>
             <a:endParaRPr lang="ru-RU" noProof="0" dirty="0"/>
           </a:p>
@@ -4431,7 +4431,7 @@
             <a:pPr rtl="0"/>
             <a:fld id="{658B5BE7-11FF-4B74-A258-0B0852B1C612}" type="datetime1">
               <a:rPr lang="ru-RU" noProof="0" smtClean="0"/>
-              <a:t>13.04.2020</a:t>
+              <a:t>14.05.2020</a:t>
             </a:fld>
             <a:endParaRPr lang="ru-RU" noProof="0" dirty="0"/>
           </a:p>
@@ -4850,7 +4850,7 @@
             <a:pPr rtl="0"/>
             <a:fld id="{5153AEB0-DEE4-469A-ACA7-FCE298962CB8}" type="datetime1">
               <a:rPr lang="ru-RU" noProof="0" smtClean="0"/>
-              <a:t>13.04.2020</a:t>
+              <a:t>14.05.2020</a:t>
             </a:fld>
             <a:endParaRPr lang="ru-RU" noProof="0" dirty="0"/>
           </a:p>
@@ -4996,7 +4996,7 @@
             <a:pPr rtl="0"/>
             <a:fld id="{A7D850CA-FEA9-4ECA-92F5-9F1778664B8F}" type="datetime1">
               <a:rPr lang="ru-RU" noProof="0" smtClean="0"/>
-              <a:t>13.04.2020</a:t>
+              <a:t>14.05.2020</a:t>
             </a:fld>
             <a:endParaRPr lang="ru-RU" noProof="0" dirty="0"/>
           </a:p>
@@ -5112,7 +5112,7 @@
             <a:pPr rtl="0"/>
             <a:fld id="{BDD77D1A-AB3F-4195-91BD-ED29ADAC1B44}" type="datetime1">
               <a:rPr lang="ru-RU" noProof="0" smtClean="0"/>
-              <a:t>13.04.2020</a:t>
+              <a:t>14.05.2020</a:t>
             </a:fld>
             <a:endParaRPr lang="ru-RU" noProof="0" dirty="0"/>
           </a:p>
@@ -5429,7 +5429,7 @@
             <a:pPr rtl="0"/>
             <a:fld id="{376F1AFD-3CC9-4493-BC63-1C141B05CE5B}" type="datetime1">
               <a:rPr lang="ru-RU" noProof="0" smtClean="0"/>
-              <a:t>13.04.2020</a:t>
+              <a:t>14.05.2020</a:t>
             </a:fld>
             <a:endParaRPr lang="ru-RU" noProof="0" dirty="0"/>
           </a:p>
@@ -5727,7 +5727,7 @@
             <a:pPr rtl="0"/>
             <a:fld id="{6F578092-39FE-416A-9517-019E99EC9D0E}" type="datetime1">
               <a:rPr lang="ru-RU" noProof="0" smtClean="0"/>
-              <a:t>13.04.2020</a:t>
+              <a:t>14.05.2020</a:t>
             </a:fld>
             <a:endParaRPr lang="ru-RU" noProof="0" dirty="0"/>
           </a:p>
@@ -5972,7 +5972,7 @@
             <a:pPr rtl="0"/>
             <a:fld id="{368E1444-B5BA-4767-8208-964378902D11}" type="datetime1">
               <a:rPr lang="ru-RU" noProof="0" smtClean="0"/>
-              <a:t>13.04.2020</a:t>
+              <a:t>14.05.2020</a:t>
             </a:fld>
             <a:endParaRPr lang="ru-RU" noProof="0" dirty="0"/>
           </a:p>
@@ -9100,20 +9100,55 @@
       </p:sp>
       <p:pic>
         <p:nvPicPr>
-          <p:cNvPr id="5" name="Рисунок 4">
+          <p:cNvPr id="21" name="Picture 2" descr="https://myitschool.ru/is/Temp/6de8160f1fd025b6fa336272db8d42b4/SAMSUNG_IT_Academy_Logo_RU.png"/>
+          <p:cNvPicPr>
+            <a:picLocks noChangeAspect="1" noChangeArrowheads="1"/>
+          </p:cNvPicPr>
+          <p:nvPr/>
+        </p:nvPicPr>
+        <p:blipFill>
+          <a:blip r:embed="rId3" cstate="hqprint">
             <a:extLst>
-              <a:ext uri="{FF2B5EF4-FFF2-40B4-BE49-F238E27FC236}">
-                <a16:creationId xmlns:a16="http://schemas.microsoft.com/office/drawing/2014/main" id="{58EB85A8-65F5-4BC7-9B1A-67A6C855DE82}"/>
+              <a:ext uri="{28A0092B-C50C-407E-A947-70E740481C1C}">
+                <a14:useLocalDpi xmlns:a14="http://schemas.microsoft.com/office/drawing/2010/main" val="0"/>
               </a:ext>
             </a:extLst>
-          </p:cNvPr>
+          </a:blip>
+          <a:srcRect/>
+          <a:stretch>
+            <a:fillRect/>
+          </a:stretch>
+        </p:blipFill>
+        <p:spPr bwMode="auto">
+          <a:xfrm>
+            <a:off x="1842578" y="478302"/>
+            <a:ext cx="2101990" cy="738537"/>
+          </a:xfrm>
+          <a:prstGeom prst="rect">
+            <a:avLst/>
+          </a:prstGeom>
+          <a:noFill/>
+          <a:extLst>
+            <a:ext uri="{909E8E84-426E-40DD-AFC4-6F175D3DCCD1}">
+              <a14:hiddenFill xmlns:a14="http://schemas.microsoft.com/office/drawing/2010/main">
+                <a:solidFill>
+                  <a:srgbClr val="FFFFFF"/>
+                </a:solidFill>
+              </a14:hiddenFill>
+            </a:ext>
+          </a:extLst>
+        </p:spPr>
+      </p:pic>
+      <p:pic>
+        <p:nvPicPr>
+          <p:cNvPr id="4" name="Рисунок 3"/>
           <p:cNvPicPr>
             <a:picLocks noChangeAspect="1"/>
           </p:cNvPicPr>
           <p:nvPr/>
         </p:nvPicPr>
         <p:blipFill>
-          <a:blip r:embed="rId3">
+          <a:blip r:embed="rId4" cstate="hqprint">
             <a:extLst>
               <a:ext uri="{28A0092B-C50C-407E-A947-70E740481C1C}">
                 <a14:useLocalDpi xmlns:a14="http://schemas.microsoft.com/office/drawing/2010/main" val="0"/>
@@ -9126,8 +9161,8 @@
         </p:blipFill>
         <p:spPr>
           <a:xfrm>
-            <a:off x="736270" y="454867"/>
-            <a:ext cx="761972" cy="761972"/>
+            <a:off x="1060907" y="514645"/>
+            <a:ext cx="702194" cy="702194"/>
           </a:xfrm>
           <a:prstGeom prst="rect">
             <a:avLst/>
@@ -9193,7 +9228,7 @@
                                           </p:stCondLst>
                                         </p:cTn>
                                         <p:tgtEl>
-                                          <p:spTgt spid="2"/>
+                                          <p:spTgt spid="4"/>
                                         </p:tgtEl>
                                         <p:attrNameLst>
                                           <p:attrName>style.visibility</p:attrName>
@@ -9207,13 +9242,175 @@
                                       <p:cBhvr>
                                         <p:cTn id="7" dur="1000"/>
                                         <p:tgtEl>
+                                          <p:spTgt spid="4"/>
+                                        </p:tgtEl>
+                                      </p:cBhvr>
+                                    </p:animEffect>
+                                    <p:anim calcmode="lin" valueType="num">
+                                      <p:cBhvr>
+                                        <p:cTn id="8" dur="1000" fill="hold"/>
+                                        <p:tgtEl>
+                                          <p:spTgt spid="4"/>
+                                        </p:tgtEl>
+                                        <p:attrNameLst>
+                                          <p:attrName>ppt_x</p:attrName>
+                                        </p:attrNameLst>
+                                      </p:cBhvr>
+                                      <p:tavLst>
+                                        <p:tav tm="0">
+                                          <p:val>
+                                            <p:strVal val="#ppt_x"/>
+                                          </p:val>
+                                        </p:tav>
+                                        <p:tav tm="100000">
+                                          <p:val>
+                                            <p:strVal val="#ppt_x"/>
+                                          </p:val>
+                                        </p:tav>
+                                      </p:tavLst>
+                                    </p:anim>
+                                    <p:anim calcmode="lin" valueType="num">
+                                      <p:cBhvr>
+                                        <p:cTn id="9" dur="1000" fill="hold"/>
+                                        <p:tgtEl>
+                                          <p:spTgt spid="4"/>
+                                        </p:tgtEl>
+                                        <p:attrNameLst>
+                                          <p:attrName>ppt_y</p:attrName>
+                                        </p:attrNameLst>
+                                      </p:cBhvr>
+                                      <p:tavLst>
+                                        <p:tav tm="0">
+                                          <p:val>
+                                            <p:strVal val="#ppt_y+.1"/>
+                                          </p:val>
+                                        </p:tav>
+                                        <p:tav tm="100000">
+                                          <p:val>
+                                            <p:strVal val="#ppt_y"/>
+                                          </p:val>
+                                        </p:tav>
+                                      </p:tavLst>
+                                    </p:anim>
+                                  </p:childTnLst>
+                                </p:cTn>
+                              </p:par>
+                              <p:par>
+                                <p:cTn id="10" presetID="42" presetClass="entr" presetSubtype="0" fill="hold" nodeType="withEffect">
+                                  <p:stCondLst>
+                                    <p:cond delay="0"/>
+                                  </p:stCondLst>
+                                  <p:childTnLst>
+                                    <p:set>
+                                      <p:cBhvr>
+                                        <p:cTn id="11" dur="1" fill="hold">
+                                          <p:stCondLst>
+                                            <p:cond delay="0"/>
+                                          </p:stCondLst>
+                                        </p:cTn>
+                                        <p:tgtEl>
+                                          <p:spTgt spid="21"/>
+                                        </p:tgtEl>
+                                        <p:attrNameLst>
+                                          <p:attrName>style.visibility</p:attrName>
+                                        </p:attrNameLst>
+                                      </p:cBhvr>
+                                      <p:to>
+                                        <p:strVal val="visible"/>
+                                      </p:to>
+                                    </p:set>
+                                    <p:animEffect transition="in" filter="fade">
+                                      <p:cBhvr>
+                                        <p:cTn id="12" dur="1000"/>
+                                        <p:tgtEl>
+                                          <p:spTgt spid="21"/>
+                                        </p:tgtEl>
+                                      </p:cBhvr>
+                                    </p:animEffect>
+                                    <p:anim calcmode="lin" valueType="num">
+                                      <p:cBhvr>
+                                        <p:cTn id="13" dur="1000" fill="hold"/>
+                                        <p:tgtEl>
+                                          <p:spTgt spid="21"/>
+                                        </p:tgtEl>
+                                        <p:attrNameLst>
+                                          <p:attrName>ppt_x</p:attrName>
+                                        </p:attrNameLst>
+                                      </p:cBhvr>
+                                      <p:tavLst>
+                                        <p:tav tm="0">
+                                          <p:val>
+                                            <p:strVal val="#ppt_x"/>
+                                          </p:val>
+                                        </p:tav>
+                                        <p:tav tm="100000">
+                                          <p:val>
+                                            <p:strVal val="#ppt_x"/>
+                                          </p:val>
+                                        </p:tav>
+                                      </p:tavLst>
+                                    </p:anim>
+                                    <p:anim calcmode="lin" valueType="num">
+                                      <p:cBhvr>
+                                        <p:cTn id="14" dur="1000" fill="hold"/>
+                                        <p:tgtEl>
+                                          <p:spTgt spid="21"/>
+                                        </p:tgtEl>
+                                        <p:attrNameLst>
+                                          <p:attrName>ppt_y</p:attrName>
+                                        </p:attrNameLst>
+                                      </p:cBhvr>
+                                      <p:tavLst>
+                                        <p:tav tm="0">
+                                          <p:val>
+                                            <p:strVal val="#ppt_y+.1"/>
+                                          </p:val>
+                                        </p:tav>
+                                        <p:tav tm="100000">
+                                          <p:val>
+                                            <p:strVal val="#ppt_y"/>
+                                          </p:val>
+                                        </p:tav>
+                                      </p:tavLst>
+                                    </p:anim>
+                                  </p:childTnLst>
+                                </p:cTn>
+                              </p:par>
+                              <p:par>
+                                <p:cTn id="15" presetID="42" presetClass="entr" presetSubtype="0" fill="hold" nodeType="withEffect">
+                                  <p:stCondLst>
+                                    <p:cond delay="0"/>
+                                  </p:stCondLst>
+                                  <p:childTnLst>
+                                    <p:set>
+                                      <p:cBhvr>
+                                        <p:cTn id="16" dur="1" fill="hold">
+                                          <p:stCondLst>
+                                            <p:cond delay="0"/>
+                                          </p:stCondLst>
+                                        </p:cTn>
+                                        <p:tgtEl>
+                                          <p:spTgt spid="2"/>
+                                        </p:tgtEl>
+                                        <p:attrNameLst>
+                                          <p:attrName>style.visibility</p:attrName>
+                                        </p:attrNameLst>
+                                      </p:cBhvr>
+                                      <p:to>
+                                        <p:strVal val="visible"/>
+                                      </p:to>
+                                    </p:set>
+                                    <p:animEffect transition="in" filter="fade">
+                                      <p:cBhvr>
+                                        <p:cTn id="17" dur="1000"/>
+                                        <p:tgtEl>
                                           <p:spTgt spid="2"/>
                                         </p:tgtEl>
                                       </p:cBhvr>
                                     </p:animEffect>
                                     <p:anim calcmode="lin" valueType="num">
                                       <p:cBhvr>
-                                        <p:cTn id="8" dur="1000" fill="hold"/>
+                                        <p:cTn id="18" dur="1000" fill="hold"/>
                                         <p:tgtEl>
                                           <p:spTgt spid="2"/>
                                         </p:tgtEl>
@@ -9236,7 +9433,7 @@
                                     </p:anim>
                                     <p:anim calcmode="lin" valueType="num">
                                       <p:cBhvr>
-                                        <p:cTn id="9" dur="1000" fill="hold"/>
+                                        <p:cTn id="19" dur="1000" fill="hold"/>
                                         <p:tgtEl>
                                           <p:spTgt spid="2"/>
                                         </p:tgtEl>
@@ -9261,14 +9458,14 @@
                                 </p:cTn>
                               </p:par>
                               <p:par>
-                                <p:cTn id="10" presetID="42" presetClass="entr" presetSubtype="0" fill="hold" grpId="0" nodeType="withEffect">
+                                <p:cTn id="20" presetID="42" presetClass="entr" presetSubtype="0" fill="hold" grpId="0" nodeType="withEffect">
                                   <p:stCondLst>
                                     <p:cond delay="0"/>
                                   </p:stCondLst>
                                   <p:childTnLst>
                                     <p:set>
                                       <p:cBhvr>
-                                        <p:cTn id="11" dur="1" fill="hold">
+                                        <p:cTn id="21" dur="1" fill="hold">
                                           <p:stCondLst>
                                             <p:cond delay="0"/>
                                           </p:stCondLst>
@@ -9286,7 +9483,7 @@
                                     </p:set>
                                     <p:animEffect transition="in" filter="fade">
                                       <p:cBhvr>
-                                        <p:cTn id="12" dur="1000"/>
+                                        <p:cTn id="22" dur="1000"/>
                                         <p:tgtEl>
                                           <p:spTgt spid="24"/>
                                         </p:tgtEl>
@@ -9294,7 +9491,7 @@
                                     </p:animEffect>
                                     <p:anim calcmode="lin" valueType="num">
                                       <p:cBhvr>
-                                        <p:cTn id="13" dur="1000" fill="hold"/>
+                                        <p:cTn id="23" dur="1000" fill="hold"/>
                                         <p:tgtEl>
                                           <p:spTgt spid="24"/>
                                         </p:tgtEl>
@@ -9317,7 +9514,7 @@
                                     </p:anim>
                                     <p:anim calcmode="lin" valueType="num">
                                       <p:cBhvr>
-                                        <p:cTn id="14" dur="1000" fill="hold"/>
+                                        <p:cTn id="24" dur="1000" fill="hold"/>
                                         <p:tgtEl>
                                           <p:spTgt spid="24"/>
                                         </p:tgtEl>
@@ -9342,14 +9539,14 @@
                                 </p:cTn>
                               </p:par>
                               <p:par>
-                                <p:cTn id="15" presetID="42" presetClass="entr" presetSubtype="0" fill="hold" grpId="0" nodeType="withEffect">
+                                <p:cTn id="25" presetID="42" presetClass="entr" presetSubtype="0" fill="hold" grpId="0" nodeType="withEffect">
                                   <p:stCondLst>
                                     <p:cond delay="0"/>
                                   </p:stCondLst>
                                   <p:childTnLst>
                                     <p:set>
                                       <p:cBhvr>
-                                        <p:cTn id="16" dur="1" fill="hold">
+                                        <p:cTn id="26" dur="1" fill="hold">
                                           <p:stCondLst>
                                             <p:cond delay="0"/>
                                           </p:stCondLst>
@@ -9367,7 +9564,7 @@
                                     </p:set>
                                     <p:animEffect transition="in" filter="fade">
                                       <p:cBhvr>
-                                        <p:cTn id="17" dur="1000"/>
+                                        <p:cTn id="27" dur="1000"/>
                                         <p:tgtEl>
                                           <p:spTgt spid="55"/>
                                         </p:tgtEl>
@@ -9375,7 +9572,7 @@
                                     </p:animEffect>
                                     <p:anim calcmode="lin" valueType="num">
                                       <p:cBhvr>
-                                        <p:cTn id="18" dur="1000" fill="hold"/>
+                                        <p:cTn id="28" dur="1000" fill="hold"/>
                                         <p:tgtEl>
                                           <p:spTgt spid="55"/>
                                         </p:tgtEl>
@@ -9398,7 +9595,7 @@
                                     </p:anim>
                                     <p:anim calcmode="lin" valueType="num">
                                       <p:cBhvr>
-                                        <p:cTn id="19" dur="1000" fill="hold"/>
+                                        <p:cTn id="29" dur="1000" fill="hold"/>
                                         <p:tgtEl>
                                           <p:spTgt spid="55"/>
                                         </p:tgtEl>
@@ -9423,14 +9620,14 @@
                                 </p:cTn>
                               </p:par>
                               <p:par>
-                                <p:cTn id="20" presetID="42" presetClass="entr" presetSubtype="0" fill="hold" nodeType="withEffect">
+                                <p:cTn id="30" presetID="42" presetClass="entr" presetSubtype="0" fill="hold" nodeType="withEffect">
                                   <p:stCondLst>
                                     <p:cond delay="0"/>
                                   </p:stCondLst>
                                   <p:childTnLst>
                                     <p:set>
                                       <p:cBhvr>
-                                        <p:cTn id="21" dur="1" fill="hold">
+                                        <p:cTn id="31" dur="1" fill="hold">
                                           <p:stCondLst>
                                             <p:cond delay="0"/>
                                           </p:stCondLst>
@@ -9448,7 +9645,7 @@
                                     </p:set>
                                     <p:animEffect transition="in" filter="fade">
                                       <p:cBhvr>
-                                        <p:cTn id="22" dur="2000"/>
+                                        <p:cTn id="32" dur="2000"/>
                                         <p:tgtEl>
                                           <p:spTgt spid="56"/>
                                         </p:tgtEl>
@@ -9456,7 +9653,7 @@
                                     </p:animEffect>
                                     <p:anim calcmode="lin" valueType="num">
                                       <p:cBhvr>
-                                        <p:cTn id="23" dur="2000" fill="hold"/>
+                                        <p:cTn id="33" dur="2000" fill="hold"/>
                                         <p:tgtEl>
                                           <p:spTgt spid="56"/>
                                         </p:tgtEl>
@@ -9479,90 +9676,9 @@
                                     </p:anim>
                                     <p:anim calcmode="lin" valueType="num">
                                       <p:cBhvr>
-                                        <p:cTn id="24" dur="2000" fill="hold"/>
+                                        <p:cTn id="34" dur="2000" fill="hold"/>
                                         <p:tgtEl>
                                           <p:spTgt spid="56"/>
-                                        </p:tgtEl>
-                                        <p:attrNameLst>
-                                          <p:attrName>ppt_y</p:attrName>
-                                        </p:attrNameLst>
-                                      </p:cBhvr>
-                                      <p:tavLst>
-                                        <p:tav tm="0">
-                                          <p:val>
-                                            <p:strVal val="#ppt_y+.1"/>
-                                          </p:val>
-                                        </p:tav>
-                                        <p:tav tm="100000">
-                                          <p:val>
-                                            <p:strVal val="#ppt_y"/>
-                                          </p:val>
-                                        </p:tav>
-                                      </p:tavLst>
-                                    </p:anim>
-                                  </p:childTnLst>
-                                </p:cTn>
-                              </p:par>
-                              <p:par>
-                                <p:cTn id="25" presetID="42" presetClass="entr" presetSubtype="0" fill="hold" nodeType="withEffect">
-                                  <p:stCondLst>
-                                    <p:cond delay="0"/>
-                                  </p:stCondLst>
-                                  <p:childTnLst>
-                                    <p:set>
-                                      <p:cBhvr>
-                                        <p:cTn id="26" dur="1" fill="hold">
-                                          <p:stCondLst>
-                                            <p:cond delay="0"/>
-                                          </p:stCondLst>
-                                        </p:cTn>
-                                        <p:tgtEl>
-                                          <p:spTgt spid="5"/>
-                                        </p:tgtEl>
-                                        <p:attrNameLst>
-                                          <p:attrName>style.visibility</p:attrName>
-                                        </p:attrNameLst>
-                                      </p:cBhvr>
-                                      <p:to>
-                                        <p:strVal val="visible"/>
-                                      </p:to>
-                                    </p:set>
-                                    <p:animEffect transition="in" filter="fade">
-                                      <p:cBhvr>
-                                        <p:cTn id="27" dur="2000"/>
-                                        <p:tgtEl>
-                                          <p:spTgt spid="5"/>
-                                        </p:tgtEl>
-                                      </p:cBhvr>
-                                    </p:animEffect>
-                                    <p:anim calcmode="lin" valueType="num">
-                                      <p:cBhvr>
-                                        <p:cTn id="28" dur="2000" fill="hold"/>
-                                        <p:tgtEl>
-                                          <p:spTgt spid="5"/>
-                                        </p:tgtEl>
-                                        <p:attrNameLst>
-                                          <p:attrName>ppt_x</p:attrName>
-                                        </p:attrNameLst>
-                                      </p:cBhvr>
-                                      <p:tavLst>
-                                        <p:tav tm="0">
-                                          <p:val>
-                                            <p:strVal val="#ppt_x"/>
-                                          </p:val>
-                                        </p:tav>
-                                        <p:tav tm="100000">
-                                          <p:val>
-                                            <p:strVal val="#ppt_x"/>
-                                          </p:val>
-                                        </p:tav>
-                                      </p:tavLst>
-                                    </p:anim>
-                                    <p:anim calcmode="lin" valueType="num">
-                                      <p:cBhvr>
-                                        <p:cTn id="29" dur="2000" fill="hold"/>
-                                        <p:tgtEl>
-                                          <p:spTgt spid="5"/>
                                         </p:tgtEl>
                                         <p:attrNameLst>
                                           <p:attrName>ppt_y</p:attrName>
@@ -9787,7 +9903,7 @@
                 <a16:creationId xmlns:a16="http://schemas.microsoft.com/office/drawing/2014/main" id="{C8431200-8E45-4A0C-B12B-CFA1B2C53C47}"/>
               </a:ext>
               <a:ext uri="{C183D7F6-B498-43B3-948B-1728B52AA6E4}">
-                <adec:decorative xmlns:adec="http://schemas.microsoft.com/office/drawing/2017/decorative" xmlns="" val="1"/>
+                <adec:decorative xmlns="" xmlns:adec="http://schemas.microsoft.com/office/drawing/2017/decorative" val="1"/>
               </a:ext>
             </a:extLst>
           </p:cNvPr>
@@ -9847,7 +9963,7 @@
                 <a16:creationId xmlns:a16="http://schemas.microsoft.com/office/drawing/2014/main" id="{241C7FC4-FEFA-4A96-9749-9068C68611EF}"/>
               </a:ext>
               <a:ext uri="{C183D7F6-B498-43B3-948B-1728B52AA6E4}">
-                <adec:decorative xmlns:adec="http://schemas.microsoft.com/office/drawing/2017/decorative" xmlns="" val="1"/>
+                <adec:decorative xmlns="" xmlns:adec="http://schemas.microsoft.com/office/drawing/2017/decorative" val="1"/>
               </a:ext>
             </a:extLst>
           </p:cNvPr>
@@ -9963,7 +10079,7 @@
                 <a16:creationId xmlns:a16="http://schemas.microsoft.com/office/drawing/2014/main" id="{294AEDC0-6B1D-4A3D-860D-83756CC387D3}"/>
               </a:ext>
               <a:ext uri="{C183D7F6-B498-43B3-948B-1728B52AA6E4}">
-                <adec:decorative xmlns:adec="http://schemas.microsoft.com/office/drawing/2017/decorative" xmlns="" val="1"/>
+                <adec:decorative xmlns="" xmlns:adec="http://schemas.microsoft.com/office/drawing/2017/decorative" val="1"/>
               </a:ext>
             </a:extLst>
           </p:cNvPr>
@@ -10527,6 +10643,9 @@
   <p:clrMapOvr>
     <a:masterClrMapping/>
   </p:clrMapOvr>
+  <p:transition spd="slow">
+    <p:push dir="u"/>
+  </p:transition>
   <p:timing>
     <p:tnLst>
       <p:par>
@@ -10562,7 +10681,7 @@
                 <a16:creationId xmlns:a16="http://schemas.microsoft.com/office/drawing/2014/main" id="{D14F9816-D761-44CD-80AC-A13A6A2BF4F4}"/>
               </a:ext>
               <a:ext uri="{C183D7F6-B498-43B3-948B-1728B52AA6E4}">
-                <adec:decorative xmlns:adec="http://schemas.microsoft.com/office/drawing/2017/decorative" xmlns="" val="1"/>
+                <adec:decorative xmlns="" xmlns:adec="http://schemas.microsoft.com/office/drawing/2017/decorative" val="1"/>
               </a:ext>
             </a:extLst>
           </p:cNvPr>
@@ -11446,7 +11565,7 @@
                 <a16:creationId xmlns:a16="http://schemas.microsoft.com/office/drawing/2014/main" id="{E6D6E19C-DE46-4402-8CBF-17BB95458532}"/>
               </a:ext>
               <a:ext uri="{C183D7F6-B498-43B3-948B-1728B52AA6E4}">
-                <adec:decorative xmlns:adec="http://schemas.microsoft.com/office/drawing/2017/decorative" xmlns="" val="1"/>
+                <adec:decorative xmlns="" xmlns:adec="http://schemas.microsoft.com/office/drawing/2017/decorative" val="1"/>
               </a:ext>
             </a:extLst>
           </p:cNvPr>
@@ -12090,6 +12209,18 @@
   <p:clrMapOvr>
     <a:masterClrMapping/>
   </p:clrMapOvr>
+  <mc:AlternateContent xmlns:mc="http://schemas.openxmlformats.org/markup-compatibility/2006">
+    <mc:Choice xmlns:p14="http://schemas.microsoft.com/office/powerpoint/2010/main" Requires="p14">
+      <p:transition spd="slow" p14:dur="1500">
+        <p:split orient="vert"/>
+      </p:transition>
+    </mc:Choice>
+    <mc:Fallback>
+      <p:transition spd="slow">
+        <p:split orient="vert"/>
+      </p:transition>
+    </mc:Fallback>
+  </mc:AlternateContent>
   <p:timing>
     <p:tnLst>
       <p:par>
@@ -12125,7 +12256,7 @@
                 <a16:creationId xmlns:a16="http://schemas.microsoft.com/office/drawing/2014/main" id="{3638C06D-F644-4B33-8858-D880F038FAC3}"/>
               </a:ext>
               <a:ext uri="{C183D7F6-B498-43B3-948B-1728B52AA6E4}">
-                <adec:decorative xmlns:adec="http://schemas.microsoft.com/office/drawing/2017/decorative" xmlns="" val="1"/>
+                <adec:decorative xmlns="" xmlns:adec="http://schemas.microsoft.com/office/drawing/2017/decorative" val="1"/>
               </a:ext>
             </a:extLst>
           </p:cNvPr>
@@ -17360,7 +17491,7 @@
                 <a16:creationId xmlns:a16="http://schemas.microsoft.com/office/drawing/2014/main" id="{6D08E99A-0644-4757-9F3A-BBA1A4F39081}"/>
               </a:ext>
               <a:ext uri="{C183D7F6-B498-43B3-948B-1728B52AA6E4}">
-                <adec:decorative xmlns:adec="http://schemas.microsoft.com/office/drawing/2017/decorative" xmlns="" val="1"/>
+                <adec:decorative xmlns="" xmlns:adec="http://schemas.microsoft.com/office/drawing/2017/decorative" val="1"/>
               </a:ext>
             </a:extLst>
           </p:cNvPr>
@@ -17406,7 +17537,7 @@
                 <a16:creationId xmlns:a16="http://schemas.microsoft.com/office/drawing/2014/main" id="{A21B85DB-181D-46E7-A9DF-F92B1DF032FD}"/>
               </a:ext>
               <a:ext uri="{C183D7F6-B498-43B3-948B-1728B52AA6E4}">
-                <adec:decorative xmlns:adec="http://schemas.microsoft.com/office/drawing/2017/decorative" xmlns="" val="1"/>
+                <adec:decorative xmlns="" xmlns:adec="http://schemas.microsoft.com/office/drawing/2017/decorative" val="1"/>
               </a:ext>
             </a:extLst>
           </p:cNvPr>
@@ -17517,7 +17648,7 @@
                 <a16:creationId xmlns:a16="http://schemas.microsoft.com/office/drawing/2014/main" id="{0B8C9A86-3574-4A2E-BC62-481A2BE7FBED}"/>
               </a:ext>
               <a:ext uri="{C183D7F6-B498-43B3-948B-1728B52AA6E4}">
-                <adec:decorative xmlns:adec="http://schemas.microsoft.com/office/drawing/2017/decorative" xmlns="" val="1"/>
+                <adec:decorative xmlns="" xmlns:adec="http://schemas.microsoft.com/office/drawing/2017/decorative" val="1"/>
               </a:ext>
             </a:extLst>
           </p:cNvPr>
@@ -21020,6 +21151,18 @@
   <p:clrMapOvr>
     <a:masterClrMapping/>
   </p:clrMapOvr>
+  <mc:AlternateContent xmlns:mc="http://schemas.openxmlformats.org/markup-compatibility/2006">
+    <mc:Choice xmlns:p14="http://schemas.microsoft.com/office/powerpoint/2010/main" Requires="p14">
+      <p:transition spd="slow" p14:dur="4000">
+        <p14:vortex dir="r"/>
+      </p:transition>
+    </mc:Choice>
+    <mc:Fallback>
+      <p:transition spd="slow">
+        <p:fade/>
+      </p:transition>
+    </mc:Fallback>
+  </mc:AlternateContent>
   <p:timing>
     <p:tnLst>
       <p:par>
@@ -22303,6 +22446,18 @@
   <p:clrMapOvr>
     <a:masterClrMapping/>
   </p:clrMapOvr>
+  <mc:AlternateContent xmlns:mc="http://schemas.openxmlformats.org/markup-compatibility/2006">
+    <mc:Choice xmlns:p14="http://schemas.microsoft.com/office/powerpoint/2010/main" Requires="p14">
+      <p:transition spd="slow">
+        <p14:flash/>
+      </p:transition>
+    </mc:Choice>
+    <mc:Fallback>
+      <p:transition spd="slow">
+        <p:fade/>
+      </p:transition>
+    </mc:Fallback>
+  </mc:AlternateContent>
   <p:timing>
     <p:tnLst>
       <p:par>
@@ -22519,10 +22674,10 @@
       </p:sp>
       <p:pic>
         <p:nvPicPr>
-          <p:cNvPr id="5122" name="Picture 2">
+          <p:cNvPr id="5126" name="Picture 6">
             <a:extLst>
               <a:ext uri="{FF2B5EF4-FFF2-40B4-BE49-F238E27FC236}">
-                <a16:creationId xmlns:a16="http://schemas.microsoft.com/office/drawing/2014/main" id="{FC6386AC-8C55-4C76-8882-A6F7B6945AD0}"/>
+                <a16:creationId xmlns:a16="http://schemas.microsoft.com/office/drawing/2014/main" id="{9B3EC4CB-798F-453D-AF8C-01994893E91E}"/>
               </a:ext>
             </a:extLst>
           </p:cNvPr>
@@ -22546,102 +22701,8 @@
         </p:blipFill>
         <p:spPr bwMode="auto">
           <a:xfrm>
-            <a:off x="1020410" y="1104939"/>
-            <a:ext cx="1080000" cy="1080000"/>
-          </a:xfrm>
-          <a:prstGeom prst="rect">
-            <a:avLst/>
-          </a:prstGeom>
-          <a:noFill/>
-        </p:spPr>
-      </p:pic>
-      <p:pic>
-        <p:nvPicPr>
-          <p:cNvPr id="5124" name="Picture 4">
-            <a:extLst>
-              <a:ext uri="{FF2B5EF4-FFF2-40B4-BE49-F238E27FC236}">
-                <a16:creationId xmlns:a16="http://schemas.microsoft.com/office/drawing/2014/main" id="{4A505C20-9129-48C4-A6BC-0021979621A6}"/>
-              </a:ext>
-            </a:extLst>
-          </p:cNvPr>
-          <p:cNvPicPr>
-            <a:picLocks noChangeAspect="1" noChangeArrowheads="1"/>
-          </p:cNvPicPr>
-          <p:nvPr/>
-        </p:nvPicPr>
-        <p:blipFill>
-          <a:blip r:embed="rId5" cstate="hqprint">
-            <a:extLst>
-              <a:ext uri="{BEBA8EAE-BF5A-486C-A8C5-ECC9F3942E4B}">
-                <a14:imgProps xmlns:a14="http://schemas.microsoft.com/office/drawing/2010/main">
-                  <a14:imgLayer r:embed="rId6">
-                    <a14:imgEffect>
-                      <a14:backgroundRemoval t="10000" b="90000" l="10000" r="90000"/>
-                    </a14:imgEffect>
-                  </a14:imgLayer>
-                </a14:imgProps>
-              </a:ext>
-              <a:ext uri="{28A0092B-C50C-407E-A947-70E740481C1C}">
-                <a14:useLocalDpi xmlns:a14="http://schemas.microsoft.com/office/drawing/2010/main" val="0"/>
-              </a:ext>
-            </a:extLst>
-          </a:blip>
-          <a:srcRect/>
-          <a:stretch>
-            <a:fillRect/>
-          </a:stretch>
-        </p:blipFill>
-        <p:spPr bwMode="auto">
-          <a:xfrm>
-            <a:off x="4851600" y="1284939"/>
-            <a:ext cx="720000" cy="720000"/>
-          </a:xfrm>
-          <a:prstGeom prst="rect">
-            <a:avLst/>
-          </a:prstGeom>
-          <a:noFill/>
-          <a:extLst>
-            <a:ext uri="{909E8E84-426E-40DD-AFC4-6F175D3DCCD1}">
-              <a14:hiddenFill xmlns:a14="http://schemas.microsoft.com/office/drawing/2010/main">
-                <a:solidFill>
-                  <a:srgbClr val="FFFFFF"/>
-                </a:solidFill>
-              </a14:hiddenFill>
-            </a:ext>
-          </a:extLst>
-        </p:spPr>
-      </p:pic>
-      <p:pic>
-        <p:nvPicPr>
-          <p:cNvPr id="5126" name="Picture 6">
-            <a:extLst>
-              <a:ext uri="{FF2B5EF4-FFF2-40B4-BE49-F238E27FC236}">
-                <a16:creationId xmlns:a16="http://schemas.microsoft.com/office/drawing/2014/main" id="{9B3EC4CB-798F-453D-AF8C-01994893E91E}"/>
-              </a:ext>
-            </a:extLst>
-          </p:cNvPr>
-          <p:cNvPicPr>
-            <a:picLocks noChangeAspect="1" noChangeArrowheads="1"/>
-          </p:cNvPicPr>
-          <p:nvPr/>
-        </p:nvPicPr>
-        <p:blipFill>
-          <a:blip r:embed="rId7" cstate="hqprint">
-            <a:extLst>
-              <a:ext uri="{28A0092B-C50C-407E-A947-70E740481C1C}">
-                <a14:useLocalDpi xmlns:a14="http://schemas.microsoft.com/office/drawing/2010/main" val="0"/>
-              </a:ext>
-            </a:extLst>
-          </a:blip>
-          <a:srcRect/>
-          <a:stretch>
-            <a:fillRect/>
-          </a:stretch>
-        </p:blipFill>
-        <p:spPr bwMode="auto">
-          <a:xfrm>
-            <a:off x="2916121" y="2576698"/>
-            <a:ext cx="932871" cy="720000"/>
+            <a:off x="2824065" y="2436144"/>
+            <a:ext cx="1093453" cy="843939"/>
           </a:xfrm>
           <a:prstGeom prst="rect">
             <a:avLst/>
@@ -22666,7 +22727,7 @@
                 <a16:creationId xmlns:a16="http://schemas.microsoft.com/office/drawing/2014/main" id="{7F192ACD-9C75-481C-8934-C15F525ED96C}"/>
               </a:ext>
               <a:ext uri="{C183D7F6-B498-43B3-948B-1728B52AA6E4}">
-                <adec:decorative xmlns:adec="http://schemas.microsoft.com/office/drawing/2017/decorative" xmlns="" val="1"/>
+                <adec:decorative xmlns="" xmlns:adec="http://schemas.microsoft.com/office/drawing/2017/decorative" val="1"/>
               </a:ext>
             </a:extLst>
           </p:cNvPr>
@@ -22816,7 +22877,7 @@
                 <a16:creationId xmlns:a16="http://schemas.microsoft.com/office/drawing/2014/main" id="{5B7ACCD3-FC43-4E32-B7AA-E6D86BED1A32}"/>
               </a:ext>
               <a:ext uri="{C183D7F6-B498-43B3-948B-1728B52AA6E4}">
-                <adec:decorative xmlns:adec="http://schemas.microsoft.com/office/drawing/2017/decorative" xmlns="" val="1"/>
+                <adec:decorative xmlns="" xmlns:adec="http://schemas.microsoft.com/office/drawing/2017/decorative" val="1"/>
               </a:ext>
             </a:extLst>
           </p:cNvPr>
@@ -22871,7 +22932,7 @@
           <p:nvPr/>
         </p:nvPicPr>
         <p:blipFill>
-          <a:blip r:embed="rId8" cstate="hqprint">
+          <a:blip r:embed="rId5" cstate="hqprint">
             <a:extLst>
               <a:ext uri="{28A0092B-C50C-407E-A947-70E740481C1C}">
                 <a14:useLocalDpi xmlns:a14="http://schemas.microsoft.com/office/drawing/2010/main" val="0"/>
@@ -23011,7 +23072,7 @@
                 <a16:creationId xmlns:a16="http://schemas.microsoft.com/office/drawing/2014/main" id="{7F192ACD-9C75-481C-8934-C15F525ED96C}"/>
               </a:ext>
               <a:ext uri="{C183D7F6-B498-43B3-948B-1728B52AA6E4}">
-                <adec:decorative xmlns:adec="http://schemas.microsoft.com/office/drawing/2017/decorative" xmlns="" val="1"/>
+                <adec:decorative xmlns="" xmlns:adec="http://schemas.microsoft.com/office/drawing/2017/decorative" val="1"/>
               </a:ext>
             </a:extLst>
           </p:cNvPr>
@@ -23161,13 +23222,11 @@
                 <a16:creationId xmlns:a16="http://schemas.microsoft.com/office/drawing/2014/main" id="{5B7ACCD3-FC43-4E32-B7AA-E6D86BED1A32}"/>
               </a:ext>
               <a:ext uri="{C183D7F6-B498-43B3-948B-1728B52AA6E4}">
-                <adec:decorative xmlns:adec="http://schemas.microsoft.com/office/drawing/2017/decorative" xmlns="" val="1"/>
+                <adec:decorative xmlns="" xmlns:adec="http://schemas.microsoft.com/office/drawing/2017/decorative" val="1"/>
               </a:ext>
             </a:extLst>
           </p:cNvPr>
-          <p:cNvCxnSpPr>
-            <a:endCxn id="5124" idx="2"/>
-          </p:cNvCxnSpPr>
+          <p:cNvCxnSpPr/>
           <p:nvPr/>
         </p:nvCxnSpPr>
         <p:spPr>
@@ -23218,7 +23277,7 @@
           <p:nvPr/>
         </p:nvPicPr>
         <p:blipFill>
-          <a:blip r:embed="rId9">
+          <a:blip r:embed="rId6">
             <a:extLst>
               <a:ext uri="{28A0092B-C50C-407E-A947-70E740481C1C}">
                 <a14:useLocalDpi xmlns:a14="http://schemas.microsoft.com/office/drawing/2010/main" val="0"/>
@@ -23358,7 +23417,7 @@
                 <a16:creationId xmlns:a16="http://schemas.microsoft.com/office/drawing/2014/main" id="{7F192ACD-9C75-481C-8934-C15F525ED96C}"/>
               </a:ext>
               <a:ext uri="{C183D7F6-B498-43B3-948B-1728B52AA6E4}">
-                <adec:decorative xmlns:adec="http://schemas.microsoft.com/office/drawing/2017/decorative" xmlns="" val="1"/>
+                <adec:decorative xmlns="" xmlns:adec="http://schemas.microsoft.com/office/drawing/2017/decorative" val="1"/>
               </a:ext>
             </a:extLst>
           </p:cNvPr>
@@ -23508,7 +23567,7 @@
                 <a16:creationId xmlns:a16="http://schemas.microsoft.com/office/drawing/2014/main" id="{7F192ACD-9C75-481C-8934-C15F525ED96C}"/>
               </a:ext>
               <a:ext uri="{C183D7F6-B498-43B3-948B-1728B52AA6E4}">
-                <adec:decorative xmlns:adec="http://schemas.microsoft.com/office/drawing/2017/decorative" xmlns="" val="1"/>
+                <adec:decorative xmlns="" xmlns:adec="http://schemas.microsoft.com/office/drawing/2017/decorative" val="1"/>
               </a:ext>
             </a:extLst>
           </p:cNvPr>
@@ -23658,7 +23717,7 @@
                 <a16:creationId xmlns:a16="http://schemas.microsoft.com/office/drawing/2014/main" id="{5B7ACCD3-FC43-4E32-B7AA-E6D86BED1A32}"/>
               </a:ext>
               <a:ext uri="{C183D7F6-B498-43B3-948B-1728B52AA6E4}">
-                <adec:decorative xmlns:adec="http://schemas.microsoft.com/office/drawing/2017/decorative" xmlns="" val="1"/>
+                <adec:decorative xmlns="" xmlns:adec="http://schemas.microsoft.com/office/drawing/2017/decorative" val="1"/>
               </a:ext>
             </a:extLst>
           </p:cNvPr>
@@ -23713,7 +23772,7 @@
           <p:nvPr/>
         </p:nvPicPr>
         <p:blipFill rotWithShape="1">
-          <a:blip r:embed="rId10" cstate="hqprint">
+          <a:blip r:embed="rId7" cstate="hqprint">
             <a:extLst>
               <a:ext uri="{28A0092B-C50C-407E-A947-70E740481C1C}">
                 <a14:useLocalDpi xmlns:a14="http://schemas.microsoft.com/office/drawing/2010/main" val="0"/>
@@ -23844,6 +23903,77 @@
           </a:p>
         </p:txBody>
       </p:sp>
+      <p:pic>
+        <p:nvPicPr>
+          <p:cNvPr id="1026" name="Picture 2" descr="https://myitschool.ru/is/Temp/6de8160f1fd025b6fa336272db8d42b4/SAMSUNG_IT_Academy_Logo_RU.png"/>
+          <p:cNvPicPr>
+            <a:picLocks noChangeAspect="1" noChangeArrowheads="1"/>
+          </p:cNvPicPr>
+          <p:nvPr/>
+        </p:nvPicPr>
+        <p:blipFill>
+          <a:blip r:embed="rId8" cstate="hqprint">
+            <a:extLst>
+              <a:ext uri="{28A0092B-C50C-407E-A947-70E740481C1C}">
+                <a14:useLocalDpi xmlns:a14="http://schemas.microsoft.com/office/drawing/2010/main" val="0"/>
+              </a:ext>
+            </a:extLst>
+          </a:blip>
+          <a:srcRect/>
+          <a:stretch>
+            <a:fillRect/>
+          </a:stretch>
+        </p:blipFill>
+        <p:spPr bwMode="auto">
+          <a:xfrm>
+            <a:off x="437061" y="1226740"/>
+            <a:ext cx="2101990" cy="738537"/>
+          </a:xfrm>
+          <a:prstGeom prst="rect">
+            <a:avLst/>
+          </a:prstGeom>
+          <a:noFill/>
+          <a:extLst>
+            <a:ext uri="{909E8E84-426E-40DD-AFC4-6F175D3DCCD1}">
+              <a14:hiddenFill xmlns:a14="http://schemas.microsoft.com/office/drawing/2010/main">
+                <a:solidFill>
+                  <a:srgbClr val="FFFFFF"/>
+                </a:solidFill>
+              </a14:hiddenFill>
+            </a:ext>
+          </a:extLst>
+        </p:spPr>
+      </p:pic>
+      <p:pic>
+        <p:nvPicPr>
+          <p:cNvPr id="7" name="Рисунок 6"/>
+          <p:cNvPicPr>
+            <a:picLocks noChangeAspect="1"/>
+          </p:cNvPicPr>
+          <p:nvPr/>
+        </p:nvPicPr>
+        <p:blipFill>
+          <a:blip r:embed="rId9" cstate="hqprint">
+            <a:extLst>
+              <a:ext uri="{28A0092B-C50C-407E-A947-70E740481C1C}">
+                <a14:useLocalDpi xmlns:a14="http://schemas.microsoft.com/office/drawing/2010/main" val="0"/>
+              </a:ext>
+            </a:extLst>
+          </a:blip>
+          <a:stretch>
+            <a:fillRect/>
+          </a:stretch>
+        </p:blipFill>
+        <p:spPr>
+          <a:xfrm>
+            <a:off x="4178665" y="1467894"/>
+            <a:ext cx="2031514" cy="396659"/>
+          </a:xfrm>
+          <a:prstGeom prst="rect">
+            <a:avLst/>
+          </a:prstGeom>
+        </p:spPr>
+      </p:pic>
     </p:spTree>
     <p:extLst>
       <p:ext uri="{BB962C8B-B14F-4D97-AF65-F5344CB8AC3E}">
@@ -23854,6 +23984,18 @@
   <p:clrMapOvr>
     <a:masterClrMapping/>
   </p:clrMapOvr>
+  <mc:AlternateContent xmlns:mc="http://schemas.openxmlformats.org/markup-compatibility/2006">
+    <mc:Choice xmlns:p14="http://schemas.microsoft.com/office/powerpoint/2010/main" Requires="p14">
+      <p:transition spd="slow" p14:dur="2500">
+        <p:checker/>
+      </p:transition>
+    </mc:Choice>
+    <mc:Fallback>
+      <p:transition spd="slow">
+        <p:checker/>
+      </p:transition>
+    </mc:Fallback>
+  </mc:AlternateContent>
   <p:timing>
     <p:tnLst>
       <p:par>
@@ -26633,6 +26775,18 @@
   <p:clrMapOvr>
     <a:masterClrMapping/>
   </p:clrMapOvr>
+  <mc:AlternateContent xmlns:mc="http://schemas.openxmlformats.org/markup-compatibility/2006">
+    <mc:Choice xmlns:p14="http://schemas.microsoft.com/office/powerpoint/2010/main" Requires="p14">
+      <p:transition spd="slow" p14:dur="1500">
+        <p:split orient="vert"/>
+      </p:transition>
+    </mc:Choice>
+    <mc:Fallback>
+      <p:transition spd="slow">
+        <p:split orient="vert"/>
+      </p:transition>
+    </mc:Fallback>
+  </mc:AlternateContent>
   <p:timing>
     <p:tnLst>
       <p:par>
@@ -30400,7 +30554,7 @@
                 <a16:creationId xmlns:a16="http://schemas.microsoft.com/office/drawing/2014/main" id="{D14F9816-D761-44CD-80AC-A13A6A2BF4F4}"/>
               </a:ext>
               <a:ext uri="{C183D7F6-B498-43B3-948B-1728B52AA6E4}">
-                <adec:decorative xmlns:adec="http://schemas.microsoft.com/office/drawing/2017/decorative" xmlns="" val="1"/>
+                <adec:decorative xmlns="" xmlns:adec="http://schemas.microsoft.com/office/drawing/2017/decorative" val="1"/>
               </a:ext>
             </a:extLst>
           </p:cNvPr>
@@ -31388,12 +31542,233 @@
   <p:clrMapOvr>
     <a:masterClrMapping/>
   </p:clrMapOvr>
+  <mc:AlternateContent xmlns:mc="http://schemas.openxmlformats.org/markup-compatibility/2006">
+    <mc:Choice xmlns:p14="http://schemas.microsoft.com/office/powerpoint/2010/main" Requires="p14">
+      <p:transition spd="slow" p14:dur="1500">
+        <p:split orient="vert"/>
+      </p:transition>
+    </mc:Choice>
+    <mc:Fallback>
+      <p:transition spd="slow">
+        <p:split orient="vert"/>
+      </p:transition>
+    </mc:Fallback>
+  </mc:AlternateContent>
   <p:timing>
     <p:tnLst>
       <p:par>
-        <p:cTn id="1" dur="indefinite" restart="never" nodeType="tmRoot"/>
+        <p:cTn id="1" dur="indefinite" restart="never" nodeType="tmRoot">
+          <p:childTnLst>
+            <p:seq concurrent="1" nextAc="seek">
+              <p:cTn id="2" dur="indefinite" nodeType="mainSeq">
+                <p:childTnLst>
+                  <p:par>
+                    <p:cTn id="3" fill="hold">
+                      <p:stCondLst>
+                        <p:cond delay="indefinite"/>
+                      </p:stCondLst>
+                      <p:childTnLst>
+                        <p:par>
+                          <p:cTn id="4" fill="hold">
+                            <p:stCondLst>
+                              <p:cond delay="0"/>
+                            </p:stCondLst>
+                            <p:childTnLst>
+                              <p:par>
+                                <p:cTn id="5" presetID="42" presetClass="entr" presetSubtype="0" fill="hold" grpId="0" nodeType="clickEffect">
+                                  <p:stCondLst>
+                                    <p:cond delay="0"/>
+                                  </p:stCondLst>
+                                  <p:childTnLst>
+                                    <p:set>
+                                      <p:cBhvr>
+                                        <p:cTn id="6" dur="1" fill="hold">
+                                          <p:stCondLst>
+                                            <p:cond delay="0"/>
+                                          </p:stCondLst>
+                                        </p:cTn>
+                                        <p:tgtEl>
+                                          <p:spTgt spid="118"/>
+                                        </p:tgtEl>
+                                        <p:attrNameLst>
+                                          <p:attrName>style.visibility</p:attrName>
+                                        </p:attrNameLst>
+                                      </p:cBhvr>
+                                      <p:to>
+                                        <p:strVal val="visible"/>
+                                      </p:to>
+                                    </p:set>
+                                    <p:animEffect transition="in" filter="fade">
+                                      <p:cBhvr>
+                                        <p:cTn id="7" dur="1000"/>
+                                        <p:tgtEl>
+                                          <p:spTgt spid="118"/>
+                                        </p:tgtEl>
+                                      </p:cBhvr>
+                                    </p:animEffect>
+                                    <p:anim calcmode="lin" valueType="num">
+                                      <p:cBhvr>
+                                        <p:cTn id="8" dur="1000" fill="hold"/>
+                                        <p:tgtEl>
+                                          <p:spTgt spid="118"/>
+                                        </p:tgtEl>
+                                        <p:attrNameLst>
+                                          <p:attrName>ppt_x</p:attrName>
+                                        </p:attrNameLst>
+                                      </p:cBhvr>
+                                      <p:tavLst>
+                                        <p:tav tm="0">
+                                          <p:val>
+                                            <p:strVal val="#ppt_x"/>
+                                          </p:val>
+                                        </p:tav>
+                                        <p:tav tm="100000">
+                                          <p:val>
+                                            <p:strVal val="#ppt_x"/>
+                                          </p:val>
+                                        </p:tav>
+                                      </p:tavLst>
+                                    </p:anim>
+                                    <p:anim calcmode="lin" valueType="num">
+                                      <p:cBhvr>
+                                        <p:cTn id="9" dur="1000" fill="hold"/>
+                                        <p:tgtEl>
+                                          <p:spTgt spid="118"/>
+                                        </p:tgtEl>
+                                        <p:attrNameLst>
+                                          <p:attrName>ppt_y</p:attrName>
+                                        </p:attrNameLst>
+                                      </p:cBhvr>
+                                      <p:tavLst>
+                                        <p:tav tm="0">
+                                          <p:val>
+                                            <p:strVal val="#ppt_y+.1"/>
+                                          </p:val>
+                                        </p:tav>
+                                        <p:tav tm="100000">
+                                          <p:val>
+                                            <p:strVal val="#ppt_y"/>
+                                          </p:val>
+                                        </p:tav>
+                                      </p:tavLst>
+                                    </p:anim>
+                                  </p:childTnLst>
+                                </p:cTn>
+                              </p:par>
+                            </p:childTnLst>
+                          </p:cTn>
+                        </p:par>
+                      </p:childTnLst>
+                    </p:cTn>
+                  </p:par>
+                  <p:par>
+                    <p:cTn id="10" fill="hold">
+                      <p:stCondLst>
+                        <p:cond delay="indefinite"/>
+                      </p:stCondLst>
+                      <p:childTnLst>
+                        <p:par>
+                          <p:cTn id="11" fill="hold">
+                            <p:stCondLst>
+                              <p:cond delay="0"/>
+                            </p:stCondLst>
+                            <p:childTnLst>
+                              <p:par>
+                                <p:cTn id="12" presetID="52" presetClass="entr" presetSubtype="0" fill="hold" grpId="0" nodeType="clickEffect">
+                                  <p:stCondLst>
+                                    <p:cond delay="0"/>
+                                  </p:stCondLst>
+                                  <p:childTnLst>
+                                    <p:set>
+                                      <p:cBhvr>
+                                        <p:cTn id="13" dur="1" fill="hold">
+                                          <p:stCondLst>
+                                            <p:cond delay="0"/>
+                                          </p:stCondLst>
+                                        </p:cTn>
+                                        <p:tgtEl>
+                                          <p:spTgt spid="119"/>
+                                        </p:tgtEl>
+                                        <p:attrNameLst>
+                                          <p:attrName>style.visibility</p:attrName>
+                                        </p:attrNameLst>
+                                      </p:cBhvr>
+                                      <p:to>
+                                        <p:strVal val="visible"/>
+                                      </p:to>
+                                    </p:set>
+                                    <p:animScale>
+                                      <p:cBhvr>
+                                        <p:cTn id="14" dur="1000" decel="50000" fill="hold">
+                                          <p:stCondLst>
+                                            <p:cond delay="0"/>
+                                          </p:stCondLst>
+                                        </p:cTn>
+                                        <p:tgtEl>
+                                          <p:spTgt spid="119"/>
+                                        </p:tgtEl>
+                                      </p:cBhvr>
+                                      <p:from x="250000" y="250000"/>
+                                      <p:to x="100000" y="100000"/>
+                                    </p:animScale>
+                                    <p:animMotion origin="layout" path="M -0.46736 0.92887  C -0.37517 0.88508  -0.02552 0.75279  0.0908 0.66613  C  0.20747 0.57948  0.21649 0.50394  0.23177 0.40825  C 0.24705 0.31256  0.22118 0.15964   0.18264 0.09152  C 0.1441 0.02341  0.03802 0.0  0.0 0.0  " pathEditMode="relative" ptsTypes="">
+                                      <p:cBhvr>
+                                        <p:cTn id="15" dur="1000" decel="50000" fill="hold">
+                                          <p:stCondLst>
+                                            <p:cond delay="0"/>
+                                          </p:stCondLst>
+                                        </p:cTn>
+                                        <p:tgtEl>
+                                          <p:spTgt spid="119"/>
+                                        </p:tgtEl>
+                                        <p:attrNameLst>
+                                          <p:attrName>ppt_x</p:attrName>
+                                          <p:attrName>ppt_y</p:attrName>
+                                        </p:attrNameLst>
+                                      </p:cBhvr>
+                                    </p:animMotion>
+                                    <p:animEffect transition="in" filter="fade">
+                                      <p:cBhvr>
+                                        <p:cTn id="16" dur="1000"/>
+                                        <p:tgtEl>
+                                          <p:spTgt spid="119"/>
+                                        </p:tgtEl>
+                                      </p:cBhvr>
+                                    </p:animEffect>
+                                  </p:childTnLst>
+                                </p:cTn>
+                              </p:par>
+                            </p:childTnLst>
+                          </p:cTn>
+                        </p:par>
+                      </p:childTnLst>
+                    </p:cTn>
+                  </p:par>
+                </p:childTnLst>
+              </p:cTn>
+              <p:prevCondLst>
+                <p:cond evt="onPrev" delay="0">
+                  <p:tgtEl>
+                    <p:sldTgt/>
+                  </p:tgtEl>
+                </p:cond>
+              </p:prevCondLst>
+              <p:nextCondLst>
+                <p:cond evt="onNext" delay="0">
+                  <p:tgtEl>
+                    <p:sldTgt/>
+                  </p:tgtEl>
+                </p:cond>
+              </p:nextCondLst>
+            </p:seq>
+          </p:childTnLst>
+        </p:cTn>
       </p:par>
     </p:tnLst>
+    <p:bldLst>
+      <p:bldP spid="118" grpId="0"/>
+      <p:bldP spid="119" grpId="0"/>
+    </p:bldLst>
   </p:timing>
 </p:sld>
 </file>
@@ -31423,7 +31798,7 @@
                 <a16:creationId xmlns:a16="http://schemas.microsoft.com/office/drawing/2014/main" id="{B38D4B56-7D6C-4345-912F-B3BA9A014E8B}"/>
               </a:ext>
               <a:ext uri="{C183D7F6-B498-43B3-948B-1728B52AA6E4}">
-                <adec:decorative xmlns:adec="http://schemas.microsoft.com/office/drawing/2017/decorative" xmlns="" val="1"/>
+                <adec:decorative xmlns="" xmlns:adec="http://schemas.microsoft.com/office/drawing/2017/decorative" val="1"/>
               </a:ext>
             </a:extLst>
           </p:cNvPr>
@@ -31463,13 +31838,10 @@
       </p:cxnSp>
       <p:grpSp>
         <p:nvGrpSpPr>
-          <p:cNvPr id="69" name="Группа 68">
+          <p:cNvPr id="21" name="Группа 20">
             <a:extLst>
               <a:ext uri="{FF2B5EF4-FFF2-40B4-BE49-F238E27FC236}">
-                <a16:creationId xmlns:a16="http://schemas.microsoft.com/office/drawing/2014/main" id="{B457331C-2A24-4352-9B4C-1C1B326F404F}"/>
-              </a:ext>
-              <a:ext uri="{C183D7F6-B498-43B3-948B-1728B52AA6E4}">
-                <adec:decorative xmlns:adec="http://schemas.microsoft.com/office/drawing/2017/decorative" xmlns="" val="1"/>
+                <a16:creationId xmlns:a16="http://schemas.microsoft.com/office/drawing/2014/main" id="{B111D787-E830-4638-97B3-205F0A0ABC3F}"/>
               </a:ext>
             </a:extLst>
           </p:cNvPr>
@@ -31479,506 +31851,485 @@
         <p:grpSpPr>
           <a:xfrm>
             <a:off x="802096" y="1653543"/>
-            <a:ext cx="4251078" cy="3550915"/>
-            <a:chOff x="518433" y="1757501"/>
-            <a:chExt cx="4251078" cy="3550915"/>
+            <a:ext cx="4251075" cy="307777"/>
+            <a:chOff x="518433" y="1916578"/>
+            <a:chExt cx="4251075" cy="307777"/>
           </a:xfrm>
         </p:grpSpPr>
-        <p:grpSp>
-          <p:nvGrpSpPr>
-            <p:cNvPr id="21" name="Группа 20">
+        <p:sp>
+          <p:nvSpPr>
+            <p:cNvPr id="6" name="Прямоугольник: Скругленные углы 5">
               <a:extLst>
                 <a:ext uri="{FF2B5EF4-FFF2-40B4-BE49-F238E27FC236}">
-                  <a16:creationId xmlns:a16="http://schemas.microsoft.com/office/drawing/2014/main" id="{B111D787-E830-4638-97B3-205F0A0ABC3F}"/>
+                  <a16:creationId xmlns:a16="http://schemas.microsoft.com/office/drawing/2014/main" id="{6BFCD1AA-E1CA-41D6-8605-56AFEBE4EEE3}"/>
                 </a:ext>
               </a:extLst>
             </p:cNvPr>
-            <p:cNvGrpSpPr/>
+            <p:cNvSpPr/>
             <p:nvPr/>
-          </p:nvGrpSpPr>
-          <p:grpSpPr>
+          </p:nvSpPr>
+          <p:spPr>
             <a:xfrm>
-              <a:off x="518433" y="1757501"/>
-              <a:ext cx="4251075" cy="307777"/>
-              <a:chOff x="518433" y="1916578"/>
-              <a:chExt cx="4251075" cy="307777"/>
+              <a:off x="518433" y="1981199"/>
+              <a:ext cx="443592" cy="232296"/>
             </a:xfrm>
-          </p:grpSpPr>
-          <p:sp>
-            <p:nvSpPr>
-              <p:cNvPr id="6" name="Прямоугольник: Скругленные углы 5">
-                <a:extLst>
-                  <a:ext uri="{FF2B5EF4-FFF2-40B4-BE49-F238E27FC236}">
-                    <a16:creationId xmlns:a16="http://schemas.microsoft.com/office/drawing/2014/main" id="{6BFCD1AA-E1CA-41D6-8605-56AFEBE4EEE3}"/>
-                  </a:ext>
-                </a:extLst>
-              </p:cNvPr>
-              <p:cNvSpPr/>
-              <p:nvPr/>
-            </p:nvSpPr>
-            <p:spPr>
-              <a:xfrm>
-                <a:off x="518433" y="1981199"/>
-                <a:ext cx="443592" cy="232296"/>
-              </a:xfrm>
-              <a:prstGeom prst="roundRect">
-                <a:avLst>
-                  <a:gd name="adj" fmla="val 50000"/>
-                </a:avLst>
-              </a:prstGeom>
-              <a:noFill/>
-              <a:ln>
-                <a:solidFill>
-                  <a:schemeClr val="tx1">
-                    <a:lumMod val="75000"/>
-                    <a:lumOff val="25000"/>
-                  </a:schemeClr>
-                </a:solidFill>
-              </a:ln>
-            </p:spPr>
-            <p:style>
-              <a:lnRef idx="2">
-                <a:schemeClr val="accent1">
-                  <a:shade val="50000"/>
+            <a:prstGeom prst="roundRect">
+              <a:avLst>
+                <a:gd name="adj" fmla="val 50000"/>
+              </a:avLst>
+            </a:prstGeom>
+            <a:noFill/>
+            <a:ln>
+              <a:solidFill>
+                <a:schemeClr val="tx1">
+                  <a:lumMod val="75000"/>
+                  <a:lumOff val="25000"/>
                 </a:schemeClr>
-              </a:lnRef>
-              <a:fillRef idx="1">
-                <a:schemeClr val="accent1"/>
-              </a:fillRef>
-              <a:effectRef idx="0">
-                <a:schemeClr val="accent1"/>
-              </a:effectRef>
-              <a:fontRef idx="minor">
-                <a:schemeClr val="lt1"/>
-              </a:fontRef>
-            </p:style>
-            <p:txBody>
-              <a:bodyPr rtlCol="0" anchor="ctr"/>
-              <a:lstStyle/>
-              <a:p>
-                <a:pPr algn="ctr" rtl="0"/>
-                <a:endParaRPr lang="ru-RU" dirty="0"/>
-              </a:p>
-            </p:txBody>
-          </p:sp>
-          <p:sp>
-            <p:nvSpPr>
-              <p:cNvPr id="8" name="Прямоугольник 7">
-                <a:extLst>
-                  <a:ext uri="{FF2B5EF4-FFF2-40B4-BE49-F238E27FC236}">
-                    <a16:creationId xmlns:a16="http://schemas.microsoft.com/office/drawing/2014/main" id="{E9101D99-B002-4698-9C7E-C942B9AA2D39}"/>
-                  </a:ext>
-                </a:extLst>
-              </p:cNvPr>
-              <p:cNvSpPr/>
-              <p:nvPr/>
-            </p:nvSpPr>
-            <p:spPr>
-              <a:xfrm>
-                <a:off x="1233313" y="1916578"/>
-                <a:ext cx="3536195" cy="307777"/>
-              </a:xfrm>
-              <a:prstGeom prst="rect">
-                <a:avLst/>
-              </a:prstGeom>
-            </p:spPr>
-            <p:txBody>
-              <a:bodyPr wrap="square" lIns="0" tIns="0" rIns="0" bIns="0" rtlCol="0">
-                <a:spAutoFit/>
-              </a:bodyPr>
-              <a:lstStyle/>
-              <a:p>
-                <a:pPr rtl="0"/>
-                <a:r>
-                  <a:rPr lang="ru-RU" sz="2000" i="1" dirty="0" smtClean="0">
-                    <a:solidFill>
-                      <a:srgbClr val="002060"/>
-                    </a:solidFill>
-                    <a:latin typeface="+mj-lt"/>
-                    <a:cs typeface="Segoe UI" panose="020B0502040204020203" pitchFamily="34" charset="0"/>
-                  </a:rPr>
-                  <a:t>Наша команда</a:t>
-                </a:r>
-                <a:endParaRPr lang="ru-RU" sz="2000" i="1" dirty="0">
+              </a:solidFill>
+            </a:ln>
+          </p:spPr>
+          <p:style>
+            <a:lnRef idx="2">
+              <a:schemeClr val="accent1">
+                <a:shade val="50000"/>
+              </a:schemeClr>
+            </a:lnRef>
+            <a:fillRef idx="1">
+              <a:schemeClr val="accent1"/>
+            </a:fillRef>
+            <a:effectRef idx="0">
+              <a:schemeClr val="accent1"/>
+            </a:effectRef>
+            <a:fontRef idx="minor">
+              <a:schemeClr val="lt1"/>
+            </a:fontRef>
+          </p:style>
+          <p:txBody>
+            <a:bodyPr rtlCol="0" anchor="ctr"/>
+            <a:lstStyle/>
+            <a:p>
+              <a:pPr algn="ctr" rtl="0"/>
+              <a:endParaRPr lang="ru-RU" dirty="0"/>
+            </a:p>
+          </p:txBody>
+        </p:sp>
+        <p:sp>
+          <p:nvSpPr>
+            <p:cNvPr id="8" name="Прямоугольник 7">
+              <a:extLst>
+                <a:ext uri="{FF2B5EF4-FFF2-40B4-BE49-F238E27FC236}">
+                  <a16:creationId xmlns:a16="http://schemas.microsoft.com/office/drawing/2014/main" id="{E9101D99-B002-4698-9C7E-C942B9AA2D39}"/>
+                </a:ext>
+              </a:extLst>
+            </p:cNvPr>
+            <p:cNvSpPr/>
+            <p:nvPr/>
+          </p:nvSpPr>
+          <p:spPr>
+            <a:xfrm>
+              <a:off x="1233313" y="1916578"/>
+              <a:ext cx="3536195" cy="307777"/>
+            </a:xfrm>
+            <a:prstGeom prst="rect">
+              <a:avLst/>
+            </a:prstGeom>
+          </p:spPr>
+          <p:txBody>
+            <a:bodyPr wrap="square" lIns="0" tIns="0" rIns="0" bIns="0" rtlCol="0">
+              <a:spAutoFit/>
+            </a:bodyPr>
+            <a:lstStyle/>
+            <a:p>
+              <a:pPr rtl="0"/>
+              <a:r>
+                <a:rPr lang="ru-RU" sz="2000" i="1" dirty="0" smtClean="0">
                   <a:solidFill>
                     <a:srgbClr val="002060"/>
                   </a:solidFill>
                   <a:latin typeface="+mj-lt"/>
                   <a:cs typeface="Segoe UI" panose="020B0502040204020203" pitchFamily="34" charset="0"/>
-                </a:endParaRPr>
-              </a:p>
-            </p:txBody>
-          </p:sp>
-        </p:grpSp>
-        <p:grpSp>
-          <p:nvGrpSpPr>
-            <p:cNvPr id="20" name="Группа 19">
+                </a:rPr>
+                <a:t>Наша команда</a:t>
+              </a:r>
+              <a:endParaRPr lang="ru-RU" sz="2000" i="1" dirty="0">
+                <a:solidFill>
+                  <a:srgbClr val="002060"/>
+                </a:solidFill>
+                <a:latin typeface="+mj-lt"/>
+                <a:cs typeface="Segoe UI" panose="020B0502040204020203" pitchFamily="34" charset="0"/>
+              </a:endParaRPr>
+            </a:p>
+          </p:txBody>
+        </p:sp>
+      </p:grpSp>
+      <p:grpSp>
+        <p:nvGrpSpPr>
+          <p:cNvPr id="20" name="Группа 19">
+            <a:extLst>
+              <a:ext uri="{FF2B5EF4-FFF2-40B4-BE49-F238E27FC236}">
+                <a16:creationId xmlns:a16="http://schemas.microsoft.com/office/drawing/2014/main" id="{2D19246F-8F2D-4FAD-8927-AA34DDAA5DFA}"/>
+              </a:ext>
+            </a:extLst>
+          </p:cNvPr>
+          <p:cNvGrpSpPr/>
+          <p:nvPr/>
+        </p:nvGrpSpPr>
+        <p:grpSpPr>
+          <a:xfrm>
+            <a:off x="802096" y="2736910"/>
+            <a:ext cx="4251076" cy="307777"/>
+            <a:chOff x="518433" y="2783006"/>
+            <a:chExt cx="4251076" cy="307777"/>
+          </a:xfrm>
+        </p:grpSpPr>
+        <p:sp>
+          <p:nvSpPr>
+            <p:cNvPr id="9" name="Прямоугольник: Скругленные углы 8">
               <a:extLst>
                 <a:ext uri="{FF2B5EF4-FFF2-40B4-BE49-F238E27FC236}">
-                  <a16:creationId xmlns:a16="http://schemas.microsoft.com/office/drawing/2014/main" id="{2D19246F-8F2D-4FAD-8927-AA34DDAA5DFA}"/>
+                  <a16:creationId xmlns:a16="http://schemas.microsoft.com/office/drawing/2014/main" id="{14FF47BA-9557-4442-8E2A-74A4F4AAD237}"/>
                 </a:ext>
               </a:extLst>
             </p:cNvPr>
-            <p:cNvGrpSpPr/>
+            <p:cNvSpPr/>
             <p:nvPr/>
-          </p:nvGrpSpPr>
-          <p:grpSpPr>
+          </p:nvSpPr>
+          <p:spPr>
             <a:xfrm>
-              <a:off x="518433" y="2840868"/>
-              <a:ext cx="4251076" cy="307777"/>
-              <a:chOff x="518433" y="2783006"/>
-              <a:chExt cx="4251076" cy="307777"/>
+              <a:off x="518433" y="2847627"/>
+              <a:ext cx="443592" cy="232296"/>
             </a:xfrm>
-          </p:grpSpPr>
-          <p:sp>
-            <p:nvSpPr>
-              <p:cNvPr id="9" name="Прямоугольник: Скругленные углы 8">
-                <a:extLst>
-                  <a:ext uri="{FF2B5EF4-FFF2-40B4-BE49-F238E27FC236}">
-                    <a16:creationId xmlns:a16="http://schemas.microsoft.com/office/drawing/2014/main" id="{14FF47BA-9557-4442-8E2A-74A4F4AAD237}"/>
-                  </a:ext>
-                </a:extLst>
-              </p:cNvPr>
-              <p:cNvSpPr/>
-              <p:nvPr/>
-            </p:nvSpPr>
-            <p:spPr>
-              <a:xfrm>
-                <a:off x="518433" y="2847627"/>
-                <a:ext cx="443592" cy="232296"/>
-              </a:xfrm>
-              <a:prstGeom prst="roundRect">
-                <a:avLst>
-                  <a:gd name="adj" fmla="val 50000"/>
-                </a:avLst>
-              </a:prstGeom>
-              <a:noFill/>
-              <a:ln>
-                <a:solidFill>
-                  <a:schemeClr val="tx1">
-                    <a:lumMod val="75000"/>
-                    <a:lumOff val="25000"/>
-                  </a:schemeClr>
-                </a:solidFill>
-              </a:ln>
-            </p:spPr>
-            <p:style>
-              <a:lnRef idx="2">
-                <a:schemeClr val="accent1">
-                  <a:shade val="50000"/>
+            <a:prstGeom prst="roundRect">
+              <a:avLst>
+                <a:gd name="adj" fmla="val 50000"/>
+              </a:avLst>
+            </a:prstGeom>
+            <a:noFill/>
+            <a:ln>
+              <a:solidFill>
+                <a:schemeClr val="tx1">
+                  <a:lumMod val="75000"/>
+                  <a:lumOff val="25000"/>
                 </a:schemeClr>
-              </a:lnRef>
-              <a:fillRef idx="1">
-                <a:schemeClr val="accent1"/>
-              </a:fillRef>
-              <a:effectRef idx="0">
-                <a:schemeClr val="accent1"/>
-              </a:effectRef>
-              <a:fontRef idx="minor">
-                <a:schemeClr val="lt1"/>
-              </a:fontRef>
-            </p:style>
-            <p:txBody>
-              <a:bodyPr rtlCol="0" anchor="ctr"/>
-              <a:lstStyle/>
-              <a:p>
-                <a:pPr algn="ctr" rtl="0"/>
-                <a:endParaRPr lang="ru-RU" dirty="0"/>
-              </a:p>
-            </p:txBody>
-          </p:sp>
-          <p:sp>
-            <p:nvSpPr>
-              <p:cNvPr id="10" name="Прямоугольник 9">
-                <a:extLst>
-                  <a:ext uri="{FF2B5EF4-FFF2-40B4-BE49-F238E27FC236}">
-                    <a16:creationId xmlns:a16="http://schemas.microsoft.com/office/drawing/2014/main" id="{B00C2221-E8A7-47E0-B2B2-5A6A32F96791}"/>
-                  </a:ext>
-                </a:extLst>
-              </p:cNvPr>
-              <p:cNvSpPr/>
-              <p:nvPr/>
-            </p:nvSpPr>
-            <p:spPr>
-              <a:xfrm>
-                <a:off x="1233314" y="2783006"/>
-                <a:ext cx="3536195" cy="307777"/>
-              </a:xfrm>
-              <a:prstGeom prst="rect">
-                <a:avLst/>
-              </a:prstGeom>
-            </p:spPr>
-            <p:txBody>
-              <a:bodyPr wrap="square" lIns="0" tIns="0" rIns="0" bIns="0" rtlCol="0">
-                <a:spAutoFit/>
-              </a:bodyPr>
-              <a:lstStyle/>
-              <a:p>
-                <a:pPr rtl="0"/>
-                <a:r>
-                  <a:rPr lang="ru-RU" sz="2000" i="1" dirty="0" smtClean="0">
-                    <a:solidFill>
-                      <a:srgbClr val="002060"/>
-                    </a:solidFill>
-                    <a:latin typeface="+mj-lt"/>
-                    <a:cs typeface="Segoe UI" panose="020B0502040204020203" pitchFamily="34" charset="0"/>
-                  </a:rPr>
-                  <a:t>Проблематика</a:t>
-                </a:r>
-                <a:endParaRPr lang="ru-RU" sz="2000" i="1" dirty="0">
+              </a:solidFill>
+            </a:ln>
+          </p:spPr>
+          <p:style>
+            <a:lnRef idx="2">
+              <a:schemeClr val="accent1">
+                <a:shade val="50000"/>
+              </a:schemeClr>
+            </a:lnRef>
+            <a:fillRef idx="1">
+              <a:schemeClr val="accent1"/>
+            </a:fillRef>
+            <a:effectRef idx="0">
+              <a:schemeClr val="accent1"/>
+            </a:effectRef>
+            <a:fontRef idx="minor">
+              <a:schemeClr val="lt1"/>
+            </a:fontRef>
+          </p:style>
+          <p:txBody>
+            <a:bodyPr rtlCol="0" anchor="ctr"/>
+            <a:lstStyle/>
+            <a:p>
+              <a:pPr algn="ctr" rtl="0"/>
+              <a:endParaRPr lang="ru-RU" dirty="0"/>
+            </a:p>
+          </p:txBody>
+        </p:sp>
+        <p:sp>
+          <p:nvSpPr>
+            <p:cNvPr id="10" name="Прямоугольник 9">
+              <a:extLst>
+                <a:ext uri="{FF2B5EF4-FFF2-40B4-BE49-F238E27FC236}">
+                  <a16:creationId xmlns:a16="http://schemas.microsoft.com/office/drawing/2014/main" id="{B00C2221-E8A7-47E0-B2B2-5A6A32F96791}"/>
+                </a:ext>
+              </a:extLst>
+            </p:cNvPr>
+            <p:cNvSpPr/>
+            <p:nvPr/>
+          </p:nvSpPr>
+          <p:spPr>
+            <a:xfrm>
+              <a:off x="1233314" y="2783006"/>
+              <a:ext cx="3536195" cy="307777"/>
+            </a:xfrm>
+            <a:prstGeom prst="rect">
+              <a:avLst/>
+            </a:prstGeom>
+          </p:spPr>
+          <p:txBody>
+            <a:bodyPr wrap="square" lIns="0" tIns="0" rIns="0" bIns="0" rtlCol="0">
+              <a:spAutoFit/>
+            </a:bodyPr>
+            <a:lstStyle/>
+            <a:p>
+              <a:pPr rtl="0"/>
+              <a:r>
+                <a:rPr lang="ru-RU" sz="2000" i="1" dirty="0" smtClean="0">
                   <a:solidFill>
                     <a:srgbClr val="002060"/>
                   </a:solidFill>
                   <a:latin typeface="+mj-lt"/>
                   <a:cs typeface="Segoe UI" panose="020B0502040204020203" pitchFamily="34" charset="0"/>
-                </a:endParaRPr>
-              </a:p>
-            </p:txBody>
-          </p:sp>
-        </p:grpSp>
-        <p:grpSp>
-          <p:nvGrpSpPr>
-            <p:cNvPr id="19" name="Группа 18">
+                </a:rPr>
+                <a:t>Проблематика</a:t>
+              </a:r>
+              <a:endParaRPr lang="ru-RU" sz="2000" i="1" dirty="0">
+                <a:solidFill>
+                  <a:srgbClr val="002060"/>
+                </a:solidFill>
+                <a:latin typeface="+mj-lt"/>
+                <a:cs typeface="Segoe UI" panose="020B0502040204020203" pitchFamily="34" charset="0"/>
+              </a:endParaRPr>
+            </a:p>
+          </p:txBody>
+        </p:sp>
+      </p:grpSp>
+      <p:grpSp>
+        <p:nvGrpSpPr>
+          <p:cNvPr id="19" name="Группа 18">
+            <a:extLst>
+              <a:ext uri="{FF2B5EF4-FFF2-40B4-BE49-F238E27FC236}">
+                <a16:creationId xmlns:a16="http://schemas.microsoft.com/office/drawing/2014/main" id="{9D065A01-39E4-4CC9-9075-3910C66205F5}"/>
+              </a:ext>
+            </a:extLst>
+          </p:cNvPr>
+          <p:cNvGrpSpPr/>
+          <p:nvPr/>
+        </p:nvGrpSpPr>
+        <p:grpSpPr>
+          <a:xfrm>
+            <a:off x="802096" y="3820277"/>
+            <a:ext cx="4251077" cy="307777"/>
+            <a:chOff x="518433" y="3663359"/>
+            <a:chExt cx="4251077" cy="307777"/>
+          </a:xfrm>
+        </p:grpSpPr>
+        <p:sp>
+          <p:nvSpPr>
+            <p:cNvPr id="11" name="Прямоугольник: Скругленные углы 10">
               <a:extLst>
                 <a:ext uri="{FF2B5EF4-FFF2-40B4-BE49-F238E27FC236}">
-                  <a16:creationId xmlns:a16="http://schemas.microsoft.com/office/drawing/2014/main" id="{9D065A01-39E4-4CC9-9075-3910C66205F5}"/>
+                  <a16:creationId xmlns:a16="http://schemas.microsoft.com/office/drawing/2014/main" id="{6B458D5C-BDF7-4A75-A4E8-B99128DCD84A}"/>
                 </a:ext>
               </a:extLst>
             </p:cNvPr>
-            <p:cNvGrpSpPr/>
+            <p:cNvSpPr/>
             <p:nvPr/>
-          </p:nvGrpSpPr>
-          <p:grpSpPr>
+          </p:nvSpPr>
+          <p:spPr>
             <a:xfrm>
-              <a:off x="518433" y="3924235"/>
-              <a:ext cx="4251077" cy="307777"/>
-              <a:chOff x="518433" y="3663359"/>
-              <a:chExt cx="4251077" cy="307777"/>
+              <a:off x="518433" y="3727980"/>
+              <a:ext cx="443592" cy="232296"/>
             </a:xfrm>
-          </p:grpSpPr>
-          <p:sp>
-            <p:nvSpPr>
-              <p:cNvPr id="11" name="Прямоугольник: Скругленные углы 10">
-                <a:extLst>
-                  <a:ext uri="{FF2B5EF4-FFF2-40B4-BE49-F238E27FC236}">
-                    <a16:creationId xmlns:a16="http://schemas.microsoft.com/office/drawing/2014/main" id="{6B458D5C-BDF7-4A75-A4E8-B99128DCD84A}"/>
-                  </a:ext>
-                </a:extLst>
-              </p:cNvPr>
-              <p:cNvSpPr/>
-              <p:nvPr/>
-            </p:nvSpPr>
-            <p:spPr>
-              <a:xfrm>
-                <a:off x="518433" y="3727980"/>
-                <a:ext cx="443592" cy="232296"/>
-              </a:xfrm>
-              <a:prstGeom prst="roundRect">
-                <a:avLst>
-                  <a:gd name="adj" fmla="val 50000"/>
-                </a:avLst>
-              </a:prstGeom>
-              <a:noFill/>
-              <a:ln>
-                <a:solidFill>
-                  <a:schemeClr val="tx1">
-                    <a:lumMod val="75000"/>
-                    <a:lumOff val="25000"/>
-                  </a:schemeClr>
-                </a:solidFill>
-              </a:ln>
-            </p:spPr>
-            <p:style>
-              <a:lnRef idx="2">
-                <a:schemeClr val="accent1">
-                  <a:shade val="50000"/>
+            <a:prstGeom prst="roundRect">
+              <a:avLst>
+                <a:gd name="adj" fmla="val 50000"/>
+              </a:avLst>
+            </a:prstGeom>
+            <a:noFill/>
+            <a:ln>
+              <a:solidFill>
+                <a:schemeClr val="tx1">
+                  <a:lumMod val="75000"/>
+                  <a:lumOff val="25000"/>
                 </a:schemeClr>
-              </a:lnRef>
-              <a:fillRef idx="1">
-                <a:schemeClr val="accent1"/>
-              </a:fillRef>
-              <a:effectRef idx="0">
-                <a:schemeClr val="accent1"/>
-              </a:effectRef>
-              <a:fontRef idx="minor">
-                <a:schemeClr val="lt1"/>
-              </a:fontRef>
-            </p:style>
-            <p:txBody>
-              <a:bodyPr rtlCol="0" anchor="ctr"/>
-              <a:lstStyle/>
-              <a:p>
-                <a:pPr algn="ctr" rtl="0"/>
-                <a:endParaRPr lang="ru-RU" dirty="0"/>
-              </a:p>
-            </p:txBody>
-          </p:sp>
-          <p:sp>
-            <p:nvSpPr>
-              <p:cNvPr id="12" name="Прямоугольник 11">
-                <a:extLst>
-                  <a:ext uri="{FF2B5EF4-FFF2-40B4-BE49-F238E27FC236}">
-                    <a16:creationId xmlns:a16="http://schemas.microsoft.com/office/drawing/2014/main" id="{CA17B45E-57F0-4725-89C0-3CD74A5097A3}"/>
-                  </a:ext>
-                </a:extLst>
-              </p:cNvPr>
-              <p:cNvSpPr/>
-              <p:nvPr/>
-            </p:nvSpPr>
-            <p:spPr>
-              <a:xfrm>
-                <a:off x="1233315" y="3663359"/>
-                <a:ext cx="3536195" cy="307777"/>
-              </a:xfrm>
-              <a:prstGeom prst="rect">
-                <a:avLst/>
-              </a:prstGeom>
-            </p:spPr>
-            <p:txBody>
-              <a:bodyPr wrap="square" lIns="0" tIns="0" rIns="0" bIns="0" rtlCol="0">
-                <a:spAutoFit/>
-              </a:bodyPr>
-              <a:lstStyle/>
-              <a:p>
-                <a:pPr rtl="0"/>
-                <a:r>
-                  <a:rPr lang="ru-RU" sz="2000" i="1" dirty="0" smtClean="0">
-                    <a:solidFill>
-                      <a:srgbClr val="002060"/>
-                    </a:solidFill>
-                    <a:latin typeface="+mj-lt"/>
-                    <a:cs typeface="Segoe UI" panose="020B0502040204020203" pitchFamily="34" charset="0"/>
-                  </a:rPr>
-                  <a:t>Наше решение</a:t>
-                </a:r>
-                <a:endParaRPr lang="ru-RU" sz="2000" i="1" dirty="0">
+              </a:solidFill>
+            </a:ln>
+          </p:spPr>
+          <p:style>
+            <a:lnRef idx="2">
+              <a:schemeClr val="accent1">
+                <a:shade val="50000"/>
+              </a:schemeClr>
+            </a:lnRef>
+            <a:fillRef idx="1">
+              <a:schemeClr val="accent1"/>
+            </a:fillRef>
+            <a:effectRef idx="0">
+              <a:schemeClr val="accent1"/>
+            </a:effectRef>
+            <a:fontRef idx="minor">
+              <a:schemeClr val="lt1"/>
+            </a:fontRef>
+          </p:style>
+          <p:txBody>
+            <a:bodyPr rtlCol="0" anchor="ctr"/>
+            <a:lstStyle/>
+            <a:p>
+              <a:pPr algn="ctr" rtl="0"/>
+              <a:endParaRPr lang="ru-RU" dirty="0"/>
+            </a:p>
+          </p:txBody>
+        </p:sp>
+        <p:sp>
+          <p:nvSpPr>
+            <p:cNvPr id="12" name="Прямоугольник 11">
+              <a:extLst>
+                <a:ext uri="{FF2B5EF4-FFF2-40B4-BE49-F238E27FC236}">
+                  <a16:creationId xmlns:a16="http://schemas.microsoft.com/office/drawing/2014/main" id="{CA17B45E-57F0-4725-89C0-3CD74A5097A3}"/>
+                </a:ext>
+              </a:extLst>
+            </p:cNvPr>
+            <p:cNvSpPr/>
+            <p:nvPr/>
+          </p:nvSpPr>
+          <p:spPr>
+            <a:xfrm>
+              <a:off x="1233315" y="3663359"/>
+              <a:ext cx="3536195" cy="307777"/>
+            </a:xfrm>
+            <a:prstGeom prst="rect">
+              <a:avLst/>
+            </a:prstGeom>
+          </p:spPr>
+          <p:txBody>
+            <a:bodyPr wrap="square" lIns="0" tIns="0" rIns="0" bIns="0" rtlCol="0">
+              <a:spAutoFit/>
+            </a:bodyPr>
+            <a:lstStyle/>
+            <a:p>
+              <a:pPr rtl="0"/>
+              <a:r>
+                <a:rPr lang="ru-RU" sz="2000" i="1" dirty="0" smtClean="0">
                   <a:solidFill>
                     <a:srgbClr val="002060"/>
                   </a:solidFill>
                   <a:latin typeface="+mj-lt"/>
                   <a:cs typeface="Segoe UI" panose="020B0502040204020203" pitchFamily="34" charset="0"/>
-                </a:endParaRPr>
-              </a:p>
-            </p:txBody>
-          </p:sp>
-        </p:grpSp>
-        <p:grpSp>
-          <p:nvGrpSpPr>
-            <p:cNvPr id="18" name="Группа 17">
+                </a:rPr>
+                <a:t>Наше решение</a:t>
+              </a:r>
+              <a:endParaRPr lang="ru-RU" sz="2000" i="1" dirty="0">
+                <a:solidFill>
+                  <a:srgbClr val="002060"/>
+                </a:solidFill>
+                <a:latin typeface="+mj-lt"/>
+                <a:cs typeface="Segoe UI" panose="020B0502040204020203" pitchFamily="34" charset="0"/>
+              </a:endParaRPr>
+            </a:p>
+          </p:txBody>
+        </p:sp>
+      </p:grpSp>
+      <p:grpSp>
+        <p:nvGrpSpPr>
+          <p:cNvPr id="18" name="Группа 17">
+            <a:extLst>
+              <a:ext uri="{FF2B5EF4-FFF2-40B4-BE49-F238E27FC236}">
+                <a16:creationId xmlns:a16="http://schemas.microsoft.com/office/drawing/2014/main" id="{609D452F-25F9-4A2F-84BD-9A44714884C6}"/>
+              </a:ext>
+            </a:extLst>
+          </p:cNvPr>
+          <p:cNvGrpSpPr/>
+          <p:nvPr/>
+        </p:nvGrpSpPr>
+        <p:grpSpPr>
+          <a:xfrm>
+            <a:off x="802096" y="4896681"/>
+            <a:ext cx="4251078" cy="307777"/>
+            <a:chOff x="518433" y="4536750"/>
+            <a:chExt cx="4251078" cy="307777"/>
+          </a:xfrm>
+        </p:grpSpPr>
+        <p:sp>
+          <p:nvSpPr>
+            <p:cNvPr id="13" name="Прямоугольник: Скругленные углы 12">
               <a:extLst>
                 <a:ext uri="{FF2B5EF4-FFF2-40B4-BE49-F238E27FC236}">
-                  <a16:creationId xmlns:a16="http://schemas.microsoft.com/office/drawing/2014/main" id="{609D452F-25F9-4A2F-84BD-9A44714884C6}"/>
+                  <a16:creationId xmlns:a16="http://schemas.microsoft.com/office/drawing/2014/main" id="{64E3D015-D1E6-40C0-B820-5D2B0144652D}"/>
                 </a:ext>
               </a:extLst>
             </p:cNvPr>
-            <p:cNvGrpSpPr/>
+            <p:cNvSpPr/>
             <p:nvPr/>
-          </p:nvGrpSpPr>
-          <p:grpSpPr>
+          </p:nvSpPr>
+          <p:spPr>
             <a:xfrm>
-              <a:off x="518433" y="5000639"/>
-              <a:ext cx="4251078" cy="307777"/>
-              <a:chOff x="518433" y="4536750"/>
-              <a:chExt cx="4251078" cy="307777"/>
+              <a:off x="518433" y="4608333"/>
+              <a:ext cx="443592" cy="232296"/>
             </a:xfrm>
-          </p:grpSpPr>
-          <p:sp>
-            <p:nvSpPr>
-              <p:cNvPr id="13" name="Прямоугольник: Скругленные углы 12">
-                <a:extLst>
-                  <a:ext uri="{FF2B5EF4-FFF2-40B4-BE49-F238E27FC236}">
-                    <a16:creationId xmlns:a16="http://schemas.microsoft.com/office/drawing/2014/main" id="{64E3D015-D1E6-40C0-B820-5D2B0144652D}"/>
-                  </a:ext>
-                </a:extLst>
-              </p:cNvPr>
-              <p:cNvSpPr/>
-              <p:nvPr/>
-            </p:nvSpPr>
-            <p:spPr>
-              <a:xfrm>
-                <a:off x="518433" y="4608333"/>
-                <a:ext cx="443592" cy="232296"/>
-              </a:xfrm>
-              <a:prstGeom prst="roundRect">
-                <a:avLst>
-                  <a:gd name="adj" fmla="val 50000"/>
-                </a:avLst>
-              </a:prstGeom>
-              <a:noFill/>
-              <a:ln>
-                <a:solidFill>
-                  <a:schemeClr val="tx1">
-                    <a:lumMod val="75000"/>
-                    <a:lumOff val="25000"/>
-                  </a:schemeClr>
-                </a:solidFill>
-              </a:ln>
-            </p:spPr>
-            <p:style>
-              <a:lnRef idx="2">
-                <a:schemeClr val="accent1">
-                  <a:shade val="50000"/>
+            <a:prstGeom prst="roundRect">
+              <a:avLst>
+                <a:gd name="adj" fmla="val 50000"/>
+              </a:avLst>
+            </a:prstGeom>
+            <a:noFill/>
+            <a:ln>
+              <a:solidFill>
+                <a:schemeClr val="tx1">
+                  <a:lumMod val="75000"/>
+                  <a:lumOff val="25000"/>
                 </a:schemeClr>
-              </a:lnRef>
-              <a:fillRef idx="1">
-                <a:schemeClr val="accent1"/>
-              </a:fillRef>
-              <a:effectRef idx="0">
-                <a:schemeClr val="accent1"/>
-              </a:effectRef>
-              <a:fontRef idx="minor">
-                <a:schemeClr val="lt1"/>
-              </a:fontRef>
-            </p:style>
-            <p:txBody>
-              <a:bodyPr rtlCol="0" anchor="ctr"/>
-              <a:lstStyle/>
-              <a:p>
-                <a:pPr algn="ctr" rtl="0"/>
-                <a:endParaRPr lang="ru-RU" dirty="0"/>
-              </a:p>
-            </p:txBody>
-          </p:sp>
-          <p:sp>
-            <p:nvSpPr>
-              <p:cNvPr id="14" name="Прямоугольник 13">
-                <a:extLst>
-                  <a:ext uri="{FF2B5EF4-FFF2-40B4-BE49-F238E27FC236}">
-                    <a16:creationId xmlns:a16="http://schemas.microsoft.com/office/drawing/2014/main" id="{9187696D-0387-46E9-A420-AD2392161D95}"/>
-                  </a:ext>
-                </a:extLst>
-              </p:cNvPr>
-              <p:cNvSpPr/>
-              <p:nvPr/>
-            </p:nvSpPr>
-            <p:spPr>
-              <a:xfrm>
-                <a:off x="1233316" y="4536750"/>
-                <a:ext cx="3536195" cy="307777"/>
-              </a:xfrm>
-              <a:prstGeom prst="rect">
-                <a:avLst/>
-              </a:prstGeom>
-            </p:spPr>
-            <p:txBody>
-              <a:bodyPr wrap="square" lIns="0" tIns="0" rIns="0" bIns="0" rtlCol="0">
-                <a:spAutoFit/>
-              </a:bodyPr>
-              <a:lstStyle/>
-              <a:p>
-                <a:r>
-                  <a:rPr lang="ru-RU" sz="2000" i="1" dirty="0">
-                    <a:solidFill>
-                      <a:srgbClr val="002060"/>
-                    </a:solidFill>
-                    <a:cs typeface="Segoe UI" panose="020B0502040204020203" pitchFamily="34" charset="0"/>
-                  </a:rPr>
-                  <a:t>В перспективное будущее</a:t>
-                </a:r>
-              </a:p>
-            </p:txBody>
-          </p:sp>
-        </p:grpSp>
+              </a:solidFill>
+            </a:ln>
+          </p:spPr>
+          <p:style>
+            <a:lnRef idx="2">
+              <a:schemeClr val="accent1">
+                <a:shade val="50000"/>
+              </a:schemeClr>
+            </a:lnRef>
+            <a:fillRef idx="1">
+              <a:schemeClr val="accent1"/>
+            </a:fillRef>
+            <a:effectRef idx="0">
+              <a:schemeClr val="accent1"/>
+            </a:effectRef>
+            <a:fontRef idx="minor">
+              <a:schemeClr val="lt1"/>
+            </a:fontRef>
+          </p:style>
+          <p:txBody>
+            <a:bodyPr rtlCol="0" anchor="ctr"/>
+            <a:lstStyle/>
+            <a:p>
+              <a:pPr algn="ctr" rtl="0"/>
+              <a:endParaRPr lang="ru-RU" dirty="0"/>
+            </a:p>
+          </p:txBody>
+        </p:sp>
+        <p:sp>
+          <p:nvSpPr>
+            <p:cNvPr id="14" name="Прямоугольник 13">
+              <a:extLst>
+                <a:ext uri="{FF2B5EF4-FFF2-40B4-BE49-F238E27FC236}">
+                  <a16:creationId xmlns:a16="http://schemas.microsoft.com/office/drawing/2014/main" id="{9187696D-0387-46E9-A420-AD2392161D95}"/>
+                </a:ext>
+              </a:extLst>
+            </p:cNvPr>
+            <p:cNvSpPr/>
+            <p:nvPr/>
+          </p:nvSpPr>
+          <p:spPr>
+            <a:xfrm>
+              <a:off x="1233316" y="4536750"/>
+              <a:ext cx="3536195" cy="307777"/>
+            </a:xfrm>
+            <a:prstGeom prst="rect">
+              <a:avLst/>
+            </a:prstGeom>
+          </p:spPr>
+          <p:txBody>
+            <a:bodyPr wrap="square" lIns="0" tIns="0" rIns="0" bIns="0" rtlCol="0">
+              <a:spAutoFit/>
+            </a:bodyPr>
+            <a:lstStyle/>
+            <a:p>
+              <a:r>
+                <a:rPr lang="ru-RU" sz="2000" i="1" dirty="0">
+                  <a:solidFill>
+                    <a:srgbClr val="002060"/>
+                  </a:solidFill>
+                  <a:cs typeface="Segoe UI" panose="020B0502040204020203" pitchFamily="34" charset="0"/>
+                </a:rPr>
+                <a:t>В перспективное будущее</a:t>
+              </a:r>
+            </a:p>
+          </p:txBody>
+        </p:sp>
       </p:grpSp>
       <p:sp>
         <p:nvSpPr>
@@ -31988,7 +32339,7 @@
                 <a16:creationId xmlns:a16="http://schemas.microsoft.com/office/drawing/2014/main" id="{E7D1D117-BC5C-430A-9FEB-B231E691511F}"/>
               </a:ext>
               <a:ext uri="{C183D7F6-B498-43B3-948B-1728B52AA6E4}">
-                <adec:decorative xmlns:adec="http://schemas.microsoft.com/office/drawing/2017/decorative" xmlns="" val="1"/>
+                <adec:decorative xmlns="" xmlns:adec="http://schemas.microsoft.com/office/drawing/2017/decorative" val="1"/>
               </a:ext>
             </a:extLst>
           </p:cNvPr>
@@ -32046,7 +32397,7 @@
                 <a16:creationId xmlns:a16="http://schemas.microsoft.com/office/drawing/2014/main" id="{2577E8EA-5E95-41C5-8BE8-EE647DE2613A}"/>
               </a:ext>
               <a:ext uri="{C183D7F6-B498-43B3-948B-1728B52AA6E4}">
-                <adec:decorative xmlns:adec="http://schemas.microsoft.com/office/drawing/2017/decorative" xmlns="" val="1"/>
+                <adec:decorative xmlns="" xmlns:adec="http://schemas.microsoft.com/office/drawing/2017/decorative" val="1"/>
               </a:ext>
             </a:extLst>
           </p:cNvPr>
@@ -35939,10 +36290,221 @@
   <p:clrMapOvr>
     <a:masterClrMapping/>
   </p:clrMapOvr>
+  <mc:AlternateContent xmlns:mc="http://schemas.openxmlformats.org/markup-compatibility/2006">
+    <mc:Choice xmlns:p14="http://schemas.microsoft.com/office/powerpoint/2010/main" Requires="p14">
+      <p:transition spd="slow" p14:dur="1400">
+        <p14:ripple/>
+      </p:transition>
+    </mc:Choice>
+    <mc:Fallback>
+      <p:transition spd="slow">
+        <p:fade/>
+      </p:transition>
+    </mc:Fallback>
+  </mc:AlternateContent>
   <p:timing>
     <p:tnLst>
       <p:par>
-        <p:cTn id="1" dur="indefinite" restart="never" nodeType="tmRoot"/>
+        <p:cTn id="1" dur="indefinite" restart="never" nodeType="tmRoot">
+          <p:childTnLst>
+            <p:seq concurrent="1" nextAc="seek">
+              <p:cTn id="2" dur="indefinite" nodeType="mainSeq">
+                <p:childTnLst>
+                  <p:par>
+                    <p:cTn id="3" fill="hold">
+                      <p:stCondLst>
+                        <p:cond delay="indefinite"/>
+                      </p:stCondLst>
+                      <p:childTnLst>
+                        <p:par>
+                          <p:cTn id="4" fill="hold">
+                            <p:stCondLst>
+                              <p:cond delay="0"/>
+                            </p:stCondLst>
+                            <p:childTnLst>
+                              <p:par>
+                                <p:cTn id="5" presetID="26" presetClass="emph" presetSubtype="0" fill="hold" nodeType="clickEffect">
+                                  <p:stCondLst>
+                                    <p:cond delay="0"/>
+                                  </p:stCondLst>
+                                  <p:childTnLst>
+                                    <p:animEffect transition="out" filter="fade">
+                                      <p:cBhvr>
+                                        <p:cTn id="6" dur="500" tmFilter="0, 0; .2, .5; .8, .5; 1, 0"/>
+                                        <p:tgtEl>
+                                          <p:spTgt spid="21"/>
+                                        </p:tgtEl>
+                                      </p:cBhvr>
+                                    </p:animEffect>
+                                    <p:animScale>
+                                      <p:cBhvr>
+                                        <p:cTn id="7" dur="250" autoRev="1" fill="hold"/>
+                                        <p:tgtEl>
+                                          <p:spTgt spid="21"/>
+                                        </p:tgtEl>
+                                      </p:cBhvr>
+                                      <p:by x="105000" y="105000"/>
+                                    </p:animScale>
+                                  </p:childTnLst>
+                                </p:cTn>
+                              </p:par>
+                            </p:childTnLst>
+                          </p:cTn>
+                        </p:par>
+                      </p:childTnLst>
+                    </p:cTn>
+                  </p:par>
+                  <p:par>
+                    <p:cTn id="8" fill="hold">
+                      <p:stCondLst>
+                        <p:cond delay="indefinite"/>
+                      </p:stCondLst>
+                      <p:childTnLst>
+                        <p:par>
+                          <p:cTn id="9" fill="hold">
+                            <p:stCondLst>
+                              <p:cond delay="0"/>
+                            </p:stCondLst>
+                            <p:childTnLst>
+                              <p:par>
+                                <p:cTn id="10" presetID="26" presetClass="emph" presetSubtype="0" fill="hold" nodeType="clickEffect">
+                                  <p:stCondLst>
+                                    <p:cond delay="0"/>
+                                  </p:stCondLst>
+                                  <p:childTnLst>
+                                    <p:animEffect transition="out" filter="fade">
+                                      <p:cBhvr>
+                                        <p:cTn id="11" dur="500" tmFilter="0, 0; .2, .5; .8, .5; 1, 0"/>
+                                        <p:tgtEl>
+                                          <p:spTgt spid="20"/>
+                                        </p:tgtEl>
+                                      </p:cBhvr>
+                                    </p:animEffect>
+                                    <p:animScale>
+                                      <p:cBhvr>
+                                        <p:cTn id="12" dur="250" autoRev="1" fill="hold"/>
+                                        <p:tgtEl>
+                                          <p:spTgt spid="20"/>
+                                        </p:tgtEl>
+                                      </p:cBhvr>
+                                      <p:by x="105000" y="105000"/>
+                                    </p:animScale>
+                                  </p:childTnLst>
+                                </p:cTn>
+                              </p:par>
+                            </p:childTnLst>
+                          </p:cTn>
+                        </p:par>
+                      </p:childTnLst>
+                    </p:cTn>
+                  </p:par>
+                  <p:par>
+                    <p:cTn id="13" fill="hold">
+                      <p:stCondLst>
+                        <p:cond delay="indefinite"/>
+                      </p:stCondLst>
+                      <p:childTnLst>
+                        <p:par>
+                          <p:cTn id="14" fill="hold">
+                            <p:stCondLst>
+                              <p:cond delay="0"/>
+                            </p:stCondLst>
+                            <p:childTnLst>
+                              <p:par>
+                                <p:cTn id="15" presetID="26" presetClass="emph" presetSubtype="0" fill="hold" nodeType="clickEffect">
+                                  <p:stCondLst>
+                                    <p:cond delay="0"/>
+                                  </p:stCondLst>
+                                  <p:childTnLst>
+                                    <p:animEffect transition="out" filter="fade">
+                                      <p:cBhvr>
+                                        <p:cTn id="16" dur="500" tmFilter="0, 0; .2, .5; .8, .5; 1, 0"/>
+                                        <p:tgtEl>
+                                          <p:spTgt spid="19"/>
+                                        </p:tgtEl>
+                                      </p:cBhvr>
+                                    </p:animEffect>
+                                    <p:animScale>
+                                      <p:cBhvr>
+                                        <p:cTn id="17" dur="250" autoRev="1" fill="hold"/>
+                                        <p:tgtEl>
+                                          <p:spTgt spid="19"/>
+                                        </p:tgtEl>
+                                      </p:cBhvr>
+                                      <p:by x="105000" y="105000"/>
+                                    </p:animScale>
+                                  </p:childTnLst>
+                                </p:cTn>
+                              </p:par>
+                            </p:childTnLst>
+                          </p:cTn>
+                        </p:par>
+                      </p:childTnLst>
+                    </p:cTn>
+                  </p:par>
+                  <p:par>
+                    <p:cTn id="18" fill="hold">
+                      <p:stCondLst>
+                        <p:cond delay="indefinite"/>
+                      </p:stCondLst>
+                      <p:childTnLst>
+                        <p:par>
+                          <p:cTn id="19" fill="hold">
+                            <p:stCondLst>
+                              <p:cond delay="0"/>
+                            </p:stCondLst>
+                            <p:childTnLst>
+                              <p:par>
+                                <p:cTn id="20" presetID="26" presetClass="emph" presetSubtype="0" fill="hold" nodeType="clickEffect">
+                                  <p:stCondLst>
+                                    <p:cond delay="0"/>
+                                  </p:stCondLst>
+                                  <p:childTnLst>
+                                    <p:animEffect transition="out" filter="fade">
+                                      <p:cBhvr>
+                                        <p:cTn id="21" dur="500" tmFilter="0, 0; .2, .5; .8, .5; 1, 0"/>
+                                        <p:tgtEl>
+                                          <p:spTgt spid="18"/>
+                                        </p:tgtEl>
+                                      </p:cBhvr>
+                                    </p:animEffect>
+                                    <p:animScale>
+                                      <p:cBhvr>
+                                        <p:cTn id="22" dur="250" autoRev="1" fill="hold"/>
+                                        <p:tgtEl>
+                                          <p:spTgt spid="18"/>
+                                        </p:tgtEl>
+                                      </p:cBhvr>
+                                      <p:by x="105000" y="105000"/>
+                                    </p:animScale>
+                                  </p:childTnLst>
+                                </p:cTn>
+                              </p:par>
+                            </p:childTnLst>
+                          </p:cTn>
+                        </p:par>
+                      </p:childTnLst>
+                    </p:cTn>
+                  </p:par>
+                </p:childTnLst>
+              </p:cTn>
+              <p:prevCondLst>
+                <p:cond evt="onPrev" delay="0">
+                  <p:tgtEl>
+                    <p:sldTgt/>
+                  </p:tgtEl>
+                </p:cond>
+              </p:prevCondLst>
+              <p:nextCondLst>
+                <p:cond evt="onNext" delay="0">
+                  <p:tgtEl>
+                    <p:sldTgt/>
+                  </p:tgtEl>
+                </p:cond>
+              </p:nextCondLst>
+            </p:seq>
+          </p:childTnLst>
+        </p:cTn>
       </p:par>
     </p:tnLst>
   </p:timing>
@@ -35974,7 +36536,7 @@
                 <a16:creationId xmlns:a16="http://schemas.microsoft.com/office/drawing/2014/main" id="{7F192ACD-9C75-481C-8934-C15F525ED96C}"/>
               </a:ext>
               <a:ext uri="{C183D7F6-B498-43B3-948B-1728B52AA6E4}">
-                <adec:decorative xmlns:adec="http://schemas.microsoft.com/office/drawing/2017/decorative" xmlns="" val="1"/>
+                <adec:decorative xmlns="" xmlns:adec="http://schemas.microsoft.com/office/drawing/2017/decorative" val="1"/>
               </a:ext>
             </a:extLst>
           </p:cNvPr>
@@ -35985,8 +36547,8 @@
         </p:nvSpPr>
         <p:spPr bwMode="auto">
           <a:xfrm flipH="1">
-            <a:off x="935760" y="3327325"/>
-            <a:ext cx="1583456" cy="1740563"/>
+            <a:off x="701917" y="2844566"/>
+            <a:ext cx="2022640" cy="2223322"/>
           </a:xfrm>
           <a:custGeom>
             <a:avLst/>
@@ -36124,7 +36686,7 @@
                 <a16:creationId xmlns:a16="http://schemas.microsoft.com/office/drawing/2014/main" id="{D83BBA1A-1810-4171-BD9C-B27B7C26AF70}"/>
               </a:ext>
               <a:ext uri="{C183D7F6-B498-43B3-948B-1728B52AA6E4}">
-                <adec:decorative xmlns:adec="http://schemas.microsoft.com/office/drawing/2017/decorative" xmlns="" val="1"/>
+                <adec:decorative xmlns="" xmlns:adec="http://schemas.microsoft.com/office/drawing/2017/decorative" val="1"/>
               </a:ext>
             </a:extLst>
           </p:cNvPr>
@@ -36135,8 +36697,8 @@
         </p:nvSpPr>
         <p:spPr bwMode="auto">
           <a:xfrm rot="5400000">
-            <a:off x="7081393" y="3443407"/>
-            <a:ext cx="1371600" cy="1508400"/>
+            <a:off x="6475325" y="2837339"/>
+            <a:ext cx="1948880" cy="2143256"/>
           </a:xfrm>
           <a:custGeom>
             <a:avLst/>
@@ -36274,7 +36836,7 @@
                 <a16:creationId xmlns:a16="http://schemas.microsoft.com/office/drawing/2014/main" id="{2D409DD0-6B30-47E3-9886-F8F16D42AB79}"/>
               </a:ext>
               <a:ext uri="{C183D7F6-B498-43B3-948B-1728B52AA6E4}">
-                <adec:decorative xmlns:adec="http://schemas.microsoft.com/office/drawing/2017/decorative" xmlns="" val="1"/>
+                <adec:decorative xmlns="" xmlns:adec="http://schemas.microsoft.com/office/drawing/2017/decorative" val="1"/>
               </a:ext>
             </a:extLst>
           </p:cNvPr>
@@ -36285,8 +36847,8 @@
         </p:nvSpPr>
         <p:spPr bwMode="auto">
           <a:xfrm rot="16200000">
-            <a:off x="8937925" y="3447842"/>
-            <a:ext cx="1371600" cy="1508400"/>
+            <a:off x="8963148" y="2916835"/>
+            <a:ext cx="1877384" cy="2064630"/>
           </a:xfrm>
           <a:custGeom>
             <a:avLst/>
@@ -36424,7 +36986,7 @@
                 <a16:creationId xmlns:a16="http://schemas.microsoft.com/office/drawing/2014/main" id="{8B1A45F7-385D-4B67-98E4-489AB4E31714}"/>
               </a:ext>
               <a:ext uri="{C183D7F6-B498-43B3-948B-1728B52AA6E4}">
-                <adec:decorative xmlns:adec="http://schemas.microsoft.com/office/drawing/2017/decorative" xmlns="" val="1"/>
+                <adec:decorative xmlns="" xmlns:adec="http://schemas.microsoft.com/office/drawing/2017/decorative" val="1"/>
               </a:ext>
             </a:extLst>
           </p:cNvPr>
@@ -36435,8 +36997,8 @@
         </p:nvSpPr>
         <p:spPr bwMode="auto">
           <a:xfrm>
-            <a:off x="5382371" y="3446020"/>
-            <a:ext cx="1371600" cy="1508400"/>
+            <a:off x="4358345" y="3010458"/>
+            <a:ext cx="1775401" cy="1952475"/>
           </a:xfrm>
           <a:custGeom>
             <a:avLst/>
@@ -36574,7 +37136,7 @@
                 <a16:creationId xmlns:a16="http://schemas.microsoft.com/office/drawing/2014/main" id="{7F192ACD-9C75-481C-8934-C15F525ED96C}"/>
               </a:ext>
               <a:ext uri="{C183D7F6-B498-43B3-948B-1728B52AA6E4}">
-                <adec:decorative xmlns:adec="http://schemas.microsoft.com/office/drawing/2017/decorative" xmlns="" val="1"/>
+                <adec:decorative xmlns="" xmlns:adec="http://schemas.microsoft.com/office/drawing/2017/decorative" val="1"/>
               </a:ext>
             </a:extLst>
           </p:cNvPr>
@@ -36585,8 +37147,8 @@
         </p:nvSpPr>
         <p:spPr bwMode="auto">
           <a:xfrm>
-            <a:off x="928206" y="3329940"/>
-            <a:ext cx="1583456" cy="1740563"/>
+            <a:off x="694363" y="2847181"/>
+            <a:ext cx="2022640" cy="2223322"/>
           </a:xfrm>
           <a:custGeom>
             <a:avLst/>
@@ -36724,7 +37286,7 @@
                 <a16:creationId xmlns:a16="http://schemas.microsoft.com/office/drawing/2014/main" id="{5B7ACCD3-FC43-4E32-B7AA-E6D86BED1A32}"/>
               </a:ext>
               <a:ext uri="{C183D7F6-B498-43B3-948B-1728B52AA6E4}">
-                <adec:decorative xmlns:adec="http://schemas.microsoft.com/office/drawing/2017/decorative" xmlns="" val="1"/>
+                <adec:decorative xmlns="" xmlns:adec="http://schemas.microsoft.com/office/drawing/2017/decorative" val="1"/>
               </a:ext>
             </a:extLst>
           </p:cNvPr>
@@ -36844,8 +37406,8 @@
         </p:blipFill>
         <p:spPr>
           <a:xfrm>
-            <a:off x="1210219" y="3721550"/>
-            <a:ext cx="1018089" cy="1018089"/>
+            <a:off x="1037434" y="3278960"/>
+            <a:ext cx="1382488" cy="1382488"/>
           </a:xfrm>
           <a:prstGeom prst="roundRect">
             <a:avLst>
@@ -36927,7 +37489,7 @@
         </p:nvSpPr>
         <p:spPr>
           <a:xfrm>
-            <a:off x="5661910" y="4951807"/>
+            <a:off x="4637885" y="4960320"/>
             <a:ext cx="812521" cy="276999"/>
           </a:xfrm>
           <a:prstGeom prst="rect">
@@ -36976,7 +37538,7 @@
         </p:nvSpPr>
         <p:spPr>
           <a:xfrm>
-            <a:off x="7330449" y="4957294"/>
+            <a:off x="6958163" y="4954732"/>
             <a:ext cx="884342" cy="276999"/>
           </a:xfrm>
           <a:prstGeom prst="rect">
@@ -37024,7 +37586,7 @@
         </p:nvSpPr>
         <p:spPr>
           <a:xfrm>
-            <a:off x="9190274" y="4896475"/>
+            <a:off x="9405155" y="4892692"/>
             <a:ext cx="1021113" cy="276999"/>
           </a:xfrm>
           <a:prstGeom prst="rect">
@@ -37066,7 +37628,7 @@
                 <a16:creationId xmlns:a16="http://schemas.microsoft.com/office/drawing/2014/main" id="{E4AFE17F-D5F3-4088-A119-1B09AC60EA16}"/>
               </a:ext>
               <a:ext uri="{C183D7F6-B498-43B3-948B-1728B52AA6E4}">
-                <adec:decorative xmlns:adec="http://schemas.microsoft.com/office/drawing/2017/decorative" xmlns="" val="1"/>
+                <adec:decorative xmlns="" xmlns:adec="http://schemas.microsoft.com/office/drawing/2017/decorative" val="1"/>
               </a:ext>
             </a:extLst>
           </p:cNvPr>
@@ -37075,7 +37637,7 @@
         </p:nvCxnSpPr>
         <p:spPr>
           <a:xfrm flipV="1">
-            <a:off x="6096000" y="1995386"/>
+            <a:off x="5071975" y="2003899"/>
             <a:ext cx="0" cy="2488819"/>
           </a:xfrm>
           <a:prstGeom prst="line">
@@ -37114,7 +37676,7 @@
                 <a16:creationId xmlns:a16="http://schemas.microsoft.com/office/drawing/2014/main" id="{B73380DA-31E8-4A4F-8316-F527A262BAB7}"/>
               </a:ext>
               <a:ext uri="{C183D7F6-B498-43B3-948B-1728B52AA6E4}">
-                <adec:decorative xmlns:adec="http://schemas.microsoft.com/office/drawing/2017/decorative" xmlns="" val="1"/>
+                <adec:decorative xmlns="" xmlns:adec="http://schemas.microsoft.com/office/drawing/2017/decorative" val="1"/>
               </a:ext>
             </a:extLst>
           </p:cNvPr>
@@ -37123,7 +37685,7 @@
         </p:nvCxnSpPr>
         <p:spPr>
           <a:xfrm flipV="1">
-            <a:off x="7751645" y="2938644"/>
+            <a:off x="7449765" y="2051772"/>
             <a:ext cx="0" cy="1504909"/>
           </a:xfrm>
           <a:prstGeom prst="line">
@@ -37168,7 +37730,7 @@
           </p:cNvPicPr>
           <p:nvPr/>
         </p:nvPicPr>
-        <p:blipFill>
+        <p:blipFill rotWithShape="1">
           <a:blip r:embed="rId4" cstate="hqprint">
             <a:extLst>
               <a:ext uri="{28A0092B-C50C-407E-A947-70E740481C1C}">
@@ -37176,13 +37738,13 @@
               </a:ext>
             </a:extLst>
           </a:blip>
-          <a:srcRect/>
+          <a:srcRect l="21136" t="30970" r="13925" b="5935"/>
           <a:stretch/>
         </p:blipFill>
         <p:spPr>
           <a:xfrm>
-            <a:off x="5569090" y="3691099"/>
-            <a:ext cx="1076666" cy="1080000"/>
+            <a:off x="4518326" y="3301721"/>
+            <a:ext cx="1146181" cy="1486665"/>
           </a:xfrm>
           <a:prstGeom prst="ellipse">
             <a:avLst/>
@@ -37216,8 +37778,8 @@
         </p:blipFill>
         <p:spPr>
           <a:xfrm>
-            <a:off x="7344364" y="3593934"/>
-            <a:ext cx="842510" cy="1262013"/>
+            <a:off x="6845392" y="3107237"/>
+            <a:ext cx="1152220" cy="1725934"/>
           </a:xfrm>
           <a:custGeom>
             <a:avLst/>
@@ -37291,7 +37853,7 @@
                 <a16:creationId xmlns:a16="http://schemas.microsoft.com/office/drawing/2014/main" id="{BB4E19F0-9268-49F1-864A-6AF530251A78}"/>
               </a:ext>
               <a:ext uri="{C183D7F6-B498-43B3-948B-1728B52AA6E4}">
-                <adec:decorative xmlns:adec="http://schemas.microsoft.com/office/drawing/2017/decorative" xmlns="" val="1"/>
+                <adec:decorative xmlns="" xmlns:adec="http://schemas.microsoft.com/office/drawing/2017/decorative" val="1"/>
               </a:ext>
             </a:extLst>
           </p:cNvPr>
@@ -37300,7 +37862,7 @@
         </p:nvCxnSpPr>
         <p:spPr>
           <a:xfrm flipV="1">
-            <a:off x="9623724" y="2460463"/>
+            <a:off x="9894901" y="2448181"/>
             <a:ext cx="0" cy="2087011"/>
           </a:xfrm>
           <a:prstGeom prst="line">
@@ -37358,8 +37920,8 @@
         </p:blipFill>
         <p:spPr>
           <a:xfrm>
-            <a:off x="9161833" y="3588771"/>
-            <a:ext cx="923782" cy="1212628"/>
+            <a:off x="9303302" y="3187744"/>
+            <a:ext cx="1183198" cy="1553158"/>
           </a:xfrm>
           <a:custGeom>
             <a:avLst/>
@@ -37439,7 +38001,7 @@
         </p:nvSpPr>
         <p:spPr>
           <a:xfrm>
-            <a:off x="5471140" y="5231267"/>
+            <a:off x="4447115" y="5239780"/>
             <a:ext cx="1223396" cy="276999"/>
           </a:xfrm>
           <a:prstGeom prst="rect">
@@ -37536,7 +38098,7 @@
         </p:nvSpPr>
         <p:spPr>
           <a:xfrm>
-            <a:off x="7160922" y="5239780"/>
+            <a:off x="6788636" y="5237218"/>
             <a:ext cx="1223396" cy="276999"/>
           </a:xfrm>
           <a:prstGeom prst="rect">
@@ -37584,7 +38146,7 @@
         </p:nvSpPr>
         <p:spPr>
           <a:xfrm>
-            <a:off x="9094037" y="5175243"/>
+            <a:off x="9308918" y="5171460"/>
             <a:ext cx="1223396" cy="276999"/>
           </a:xfrm>
           <a:prstGeom prst="rect">
@@ -38240,7 +38802,7 @@
         </p:nvSpPr>
         <p:spPr>
           <a:xfrm>
-            <a:off x="5499987" y="1504229"/>
+            <a:off x="4475962" y="1512742"/>
             <a:ext cx="1154778" cy="369332"/>
           </a:xfrm>
           <a:prstGeom prst="rect">
@@ -38296,7 +38858,7 @@
         </p:nvSpPr>
         <p:spPr>
           <a:xfrm>
-            <a:off x="9046335" y="1713037"/>
+            <a:off x="9331722" y="1774773"/>
             <a:ext cx="1154778" cy="553998"/>
           </a:xfrm>
           <a:prstGeom prst="rect">
@@ -38346,7 +38908,7 @@
         </p:nvSpPr>
         <p:spPr>
           <a:xfrm>
-            <a:off x="7185551" y="2628689"/>
+            <a:off x="6872376" y="1751031"/>
             <a:ext cx="1154778" cy="184666"/>
           </a:xfrm>
           <a:prstGeom prst="rect">
@@ -38388,394 +38950,6 @@
           </a:p>
         </p:txBody>
       </p:sp>
-      <p:sp>
-        <p:nvSpPr>
-          <p:cNvPr id="37" name="Полилиния 6">
-            <a:extLst>
-              <a:ext uri="{FF2B5EF4-FFF2-40B4-BE49-F238E27FC236}">
-                <a16:creationId xmlns:a16="http://schemas.microsoft.com/office/drawing/2014/main" id="{8B1A45F7-385D-4B67-98E4-489AB4E31714}"/>
-              </a:ext>
-              <a:ext uri="{C183D7F6-B498-43B3-948B-1728B52AA6E4}">
-                <adec:decorative xmlns:adec="http://schemas.microsoft.com/office/drawing/2017/decorative" xmlns="" val="1"/>
-              </a:ext>
-            </a:extLst>
-          </p:cNvPr>
-          <p:cNvSpPr>
-            <a:spLocks/>
-          </p:cNvSpPr>
-          <p:nvPr/>
-        </p:nvSpPr>
-        <p:spPr bwMode="auto">
-          <a:xfrm flipH="1">
-            <a:off x="3615167" y="3446172"/>
-            <a:ext cx="1370997" cy="1508097"/>
-          </a:xfrm>
-          <a:custGeom>
-            <a:avLst/>
-            <a:gdLst>
-              <a:gd name="T0" fmla="*/ 223 w 322"/>
-              <a:gd name="T1" fmla="*/ 21 h 353"/>
-              <a:gd name="T2" fmla="*/ 113 w 322"/>
-              <a:gd name="T3" fmla="*/ 52 h 353"/>
-              <a:gd name="T4" fmla="*/ 14 w 322"/>
-              <a:gd name="T5" fmla="*/ 172 h 353"/>
-              <a:gd name="T6" fmla="*/ 119 w 322"/>
-              <a:gd name="T7" fmla="*/ 327 h 353"/>
-              <a:gd name="T8" fmla="*/ 320 w 322"/>
-              <a:gd name="T9" fmla="*/ 183 h 353"/>
-              <a:gd name="T10" fmla="*/ 287 w 322"/>
-              <a:gd name="T11" fmla="*/ 56 h 353"/>
-              <a:gd name="T12" fmla="*/ 223 w 322"/>
-              <a:gd name="T13" fmla="*/ 21 h 353"/>
-            </a:gdLst>
-            <a:ahLst/>
-            <a:cxnLst>
-              <a:cxn ang="0">
-                <a:pos x="T0" y="T1"/>
-              </a:cxn>
-              <a:cxn ang="0">
-                <a:pos x="T2" y="T3"/>
-              </a:cxn>
-              <a:cxn ang="0">
-                <a:pos x="T4" y="T5"/>
-              </a:cxn>
-              <a:cxn ang="0">
-                <a:pos x="T6" y="T7"/>
-              </a:cxn>
-              <a:cxn ang="0">
-                <a:pos x="T8" y="T9"/>
-              </a:cxn>
-              <a:cxn ang="0">
-                <a:pos x="T10" y="T11"/>
-              </a:cxn>
-              <a:cxn ang="0">
-                <a:pos x="T12" y="T13"/>
-              </a:cxn>
-            </a:cxnLst>
-            <a:rect l="0" t="0" r="r" b="b"/>
-            <a:pathLst>
-              <a:path w="322" h="353">
-                <a:moveTo>
-                  <a:pt x="223" y="21"/>
-                </a:moveTo>
-                <a:cubicBezTo>
-                  <a:pt x="198" y="35"/>
-                  <a:pt x="187" y="48"/>
-                  <a:pt x="113" y="52"/>
-                </a:cubicBezTo>
-                <a:cubicBezTo>
-                  <a:pt x="39" y="57"/>
-                  <a:pt x="0" y="118"/>
-                  <a:pt x="14" y="172"/>
-                </a:cubicBezTo>
-                <a:cubicBezTo>
-                  <a:pt x="28" y="226"/>
-                  <a:pt x="32" y="301"/>
-                  <a:pt x="119" y="327"/>
-                </a:cubicBezTo>
-                <a:cubicBezTo>
-                  <a:pt x="206" y="353"/>
-                  <a:pt x="316" y="282"/>
-                  <a:pt x="320" y="183"/>
-                </a:cubicBezTo>
-                <a:cubicBezTo>
-                  <a:pt x="322" y="124"/>
-                  <a:pt x="306" y="88"/>
-                  <a:pt x="287" y="56"/>
-                </a:cubicBezTo>
-                <a:cubicBezTo>
-                  <a:pt x="274" y="35"/>
-                  <a:pt x="259" y="0"/>
-                  <a:pt x="223" y="21"/>
-                </a:cubicBezTo>
-                <a:close/>
-              </a:path>
-            </a:pathLst>
-          </a:custGeom>
-          <a:gradFill>
-            <a:gsLst>
-              <a:gs pos="1000">
-                <a:srgbClr val="7CEFD8">
-                  <a:alpha val="79000"/>
-                </a:srgbClr>
-              </a:gs>
-              <a:gs pos="61000">
-                <a:srgbClr val="6672E4">
-                  <a:alpha val="84000"/>
-                </a:srgbClr>
-              </a:gs>
-              <a:gs pos="98000">
-                <a:srgbClr val="882BE5">
-                  <a:alpha val="66000"/>
-                </a:srgbClr>
-              </a:gs>
-            </a:gsLst>
-            <a:lin ang="5400000" scaled="1"/>
-          </a:gradFill>
-          <a:ln w="12700" cap="flat">
-            <a:noFill/>
-            <a:prstDash val="solid"/>
-            <a:miter lim="800000"/>
-            <a:headEnd/>
-            <a:tailEnd/>
-          </a:ln>
-        </p:spPr>
-        <p:txBody>
-          <a:bodyPr rot="0" spcFirstLastPara="0" vertOverflow="overflow" horzOverflow="overflow" vert="horz" wrap="square" lIns="91440" tIns="45720" rIns="91440" bIns="45720" numCol="1" spcCol="0" rtlCol="0" fromWordArt="0" anchor="t" anchorCtr="0" forceAA="0" compatLnSpc="1">
-            <a:prstTxWarp prst="textNoShape">
-              <a:avLst/>
-            </a:prstTxWarp>
-            <a:noAutofit/>
-          </a:bodyPr>
-          <a:lstStyle/>
-          <a:p>
-            <a:pPr rtl="0"/>
-            <a:endParaRPr lang="ru-RU" dirty="0">
-              <a:solidFill>
-                <a:schemeClr val="tx1"/>
-              </a:solidFill>
-            </a:endParaRPr>
-          </a:p>
-        </p:txBody>
-      </p:sp>
-      <p:sp>
-        <p:nvSpPr>
-          <p:cNvPr id="38" name="Надпись 72">
-            <a:extLst>
-              <a:ext uri="{FF2B5EF4-FFF2-40B4-BE49-F238E27FC236}">
-                <a16:creationId xmlns:a16="http://schemas.microsoft.com/office/drawing/2014/main" id="{8539F668-991D-4BEA-B3AA-3A269274108D}"/>
-              </a:ext>
-            </a:extLst>
-          </p:cNvPr>
-          <p:cNvSpPr txBox="1"/>
-          <p:nvPr/>
-        </p:nvSpPr>
-        <p:spPr>
-          <a:xfrm>
-            <a:off x="3898322" y="4954268"/>
-            <a:ext cx="812521" cy="276999"/>
-          </a:xfrm>
-          <a:prstGeom prst="rect">
-            <a:avLst/>
-          </a:prstGeom>
-        </p:spPr>
-        <p:txBody>
-          <a:bodyPr wrap="square" lIns="0" tIns="0" rIns="0" bIns="0" rtlCol="0">
-            <a:spAutoFit/>
-          </a:bodyPr>
-          <a:lstStyle>
-            <a:defPPr>
-              <a:defRPr lang="en-US"/>
-            </a:defPPr>
-            <a:lvl1pPr>
-              <a:defRPr sz="1600" i="1">
-                <a:solidFill>
-                  <a:srgbClr val="002060"/>
-                </a:solidFill>
-                <a:latin typeface="+mj-lt"/>
-                <a:cs typeface="Segoe UI" panose="020B0502040204020203" pitchFamily="34" charset="0"/>
-              </a:defRPr>
-            </a:lvl1pPr>
-          </a:lstStyle>
-          <a:p>
-            <a:pPr algn="ctr" rtl="0"/>
-            <a:r>
-              <a:rPr lang="ru-RU" sz="1800" dirty="0" smtClean="0"/>
-              <a:t>Иван</a:t>
-            </a:r>
-            <a:endParaRPr lang="ru-RU" sz="1800" dirty="0"/>
-          </a:p>
-        </p:txBody>
-      </p:sp>
-      <p:cxnSp>
-        <p:nvCxnSpPr>
-          <p:cNvPr id="39" name="Прямая соединительная линия 38">
-            <a:extLst>
-              <a:ext uri="{FF2B5EF4-FFF2-40B4-BE49-F238E27FC236}">
-                <a16:creationId xmlns:a16="http://schemas.microsoft.com/office/drawing/2014/main" id="{E4AFE17F-D5F3-4088-A119-1B09AC60EA16}"/>
-              </a:ext>
-              <a:ext uri="{C183D7F6-B498-43B3-948B-1728B52AA6E4}">
-                <adec:decorative xmlns:adec="http://schemas.microsoft.com/office/drawing/2017/decorative" xmlns="" val="1"/>
-              </a:ext>
-            </a:extLst>
-          </p:cNvPr>
-          <p:cNvCxnSpPr/>
-          <p:nvPr/>
-        </p:nvCxnSpPr>
-        <p:spPr>
-          <a:xfrm flipV="1">
-            <a:off x="4327428" y="2201762"/>
-            <a:ext cx="0" cy="2488819"/>
-          </a:xfrm>
-          <a:prstGeom prst="line">
-            <a:avLst/>
-          </a:prstGeom>
-          <a:ln w="9525">
-            <a:solidFill>
-              <a:schemeClr val="bg1">
-                <a:lumMod val="50000"/>
-              </a:schemeClr>
-            </a:solidFill>
-            <a:headEnd w="sm" len="sm"/>
-            <a:tailEnd type="oval" w="sm" len="sm"/>
-          </a:ln>
-        </p:spPr>
-        <p:style>
-          <a:lnRef idx="1">
-            <a:schemeClr val="accent1"/>
-          </a:lnRef>
-          <a:fillRef idx="0">
-            <a:schemeClr val="accent1"/>
-          </a:fillRef>
-          <a:effectRef idx="0">
-            <a:schemeClr val="accent1"/>
-          </a:effectRef>
-          <a:fontRef idx="minor">
-            <a:schemeClr val="tx1"/>
-          </a:fontRef>
-        </p:style>
-      </p:cxnSp>
-      <p:pic>
-        <p:nvPicPr>
-          <p:cNvPr id="40" name="Рисунок 39">
-            <a:extLst>
-              <a:ext uri="{FF2B5EF4-FFF2-40B4-BE49-F238E27FC236}">
-                <a16:creationId xmlns:a16="http://schemas.microsoft.com/office/drawing/2014/main" id="{2577F7D1-192D-40B4-99E0-89844CC3E130}"/>
-              </a:ext>
-            </a:extLst>
-          </p:cNvPr>
-          <p:cNvPicPr>
-            <a:picLocks noChangeAspect="1"/>
-          </p:cNvPicPr>
-          <p:nvPr/>
-        </p:nvPicPr>
-        <p:blipFill>
-          <a:blip r:embed="rId7" cstate="hqprint">
-            <a:extLst>
-              <a:ext uri="{28A0092B-C50C-407E-A947-70E740481C1C}">
-                <a14:useLocalDpi xmlns:a14="http://schemas.microsoft.com/office/drawing/2010/main" val="0"/>
-              </a:ext>
-            </a:extLst>
-          </a:blip>
-          <a:stretch>
-            <a:fillRect/>
-          </a:stretch>
-        </p:blipFill>
-        <p:spPr>
-          <a:xfrm>
-            <a:off x="3787428" y="3691099"/>
-            <a:ext cx="1080000" cy="1080000"/>
-          </a:xfrm>
-          <a:prstGeom prst="ellipse">
-            <a:avLst/>
-          </a:prstGeom>
-        </p:spPr>
-      </p:pic>
-      <p:sp>
-        <p:nvSpPr>
-          <p:cNvPr id="41" name="Надпись 81">
-            <a:extLst>
-              <a:ext uri="{FF2B5EF4-FFF2-40B4-BE49-F238E27FC236}">
-                <a16:creationId xmlns:a16="http://schemas.microsoft.com/office/drawing/2014/main" id="{98E46396-D16F-446B-A9AD-53DEF0657574}"/>
-              </a:ext>
-            </a:extLst>
-          </p:cNvPr>
-          <p:cNvSpPr txBox="1"/>
-          <p:nvPr/>
-        </p:nvSpPr>
-        <p:spPr>
-          <a:xfrm>
-            <a:off x="3688967" y="5231267"/>
-            <a:ext cx="1223396" cy="276999"/>
-          </a:xfrm>
-          <a:prstGeom prst="rect">
-            <a:avLst/>
-          </a:prstGeom>
-        </p:spPr>
-        <p:txBody>
-          <a:bodyPr wrap="square" lIns="0" tIns="0" rIns="0" bIns="0" rtlCol="0">
-            <a:spAutoFit/>
-          </a:bodyPr>
-          <a:lstStyle>
-            <a:defPPr>
-              <a:defRPr lang="en-US"/>
-            </a:defPPr>
-            <a:lvl1pPr>
-              <a:defRPr sz="1600" i="1">
-                <a:solidFill>
-                  <a:srgbClr val="002060"/>
-                </a:solidFill>
-                <a:latin typeface="+mj-lt"/>
-                <a:cs typeface="Segoe UI" panose="020B0502040204020203" pitchFamily="34" charset="0"/>
-              </a:defRPr>
-            </a:lvl1pPr>
-          </a:lstStyle>
-          <a:p>
-            <a:pPr algn="ctr" rtl="0"/>
-            <a:r>
-              <a:rPr lang="ru-RU" sz="1800" dirty="0" err="1" smtClean="0"/>
-              <a:t>Кочкарёв</a:t>
-            </a:r>
-            <a:endParaRPr lang="ru-RU" sz="1800" dirty="0"/>
-          </a:p>
-        </p:txBody>
-      </p:sp>
-      <p:sp>
-        <p:nvSpPr>
-          <p:cNvPr id="42" name="Надпись 67">
-            <a:extLst>
-              <a:ext uri="{FF2B5EF4-FFF2-40B4-BE49-F238E27FC236}">
-                <a16:creationId xmlns:a16="http://schemas.microsoft.com/office/drawing/2014/main" id="{0724D529-AD4B-49E7-97D2-8E8657BF03D1}"/>
-              </a:ext>
-            </a:extLst>
-          </p:cNvPr>
-          <p:cNvSpPr txBox="1"/>
-          <p:nvPr/>
-        </p:nvSpPr>
-        <p:spPr>
-          <a:xfrm>
-            <a:off x="3766658" y="1782791"/>
-            <a:ext cx="1154778" cy="369332"/>
-          </a:xfrm>
-          <a:prstGeom prst="rect">
-            <a:avLst/>
-          </a:prstGeom>
-        </p:spPr>
-        <p:txBody>
-          <a:bodyPr wrap="square" lIns="0" tIns="0" rIns="0" bIns="0" rtlCol="0">
-            <a:spAutoFit/>
-          </a:bodyPr>
-          <a:lstStyle>
-            <a:defPPr>
-              <a:defRPr lang="en-US"/>
-            </a:defPPr>
-            <a:lvl1pPr>
-              <a:defRPr sz="1600" i="1">
-                <a:solidFill>
-                  <a:srgbClr val="002060"/>
-                </a:solidFill>
-                <a:latin typeface="+mj-lt"/>
-                <a:cs typeface="Segoe UI" panose="020B0502040204020203" pitchFamily="34" charset="0"/>
-              </a:defRPr>
-            </a:lvl1pPr>
-          </a:lstStyle>
-          <a:p>
-            <a:pPr algn="ctr" rtl="0"/>
-            <a:r>
-              <a:rPr lang="en-US" sz="1200" b="1" dirty="0">
-                <a:latin typeface="Segoe UI" panose="020B0502040204020203" pitchFamily="34" charset="0"/>
-              </a:rPr>
-              <a:t>Android</a:t>
-            </a:r>
-            <a:r>
-              <a:rPr lang="ru-RU" sz="1200" b="1" dirty="0">
-                <a:latin typeface="Segoe UI" panose="020B0502040204020203" pitchFamily="34" charset="0"/>
-              </a:rPr>
-              <a:t> разработчик</a:t>
-            </a:r>
-          </a:p>
-        </p:txBody>
-      </p:sp>
     </p:spTree>
     <p:extLst>
       <p:ext uri="{BB962C8B-B14F-4D97-AF65-F5344CB8AC3E}">
@@ -38786,6 +38960,9 @@
   <p:clrMapOvr>
     <a:masterClrMapping/>
   </p:clrMapOvr>
+  <p:transition spd="slow">
+    <p:push dir="u"/>
+  </p:transition>
   <p:timing>
     <p:tnLst>
       <p:par>
@@ -41663,6 +41840,9 @@
   <p:clrMapOvr>
     <a:masterClrMapping/>
   </p:clrMapOvr>
+  <p:transition spd="slow">
+    <p:push dir="u"/>
+  </p:transition>
   <p:timing>
     <p:tnLst>
       <p:par>
@@ -41858,7 +42038,7 @@
                 <a16:creationId xmlns:a16="http://schemas.microsoft.com/office/drawing/2014/main" id="{C8431200-8E45-4A0C-B12B-CFA1B2C53C47}"/>
               </a:ext>
               <a:ext uri="{C183D7F6-B498-43B3-948B-1728B52AA6E4}">
-                <adec:decorative xmlns:adec="http://schemas.microsoft.com/office/drawing/2017/decorative" xmlns="" val="1"/>
+                <adec:decorative xmlns="" xmlns:adec="http://schemas.microsoft.com/office/drawing/2017/decorative" val="1"/>
               </a:ext>
             </a:extLst>
           </p:cNvPr>
@@ -41918,7 +42098,7 @@
                 <a16:creationId xmlns:a16="http://schemas.microsoft.com/office/drawing/2014/main" id="{241C7FC4-FEFA-4A96-9749-9068C68611EF}"/>
               </a:ext>
               <a:ext uri="{C183D7F6-B498-43B3-948B-1728B52AA6E4}">
-                <adec:decorative xmlns:adec="http://schemas.microsoft.com/office/drawing/2017/decorative" xmlns="" val="1"/>
+                <adec:decorative xmlns="" xmlns:adec="http://schemas.microsoft.com/office/drawing/2017/decorative" val="1"/>
               </a:ext>
             </a:extLst>
           </p:cNvPr>
@@ -42024,7 +42204,7 @@
                 <a16:creationId xmlns:a16="http://schemas.microsoft.com/office/drawing/2014/main" id="{294AEDC0-6B1D-4A3D-860D-83756CC387D3}"/>
               </a:ext>
               <a:ext uri="{C183D7F6-B498-43B3-948B-1728B52AA6E4}">
-                <adec:decorative xmlns:adec="http://schemas.microsoft.com/office/drawing/2017/decorative" xmlns="" val="1"/>
+                <adec:decorative xmlns="" xmlns:adec="http://schemas.microsoft.com/office/drawing/2017/decorative" val="1"/>
               </a:ext>
             </a:extLst>
           </p:cNvPr>
@@ -42588,6 +42768,18 @@
   <p:clrMapOvr>
     <a:masterClrMapping/>
   </p:clrMapOvr>
+  <mc:AlternateContent xmlns:mc="http://schemas.openxmlformats.org/markup-compatibility/2006">
+    <mc:Choice xmlns:p14="http://schemas.microsoft.com/office/powerpoint/2010/main" Requires="p14">
+      <p:transition spd="slow" p14:dur="1600">
+        <p14:prism isContent="1" isInverted="1"/>
+      </p:transition>
+    </mc:Choice>
+    <mc:Fallback>
+      <p:transition spd="slow">
+        <p:fade/>
+      </p:transition>
+    </mc:Fallback>
+  </mc:AlternateContent>
   <p:timing>
     <p:tnLst>
       <p:par>
@@ -42783,7 +42975,7 @@
                 <a16:creationId xmlns:a16="http://schemas.microsoft.com/office/drawing/2014/main" id="{C8431200-8E45-4A0C-B12B-CFA1B2C53C47}"/>
               </a:ext>
               <a:ext uri="{C183D7F6-B498-43B3-948B-1728B52AA6E4}">
-                <adec:decorative xmlns:adec="http://schemas.microsoft.com/office/drawing/2017/decorative" xmlns="" val="1"/>
+                <adec:decorative xmlns="" xmlns:adec="http://schemas.microsoft.com/office/drawing/2017/decorative" val="1"/>
               </a:ext>
             </a:extLst>
           </p:cNvPr>
@@ -42843,7 +43035,7 @@
                 <a16:creationId xmlns:a16="http://schemas.microsoft.com/office/drawing/2014/main" id="{241C7FC4-FEFA-4A96-9749-9068C68611EF}"/>
               </a:ext>
               <a:ext uri="{C183D7F6-B498-43B3-948B-1728B52AA6E4}">
-                <adec:decorative xmlns:adec="http://schemas.microsoft.com/office/drawing/2017/decorative" xmlns="" val="1"/>
+                <adec:decorative xmlns="" xmlns:adec="http://schemas.microsoft.com/office/drawing/2017/decorative" val="1"/>
               </a:ext>
             </a:extLst>
           </p:cNvPr>
@@ -42959,7 +43151,7 @@
                 <a16:creationId xmlns:a16="http://schemas.microsoft.com/office/drawing/2014/main" id="{294AEDC0-6B1D-4A3D-860D-83756CC387D3}"/>
               </a:ext>
               <a:ext uri="{C183D7F6-B498-43B3-948B-1728B52AA6E4}">
-                <adec:decorative xmlns:adec="http://schemas.microsoft.com/office/drawing/2017/decorative" xmlns="" val="1"/>
+                <adec:decorative xmlns="" xmlns:adec="http://schemas.microsoft.com/office/drawing/2017/decorative" val="1"/>
               </a:ext>
             </a:extLst>
           </p:cNvPr>
@@ -43523,6 +43715,9 @@
   <p:clrMapOvr>
     <a:masterClrMapping/>
   </p:clrMapOvr>
+  <p:transition spd="slow">
+    <p:push dir="u"/>
+  </p:transition>
   <p:timing>
     <p:tnLst>
       <p:par>
@@ -43558,7 +43753,7 @@
                 <a16:creationId xmlns:a16="http://schemas.microsoft.com/office/drawing/2014/main" id="{D14F9816-D761-44CD-80AC-A13A6A2BF4F4}"/>
               </a:ext>
               <a:ext uri="{C183D7F6-B498-43B3-948B-1728B52AA6E4}">
-                <adec:decorative xmlns:adec="http://schemas.microsoft.com/office/drawing/2017/decorative" xmlns="" val="1"/>
+                <adec:decorative xmlns="" xmlns:adec="http://schemas.microsoft.com/office/drawing/2017/decorative" val="1"/>
               </a:ext>
             </a:extLst>
           </p:cNvPr>
@@ -44442,7 +44637,7 @@
                 <a16:creationId xmlns:a16="http://schemas.microsoft.com/office/drawing/2014/main" id="{E6D6E19C-DE46-4402-8CBF-17BB95458532}"/>
               </a:ext>
               <a:ext uri="{C183D7F6-B498-43B3-948B-1728B52AA6E4}">
-                <adec:decorative xmlns:adec="http://schemas.microsoft.com/office/drawing/2017/decorative" xmlns="" val="1"/>
+                <adec:decorative xmlns="" xmlns:adec="http://schemas.microsoft.com/office/drawing/2017/decorative" val="1"/>
               </a:ext>
             </a:extLst>
           </p:cNvPr>
@@ -44795,14 +44990,14 @@
           <a:p>
             <a:pPr rtl="0"/>
             <a:r>
-              <a:rPr lang="en-US" sz="1600" b="1" dirty="0" smtClean="0">
+              <a:rPr lang="en-US" sz="1600" b="1" dirty="0" err="1" smtClean="0">
                 <a:solidFill>
                   <a:srgbClr val="002060"/>
                 </a:solidFill>
                 <a:latin typeface="Segoe UI" panose="020B0502040204020203" pitchFamily="34" charset="0"/>
                 <a:cs typeface="Segoe UI" panose="020B0502040204020203" pitchFamily="34" charset="0"/>
               </a:rPr>
-              <a:t>Material design</a:t>
+              <a:t>RxJava</a:t>
             </a:r>
             <a:endParaRPr lang="ru-RU" sz="1600" b="1" dirty="0">
               <a:solidFill>
@@ -44980,6 +45175,36 @@
           </a:prstGeom>
         </p:spPr>
       </p:pic>
+      <p:pic>
+        <p:nvPicPr>
+          <p:cNvPr id="4" name="Рисунок 3"/>
+          <p:cNvPicPr>
+            <a:picLocks noChangeAspect="1"/>
+          </p:cNvPicPr>
+          <p:nvPr/>
+        </p:nvPicPr>
+        <p:blipFill>
+          <a:blip r:embed="rId5" cstate="hqprint">
+            <a:extLst>
+              <a:ext uri="{28A0092B-C50C-407E-A947-70E740481C1C}">
+                <a14:useLocalDpi xmlns:a14="http://schemas.microsoft.com/office/drawing/2010/main" val="0"/>
+              </a:ext>
+            </a:extLst>
+          </a:blip>
+          <a:stretch>
+            <a:fillRect/>
+          </a:stretch>
+        </p:blipFill>
+        <p:spPr>
+          <a:xfrm>
+            <a:off x="6175005" y="2456693"/>
+            <a:ext cx="2039719" cy="2039719"/>
+          </a:xfrm>
+          <a:prstGeom prst="rect">
+            <a:avLst/>
+          </a:prstGeom>
+        </p:spPr>
+      </p:pic>
     </p:spTree>
     <p:extLst>
       <p:ext uri="{BB962C8B-B14F-4D97-AF65-F5344CB8AC3E}">
@@ -44990,6 +45215,18 @@
   <p:clrMapOvr>
     <a:masterClrMapping/>
   </p:clrMapOvr>
+  <mc:AlternateContent xmlns:mc="http://schemas.openxmlformats.org/markup-compatibility/2006">
+    <mc:Choice xmlns:p14="http://schemas.microsoft.com/office/powerpoint/2010/main" Requires="p14">
+      <p:transition spd="slow" p14:dur="1500">
+        <p:split orient="vert"/>
+      </p:transition>
+    </mc:Choice>
+    <mc:Fallback>
+      <p:transition spd="slow">
+        <p:split orient="vert"/>
+      </p:transition>
+    </mc:Fallback>
+  </mc:AlternateContent>
   <p:timing>
     <p:tnLst>
       <p:par>
@@ -45185,7 +45422,7 @@
                 <a16:creationId xmlns:a16="http://schemas.microsoft.com/office/drawing/2014/main" id="{C8431200-8E45-4A0C-B12B-CFA1B2C53C47}"/>
               </a:ext>
               <a:ext uri="{C183D7F6-B498-43B3-948B-1728B52AA6E4}">
-                <adec:decorative xmlns:adec="http://schemas.microsoft.com/office/drawing/2017/decorative" xmlns="" val="1"/>
+                <adec:decorative xmlns="" xmlns:adec="http://schemas.microsoft.com/office/drawing/2017/decorative" val="1"/>
               </a:ext>
             </a:extLst>
           </p:cNvPr>
@@ -45245,7 +45482,7 @@
                 <a16:creationId xmlns:a16="http://schemas.microsoft.com/office/drawing/2014/main" id="{241C7FC4-FEFA-4A96-9749-9068C68611EF}"/>
               </a:ext>
               <a:ext uri="{C183D7F6-B498-43B3-948B-1728B52AA6E4}">
-                <adec:decorative xmlns:adec="http://schemas.microsoft.com/office/drawing/2017/decorative" xmlns="" val="1"/>
+                <adec:decorative xmlns="" xmlns:adec="http://schemas.microsoft.com/office/drawing/2017/decorative" val="1"/>
               </a:ext>
             </a:extLst>
           </p:cNvPr>
@@ -45361,7 +45598,7 @@
                 <a16:creationId xmlns:a16="http://schemas.microsoft.com/office/drawing/2014/main" id="{294AEDC0-6B1D-4A3D-860D-83756CC387D3}"/>
               </a:ext>
               <a:ext uri="{C183D7F6-B498-43B3-948B-1728B52AA6E4}">
-                <adec:decorative xmlns:adec="http://schemas.microsoft.com/office/drawing/2017/decorative" xmlns="" val="1"/>
+                <adec:decorative xmlns="" xmlns:adec="http://schemas.microsoft.com/office/drawing/2017/decorative" val="1"/>
               </a:ext>
             </a:extLst>
           </p:cNvPr>
@@ -45934,6 +46171,18 @@
   <p:clrMapOvr>
     <a:masterClrMapping/>
   </p:clrMapOvr>
+  <mc:AlternateContent xmlns:mc="http://schemas.openxmlformats.org/markup-compatibility/2006">
+    <mc:Choice xmlns:p14="http://schemas.microsoft.com/office/powerpoint/2010/main" Requires="p14">
+      <p:transition spd="slow" p14:dur="1200">
+        <p:dissolve/>
+      </p:transition>
+    </mc:Choice>
+    <mc:Fallback>
+      <p:transition spd="slow">
+        <p:dissolve/>
+      </p:transition>
+    </mc:Fallback>
+  </mc:AlternateContent>
   <p:timing>
     <p:tnLst>
       <p:par>

</xml_diff>